<commit_message>
update_ViLT: Vision-and-Language Transformer  Without Convolution or Region Supervision
</commit_message>
<xml_diff>
--- a/Base_Model/VLM+VLLM/论文插图.pptx
+++ b/Base_Model/VLM+VLLM/论文插图.pptx
@@ -8,12 +8,15 @@
     <p:notesMasterId r:id="rId4"/>
   </p:notesMasterIdLst>
   <p:handoutMasterIdLst>
-    <p:handoutMasterId r:id="rId7"/>
+    <p:handoutMasterId r:id="rId10"/>
   </p:handoutMasterIdLst>
   <p:sldIdLst>
     <p:sldId id="256" r:id="rId3"/>
     <p:sldId id="258" r:id="rId5"/>
     <p:sldId id="257" r:id="rId6"/>
+    <p:sldId id="259" r:id="rId7"/>
+    <p:sldId id="260" r:id="rId8"/>
+    <p:sldId id="261" r:id="rId9"/>
   </p:sldIdLst>
   <p:sldSz cx="12192000" cy="6858000"/>
   <p:notesSz cx="7103745" cy="10234295"/>
@@ -4821,7 +4824,7 @@
         <p:spPr>
           <a:xfrm rot="10800000" flipV="1">
             <a:off x="6776720" y="2486025"/>
-            <a:ext cx="1720850" cy="917575"/>
+            <a:ext cx="1626870" cy="917575"/>
           </a:xfrm>
           <a:prstGeom prst="roundRect">
             <a:avLst>
@@ -5019,6 +5022,1343 @@
           </a:fontRef>
         </p:style>
       </p:cxnSp>
+      <p:sp>
+        <p:nvSpPr>
+          <p:cNvPr id="24" name="矩形: 圆角 36"/>
+          <p:cNvSpPr/>
+          <p:nvPr>
+            <p:custDataLst>
+              <p:tags r:id="rId23"/>
+            </p:custDataLst>
+          </p:nvPr>
+        </p:nvSpPr>
+        <p:spPr>
+          <a:xfrm rot="10800000" flipV="1">
+            <a:off x="6196965" y="4490085"/>
+            <a:ext cx="5995035" cy="578485"/>
+          </a:xfrm>
+          <a:prstGeom prst="roundRect">
+            <a:avLst>
+              <a:gd name="adj" fmla="val 10039"/>
+            </a:avLst>
+          </a:prstGeom>
+          <a:noFill/>
+          <a:ln w="38100">
+            <a:solidFill>
+              <a:schemeClr val="tx1"/>
+            </a:solidFill>
+            <a:prstDash val="lgDash"/>
+          </a:ln>
+        </p:spPr>
+        <p:style>
+          <a:lnRef idx="2">
+            <a:schemeClr val="accent1">
+              <a:shade val="15000"/>
+            </a:schemeClr>
+          </a:lnRef>
+          <a:fillRef idx="1">
+            <a:schemeClr val="accent1"/>
+          </a:fillRef>
+          <a:effectRef idx="0">
+            <a:schemeClr val="accent1"/>
+          </a:effectRef>
+          <a:fontRef idx="minor">
+            <a:schemeClr val="lt1"/>
+          </a:fontRef>
+        </p:style>
+        <p:txBody>
+          <a:bodyPr rtlCol="0" anchor="ctr"/>
+          <a:p>
+            <a:pPr algn="ctr"/>
+            <a:endParaRPr lang="zh-CN" altLang="en-US"/>
+          </a:p>
+        </p:txBody>
+      </p:sp>
+      <p:sp>
+        <p:nvSpPr>
+          <p:cNvPr id="25" name="文本框 24"/>
+          <p:cNvSpPr txBox="1"/>
+          <p:nvPr>
+            <p:custDataLst>
+              <p:tags r:id="rId24"/>
+            </p:custDataLst>
+          </p:nvPr>
+        </p:nvSpPr>
+        <p:spPr>
+          <a:xfrm>
+            <a:off x="6473825" y="4699635"/>
+            <a:ext cx="2035810" cy="402590"/>
+          </a:xfrm>
+          <a:prstGeom prst="rect">
+            <a:avLst/>
+          </a:prstGeom>
+          <a:noFill/>
+        </p:spPr>
+        <p:txBody>
+          <a:bodyPr wrap="square" rtlCol="0">
+            <a:noAutofit/>
+          </a:bodyPr>
+          <a:p>
+            <a:pPr algn="ctr"/>
+            <a:r>
+              <a:rPr lang="zh-CN" altLang="en-US" sz="1400" b="1">
+                <a:latin typeface="微软雅黑" charset="0"/>
+                <a:ea typeface="微软雅黑" charset="0"/>
+                <a:cs typeface="微软雅黑" charset="0"/>
+              </a:rPr>
+              <a:t>投影到多模态空间</a:t>
+            </a:r>
+            <a:endParaRPr lang="zh-CN" altLang="en-US" sz="1400" b="1">
+              <a:latin typeface="微软雅黑" charset="0"/>
+              <a:ea typeface="微软雅黑" charset="0"/>
+              <a:cs typeface="微软雅黑" charset="0"/>
+            </a:endParaRPr>
+          </a:p>
+        </p:txBody>
+      </p:sp>
+      <p:sp>
+        <p:nvSpPr>
+          <p:cNvPr id="26" name="矩形: 圆角 36"/>
+          <p:cNvSpPr/>
+          <p:nvPr>
+            <p:custDataLst>
+              <p:tags r:id="rId25"/>
+            </p:custDataLst>
+          </p:nvPr>
+        </p:nvSpPr>
+        <p:spPr>
+          <a:xfrm rot="10800000" flipV="1">
+            <a:off x="6323965" y="5118735"/>
+            <a:ext cx="5382895" cy="403225"/>
+          </a:xfrm>
+          <a:prstGeom prst="roundRect">
+            <a:avLst>
+              <a:gd name="adj" fmla="val 10039"/>
+            </a:avLst>
+          </a:prstGeom>
+          <a:noFill/>
+          <a:ln w="38100">
+            <a:solidFill>
+              <a:schemeClr val="tx1"/>
+            </a:solidFill>
+            <a:prstDash val="lgDash"/>
+          </a:ln>
+        </p:spPr>
+        <p:style>
+          <a:lnRef idx="2">
+            <a:schemeClr val="accent1">
+              <a:shade val="15000"/>
+            </a:schemeClr>
+          </a:lnRef>
+          <a:fillRef idx="1">
+            <a:schemeClr val="accent1"/>
+          </a:fillRef>
+          <a:effectRef idx="0">
+            <a:schemeClr val="accent1"/>
+          </a:effectRef>
+          <a:fontRef idx="minor">
+            <a:schemeClr val="lt1"/>
+          </a:fontRef>
+        </p:style>
+        <p:txBody>
+          <a:bodyPr rtlCol="0" anchor="ctr"/>
+          <a:p>
+            <a:pPr algn="ctr"/>
+            <a:endParaRPr lang="zh-CN" altLang="en-US"/>
+          </a:p>
+        </p:txBody>
+      </p:sp>
+      <p:sp>
+        <p:nvSpPr>
+          <p:cNvPr id="27" name="文本框 26"/>
+          <p:cNvSpPr txBox="1"/>
+          <p:nvPr>
+            <p:custDataLst>
+              <p:tags r:id="rId26"/>
+            </p:custDataLst>
+          </p:nvPr>
+        </p:nvSpPr>
+        <p:spPr>
+          <a:xfrm>
+            <a:off x="6531610" y="5166995"/>
+            <a:ext cx="2035810" cy="402590"/>
+          </a:xfrm>
+          <a:prstGeom prst="rect">
+            <a:avLst/>
+          </a:prstGeom>
+          <a:noFill/>
+        </p:spPr>
+        <p:txBody>
+          <a:bodyPr wrap="square" rtlCol="0">
+            <a:noAutofit/>
+          </a:bodyPr>
+          <a:p>
+            <a:pPr algn="ctr"/>
+            <a:r>
+              <a:rPr lang="zh-CN" altLang="en-US" sz="1400" b="1">
+                <a:latin typeface="微软雅黑" charset="0"/>
+                <a:ea typeface="微软雅黑" charset="0"/>
+                <a:cs typeface="微软雅黑" charset="0"/>
+              </a:rPr>
+              <a:t>相似度</a:t>
+            </a:r>
+            <a:r>
+              <a:rPr lang="zh-CN" altLang="en-US" sz="1400" b="1">
+                <a:latin typeface="微软雅黑" charset="0"/>
+                <a:ea typeface="微软雅黑" charset="0"/>
+                <a:cs typeface="微软雅黑" charset="0"/>
+              </a:rPr>
+              <a:t>矩阵</a:t>
+            </a:r>
+            <a:endParaRPr lang="zh-CN" altLang="en-US" sz="1400" b="1">
+              <a:latin typeface="微软雅黑" charset="0"/>
+              <a:ea typeface="微软雅黑" charset="0"/>
+              <a:cs typeface="微软雅黑" charset="0"/>
+            </a:endParaRPr>
+          </a:p>
+        </p:txBody>
+      </p:sp>
+      <p:sp>
+        <p:nvSpPr>
+          <p:cNvPr id="28" name="文本框 27"/>
+          <p:cNvSpPr txBox="1"/>
+          <p:nvPr>
+            <p:custDataLst>
+              <p:tags r:id="rId27"/>
+            </p:custDataLst>
+          </p:nvPr>
+        </p:nvSpPr>
+        <p:spPr>
+          <a:xfrm>
+            <a:off x="6531610" y="5697855"/>
+            <a:ext cx="2035810" cy="402590"/>
+          </a:xfrm>
+          <a:prstGeom prst="rect">
+            <a:avLst/>
+          </a:prstGeom>
+          <a:noFill/>
+        </p:spPr>
+        <p:txBody>
+          <a:bodyPr wrap="square" rtlCol="0">
+            <a:noAutofit/>
+          </a:bodyPr>
+          <a:p>
+            <a:pPr algn="ctr"/>
+            <a:r>
+              <a:rPr lang="zh-CN" altLang="en-US" sz="1400" b="1">
+                <a:latin typeface="微软雅黑" charset="0"/>
+                <a:ea typeface="微软雅黑" charset="0"/>
+                <a:cs typeface="微软雅黑" charset="0"/>
+              </a:rPr>
+              <a:t>对角线为正样本</a:t>
+            </a:r>
+            <a:br>
+              <a:rPr lang="zh-CN" altLang="en-US" sz="1400" b="1">
+                <a:latin typeface="微软雅黑" charset="0"/>
+                <a:ea typeface="微软雅黑" charset="0"/>
+                <a:cs typeface="微软雅黑" charset="0"/>
+              </a:rPr>
+            </a:br>
+            <a:r>
+              <a:rPr lang="zh-CN" altLang="en-US" sz="1400" b="1">
+                <a:latin typeface="微软雅黑" charset="0"/>
+                <a:ea typeface="微软雅黑" charset="0"/>
+                <a:cs typeface="微软雅黑" charset="0"/>
+              </a:rPr>
+              <a:t>计算对比</a:t>
+            </a:r>
+            <a:r>
+              <a:rPr lang="zh-CN" altLang="en-US" sz="1400" b="1">
+                <a:latin typeface="微软雅黑" charset="0"/>
+                <a:ea typeface="微软雅黑" charset="0"/>
+                <a:cs typeface="微软雅黑" charset="0"/>
+              </a:rPr>
+              <a:t>损失</a:t>
+            </a:r>
+            <a:endParaRPr lang="zh-CN" altLang="en-US" sz="1400" b="1">
+              <a:latin typeface="微软雅黑" charset="0"/>
+              <a:ea typeface="微软雅黑" charset="0"/>
+              <a:cs typeface="微软雅黑" charset="0"/>
+            </a:endParaRPr>
+          </a:p>
+        </p:txBody>
+      </p:sp>
+      <p:sp>
+        <p:nvSpPr>
+          <p:cNvPr id="29" name="矩形: 圆角 36"/>
+          <p:cNvSpPr/>
+          <p:nvPr>
+            <p:custDataLst>
+              <p:tags r:id="rId28"/>
+            </p:custDataLst>
+          </p:nvPr>
+        </p:nvSpPr>
+        <p:spPr>
+          <a:xfrm rot="10800000" flipV="1">
+            <a:off x="6450965" y="5668645"/>
+            <a:ext cx="5740400" cy="672465"/>
+          </a:xfrm>
+          <a:prstGeom prst="roundRect">
+            <a:avLst>
+              <a:gd name="adj" fmla="val 10039"/>
+            </a:avLst>
+          </a:prstGeom>
+          <a:noFill/>
+          <a:ln w="38100">
+            <a:solidFill>
+              <a:schemeClr val="tx1"/>
+            </a:solidFill>
+            <a:prstDash val="lgDash"/>
+          </a:ln>
+        </p:spPr>
+        <p:style>
+          <a:lnRef idx="2">
+            <a:schemeClr val="accent1">
+              <a:shade val="15000"/>
+            </a:schemeClr>
+          </a:lnRef>
+          <a:fillRef idx="1">
+            <a:schemeClr val="accent1"/>
+          </a:fillRef>
+          <a:effectRef idx="0">
+            <a:schemeClr val="accent1"/>
+          </a:effectRef>
+          <a:fontRef idx="minor">
+            <a:schemeClr val="lt1"/>
+          </a:fontRef>
+        </p:style>
+        <p:txBody>
+          <a:bodyPr rtlCol="0" anchor="ctr"/>
+          <a:p>
+            <a:pPr algn="ctr"/>
+            <a:endParaRPr lang="zh-CN" altLang="en-US"/>
+          </a:p>
+        </p:txBody>
+      </p:sp>
+    </p:spTree>
+  </p:cSld>
+  <p:clrMapOvr>
+    <a:masterClrMapping/>
+  </p:clrMapOvr>
+</p:sld>
+</file>
+
+<file path=ppt/slides/slide4.xml><?xml version="1.0" encoding="utf-8"?>
+<p:sld xmlns:a="http://schemas.openxmlformats.org/drawingml/2006/main" xmlns:r="http://schemas.openxmlformats.org/officeDocument/2006/relationships" xmlns:p="http://schemas.openxmlformats.org/presentationml/2006/main">
+  <p:cSld>
+    <p:spTree>
+      <p:nvGrpSpPr>
+        <p:cNvPr id="1" name=""/>
+        <p:cNvGrpSpPr/>
+        <p:nvPr/>
+      </p:nvGrpSpPr>
+      <p:grpSpPr/>
+      <p:sp>
+        <p:nvSpPr>
+          <p:cNvPr id="2" name="标题 1"/>
+          <p:cNvSpPr>
+            <a:spLocks noGrp="1"/>
+          </p:cNvSpPr>
+          <p:nvPr>
+            <p:ph type="ctrTitle"/>
+          </p:nvPr>
+        </p:nvSpPr>
+        <p:spPr/>
+        <p:txBody>
+          <a:bodyPr/>
+          <a:p>
+            <a:r>
+              <a:rPr lang="en-US" altLang="zh-CN"/>
+              <a:t>ViLT</a:t>
+            </a:r>
+            <a:endParaRPr lang="en-US" altLang="zh-CN"/>
+          </a:p>
+        </p:txBody>
+      </p:sp>
+      <p:sp>
+        <p:nvSpPr>
+          <p:cNvPr id="3" name="副标题 2"/>
+          <p:cNvSpPr>
+            <a:spLocks noGrp="1"/>
+          </p:cNvSpPr>
+          <p:nvPr>
+            <p:ph type="subTitle" idx="1"/>
+          </p:nvPr>
+        </p:nvSpPr>
+        <p:spPr/>
+        <p:txBody>
+          <a:bodyPr/>
+          <a:p>
+            <a:endParaRPr lang="zh-CN" altLang="en-US"/>
+          </a:p>
+        </p:txBody>
+      </p:sp>
+    </p:spTree>
+  </p:cSld>
+  <p:clrMapOvr>
+    <a:masterClrMapping/>
+  </p:clrMapOvr>
+</p:sld>
+</file>
+
+<file path=ppt/slides/slide5.xml><?xml version="1.0" encoding="utf-8"?>
+<p:sld xmlns:a="http://schemas.openxmlformats.org/drawingml/2006/main" xmlns:r="http://schemas.openxmlformats.org/officeDocument/2006/relationships" xmlns:p="http://schemas.openxmlformats.org/presentationml/2006/main">
+  <p:cSld>
+    <p:spTree>
+      <p:nvGrpSpPr>
+        <p:cNvPr id="1" name=""/>
+        <p:cNvGrpSpPr/>
+        <p:nvPr/>
+      </p:nvGrpSpPr>
+      <p:grpSpPr/>
+      <p:pic>
+        <p:nvPicPr>
+          <p:cNvPr id="5" name="图片 4"/>
+          <p:cNvPicPr>
+            <a:picLocks noChangeAspect="1"/>
+          </p:cNvPicPr>
+          <p:nvPr>
+            <p:custDataLst>
+              <p:tags r:id="rId1"/>
+            </p:custDataLst>
+          </p:nvPr>
+        </p:nvPicPr>
+        <p:blipFill>
+          <a:blip r:embed="rId2"/>
+          <a:stretch>
+            <a:fillRect/>
+          </a:stretch>
+        </p:blipFill>
+        <p:spPr>
+          <a:xfrm>
+            <a:off x="2628265" y="111125"/>
+            <a:ext cx="6936105" cy="2071370"/>
+          </a:xfrm>
+          <a:prstGeom prst="rect">
+            <a:avLst/>
+          </a:prstGeom>
+        </p:spPr>
+      </p:pic>
+      <p:pic>
+        <p:nvPicPr>
+          <p:cNvPr id="6" name="图片 5"/>
+          <p:cNvPicPr>
+            <a:picLocks noChangeAspect="1"/>
+          </p:cNvPicPr>
+          <p:nvPr>
+            <p:custDataLst>
+              <p:tags r:id="rId3"/>
+            </p:custDataLst>
+          </p:nvPr>
+        </p:nvPicPr>
+        <p:blipFill>
+          <a:blip r:embed="rId4"/>
+          <a:stretch>
+            <a:fillRect/>
+          </a:stretch>
+        </p:blipFill>
+        <p:spPr>
+          <a:xfrm>
+            <a:off x="1722755" y="2562225"/>
+            <a:ext cx="8747760" cy="3333750"/>
+          </a:xfrm>
+          <a:prstGeom prst="rect">
+            <a:avLst/>
+          </a:prstGeom>
+        </p:spPr>
+      </p:pic>
+      <p:sp>
+        <p:nvSpPr>
+          <p:cNvPr id="14" name="文本框 13"/>
+          <p:cNvSpPr txBox="1"/>
+          <p:nvPr>
+            <p:custDataLst>
+              <p:tags r:id="rId5"/>
+            </p:custDataLst>
+          </p:nvPr>
+        </p:nvSpPr>
+        <p:spPr>
+          <a:xfrm>
+            <a:off x="3026410" y="5638800"/>
+            <a:ext cx="2477770" cy="916940"/>
+          </a:xfrm>
+          <a:prstGeom prst="rect">
+            <a:avLst/>
+          </a:prstGeom>
+          <a:noFill/>
+        </p:spPr>
+        <p:txBody>
+          <a:bodyPr wrap="square" rtlCol="0">
+            <a:noAutofit/>
+          </a:bodyPr>
+          <a:p>
+            <a:pPr algn="ctr"/>
+            <a:endParaRPr lang="zh-CN" altLang="en-US" sz="1400" b="1">
+              <a:latin typeface="微软雅黑" charset="0"/>
+              <a:ea typeface="微软雅黑" charset="0"/>
+              <a:cs typeface="微软雅黑" charset="0"/>
+            </a:endParaRPr>
+          </a:p>
+        </p:txBody>
+      </p:sp>
+      <p:sp>
+        <p:nvSpPr>
+          <p:cNvPr id="20" name="矩形: 圆角 36"/>
+          <p:cNvSpPr/>
+          <p:nvPr>
+            <p:custDataLst>
+              <p:tags r:id="rId6"/>
+            </p:custDataLst>
+          </p:nvPr>
+        </p:nvSpPr>
+        <p:spPr>
+          <a:xfrm rot="10800000" flipV="1">
+            <a:off x="8179435" y="111125"/>
+            <a:ext cx="1384300" cy="2072005"/>
+          </a:xfrm>
+          <a:prstGeom prst="roundRect">
+            <a:avLst>
+              <a:gd name="adj" fmla="val 10039"/>
+            </a:avLst>
+          </a:prstGeom>
+          <a:noFill/>
+          <a:ln w="38100">
+            <a:solidFill>
+              <a:schemeClr val="tx1"/>
+            </a:solidFill>
+            <a:prstDash val="lgDash"/>
+          </a:ln>
+        </p:spPr>
+        <p:style>
+          <a:lnRef idx="2">
+            <a:schemeClr val="accent1">
+              <a:shade val="15000"/>
+            </a:schemeClr>
+          </a:lnRef>
+          <a:fillRef idx="1">
+            <a:schemeClr val="accent1"/>
+          </a:fillRef>
+          <a:effectRef idx="0">
+            <a:schemeClr val="accent1"/>
+          </a:effectRef>
+          <a:fontRef idx="minor">
+            <a:schemeClr val="lt1"/>
+          </a:fontRef>
+        </p:style>
+        <p:txBody>
+          <a:bodyPr rtlCol="0" anchor="ctr"/>
+          <a:p>
+            <a:pPr algn="ctr"/>
+            <a:endParaRPr lang="zh-CN" altLang="en-US"/>
+          </a:p>
+        </p:txBody>
+      </p:sp>
+      <p:cxnSp>
+        <p:nvCxnSpPr>
+          <p:cNvPr id="23" name="直接连接符 22"/>
+          <p:cNvCxnSpPr/>
+          <p:nvPr>
+            <p:custDataLst>
+              <p:tags r:id="rId7"/>
+            </p:custDataLst>
+          </p:nvPr>
+        </p:nvCxnSpPr>
+        <p:spPr>
+          <a:xfrm flipV="1">
+            <a:off x="1781175" y="2149475"/>
+            <a:ext cx="6417945" cy="412750"/>
+          </a:xfrm>
+          <a:prstGeom prst="line">
+            <a:avLst/>
+          </a:prstGeom>
+          <a:ln w="38100">
+            <a:solidFill>
+              <a:schemeClr val="tx1"/>
+            </a:solidFill>
+          </a:ln>
+        </p:spPr>
+        <p:style>
+          <a:lnRef idx="2">
+            <a:schemeClr val="accent1"/>
+          </a:lnRef>
+          <a:fillRef idx="0">
+            <a:srgbClr val="FFFFFF"/>
+          </a:fillRef>
+          <a:effectRef idx="0">
+            <a:srgbClr val="FFFFFF"/>
+          </a:effectRef>
+          <a:fontRef idx="minor">
+            <a:schemeClr val="tx1"/>
+          </a:fontRef>
+        </p:style>
+      </p:cxnSp>
+      <p:cxnSp>
+        <p:nvCxnSpPr>
+          <p:cNvPr id="7" name="直接连接符 6"/>
+          <p:cNvCxnSpPr/>
+          <p:nvPr>
+            <p:custDataLst>
+              <p:tags r:id="rId8"/>
+            </p:custDataLst>
+          </p:nvPr>
+        </p:nvCxnSpPr>
+        <p:spPr>
+          <a:xfrm flipH="1" flipV="1">
+            <a:off x="9535160" y="2149475"/>
+            <a:ext cx="907415" cy="412750"/>
+          </a:xfrm>
+          <a:prstGeom prst="line">
+            <a:avLst/>
+          </a:prstGeom>
+          <a:ln w="38100">
+            <a:solidFill>
+              <a:schemeClr val="tx1"/>
+            </a:solidFill>
+          </a:ln>
+        </p:spPr>
+        <p:style>
+          <a:lnRef idx="2">
+            <a:schemeClr val="accent1"/>
+          </a:lnRef>
+          <a:fillRef idx="0">
+            <a:srgbClr val="FFFFFF"/>
+          </a:fillRef>
+          <a:effectRef idx="0">
+            <a:srgbClr val="FFFFFF"/>
+          </a:effectRef>
+          <a:fontRef idx="minor">
+            <a:schemeClr val="tx1"/>
+          </a:fontRef>
+        </p:style>
+      </p:cxnSp>
+      <p:sp>
+        <p:nvSpPr>
+          <p:cNvPr id="8" name="文本框 7"/>
+          <p:cNvSpPr txBox="1"/>
+          <p:nvPr>
+            <p:custDataLst>
+              <p:tags r:id="rId9"/>
+            </p:custDataLst>
+          </p:nvPr>
+        </p:nvSpPr>
+        <p:spPr>
+          <a:xfrm>
+            <a:off x="1349375" y="5710555"/>
+            <a:ext cx="4387850" cy="857885"/>
+          </a:xfrm>
+          <a:prstGeom prst="rect">
+            <a:avLst/>
+          </a:prstGeom>
+          <a:noFill/>
+        </p:spPr>
+        <p:txBody>
+          <a:bodyPr wrap="square" rtlCol="0">
+            <a:noAutofit/>
+          </a:bodyPr>
+          <a:p>
+            <a:pPr algn="ctr"/>
+            <a:r>
+              <a:rPr lang="zh-CN" altLang="en-US" sz="1400" b="1">
+                <a:latin typeface="微软雅黑" charset="0"/>
+                <a:ea typeface="微软雅黑" charset="0"/>
+                <a:cs typeface="微软雅黑" charset="0"/>
+              </a:rPr>
+              <a:t>文本模态</a:t>
+            </a:r>
+            <a:br>
+              <a:rPr lang="zh-CN" altLang="en-US" sz="1400" b="1">
+                <a:latin typeface="微软雅黑" charset="0"/>
+                <a:ea typeface="微软雅黑" charset="0"/>
+                <a:cs typeface="微软雅黑" charset="0"/>
+              </a:rPr>
+            </a:br>
+            <a:r>
+              <a:rPr lang="en-US" altLang="zh-CN" sz="1400" b="1">
+                <a:latin typeface="微软雅黑" charset="0"/>
+                <a:ea typeface="微软雅黑" charset="0"/>
+                <a:cs typeface="微软雅黑" charset="0"/>
+              </a:rPr>
+              <a:t>Word Embedding</a:t>
+            </a:r>
+            <a:r>
+              <a:rPr lang="zh-CN" altLang="en-US" sz="1400" b="1">
+                <a:latin typeface="微软雅黑" charset="0"/>
+                <a:ea typeface="微软雅黑" charset="0"/>
+                <a:cs typeface="微软雅黑" charset="0"/>
+              </a:rPr>
+              <a:t>映射为向量</a:t>
+            </a:r>
+            <a:br>
+              <a:rPr lang="zh-CN" altLang="en-US" sz="1400" b="1">
+                <a:latin typeface="微软雅黑" charset="0"/>
+                <a:ea typeface="微软雅黑" charset="0"/>
+                <a:cs typeface="微软雅黑" charset="0"/>
+              </a:rPr>
+            </a:br>
+            <a:r>
+              <a:rPr lang="zh-CN" altLang="en-US" sz="1400" b="1">
+                <a:latin typeface="微软雅黑" charset="0"/>
+                <a:ea typeface="微软雅黑" charset="0"/>
+                <a:cs typeface="微软雅黑" charset="0"/>
+              </a:rPr>
+              <a:t>添加</a:t>
+            </a:r>
+            <a:r>
+              <a:rPr lang="en-US" altLang="zh-CN" sz="1400" b="1">
+                <a:latin typeface="微软雅黑" charset="0"/>
+                <a:ea typeface="微软雅黑" charset="0"/>
+                <a:cs typeface="微软雅黑" charset="0"/>
+              </a:rPr>
+              <a:t>CLS</a:t>
+            </a:r>
+            <a:br>
+              <a:rPr lang="en-US" altLang="zh-CN" sz="1400" b="1">
+                <a:latin typeface="微软雅黑" charset="0"/>
+                <a:ea typeface="微软雅黑" charset="0"/>
+                <a:cs typeface="微软雅黑" charset="0"/>
+              </a:rPr>
+            </a:br>
+            <a:r>
+              <a:rPr lang="zh-CN" altLang="en-US" sz="1400" b="1">
+                <a:latin typeface="微软雅黑" charset="0"/>
+                <a:ea typeface="微软雅黑" charset="0"/>
+                <a:cs typeface="微软雅黑" charset="0"/>
+              </a:rPr>
+              <a:t>对每个向量</a:t>
+            </a:r>
+            <a:r>
+              <a:rPr lang="en-US" altLang="zh-CN" sz="1400" b="1">
+                <a:latin typeface="微软雅黑" charset="0"/>
+                <a:ea typeface="微软雅黑" charset="0"/>
+                <a:cs typeface="微软雅黑" charset="0"/>
+              </a:rPr>
+              <a:t>+0(</a:t>
+            </a:r>
+            <a:r>
+              <a:rPr lang="zh-CN" altLang="en-US" sz="1400" b="1">
+                <a:latin typeface="微软雅黑" charset="0"/>
+                <a:ea typeface="微软雅黑" charset="0"/>
+                <a:cs typeface="微软雅黑" charset="0"/>
+              </a:rPr>
+              <a:t>代表文本</a:t>
+            </a:r>
+            <a:r>
+              <a:rPr lang="en-US" altLang="zh-CN" sz="1400" b="1">
+                <a:latin typeface="微软雅黑" charset="0"/>
+                <a:ea typeface="微软雅黑" charset="0"/>
+                <a:cs typeface="微软雅黑" charset="0"/>
+              </a:rPr>
+              <a:t>)+</a:t>
+            </a:r>
+            <a:r>
+              <a:rPr lang="zh-CN" altLang="en-US" sz="1400" b="1">
+                <a:latin typeface="微软雅黑" charset="0"/>
+                <a:ea typeface="微软雅黑" charset="0"/>
+                <a:cs typeface="微软雅黑" charset="0"/>
+              </a:rPr>
+              <a:t>位置</a:t>
+            </a:r>
+            <a:r>
+              <a:rPr lang="zh-CN" altLang="en-US" sz="1400" b="1">
+                <a:latin typeface="微软雅黑" charset="0"/>
+                <a:ea typeface="微软雅黑" charset="0"/>
+                <a:cs typeface="微软雅黑" charset="0"/>
+              </a:rPr>
+              <a:t>信息</a:t>
+            </a:r>
+            <a:endParaRPr lang="zh-CN" altLang="en-US" sz="1400" b="1">
+              <a:latin typeface="微软雅黑" charset="0"/>
+              <a:ea typeface="微软雅黑" charset="0"/>
+              <a:cs typeface="微软雅黑" charset="0"/>
+            </a:endParaRPr>
+          </a:p>
+        </p:txBody>
+      </p:sp>
+      <p:sp>
+        <p:nvSpPr>
+          <p:cNvPr id="9" name="文本框 8"/>
+          <p:cNvSpPr txBox="1"/>
+          <p:nvPr>
+            <p:custDataLst>
+              <p:tags r:id="rId10"/>
+            </p:custDataLst>
+          </p:nvPr>
+        </p:nvSpPr>
+        <p:spPr>
+          <a:xfrm>
+            <a:off x="5445125" y="5916930"/>
+            <a:ext cx="4387850" cy="857885"/>
+          </a:xfrm>
+          <a:prstGeom prst="rect">
+            <a:avLst/>
+          </a:prstGeom>
+          <a:noFill/>
+        </p:spPr>
+        <p:txBody>
+          <a:bodyPr wrap="square" rtlCol="0">
+            <a:noAutofit/>
+          </a:bodyPr>
+          <a:p>
+            <a:pPr algn="ctr"/>
+            <a:r>
+              <a:rPr lang="zh-CN" altLang="en-US" sz="1400" b="1">
+                <a:latin typeface="微软雅黑" charset="0"/>
+                <a:ea typeface="微软雅黑" charset="0"/>
+                <a:cs typeface="微软雅黑" charset="0"/>
+              </a:rPr>
+              <a:t>图像模态</a:t>
+            </a:r>
+            <a:br>
+              <a:rPr lang="zh-CN" altLang="en-US" sz="1400" b="1">
+                <a:latin typeface="微软雅黑" charset="0"/>
+                <a:ea typeface="微软雅黑" charset="0"/>
+                <a:cs typeface="微软雅黑" charset="0"/>
+              </a:rPr>
+            </a:br>
+            <a:r>
+              <a:rPr lang="zh-CN" altLang="en-US" sz="1400" b="1">
+                <a:latin typeface="微软雅黑" charset="0"/>
+                <a:ea typeface="微软雅黑" charset="0"/>
+                <a:cs typeface="微软雅黑" charset="0"/>
+              </a:rPr>
+              <a:t>图像被划分为</a:t>
+            </a:r>
+            <a:r>
+              <a:rPr lang="en-US" altLang="zh-CN" sz="1400" b="1">
+                <a:latin typeface="微软雅黑" charset="0"/>
+                <a:ea typeface="微软雅黑" charset="0"/>
+                <a:cs typeface="微软雅黑" charset="0"/>
+              </a:rPr>
+              <a:t>patch(32x32)</a:t>
+            </a:r>
+            <a:r>
+              <a:rPr lang="zh-CN" altLang="en-US" sz="1400" b="1">
+                <a:latin typeface="微软雅黑" charset="0"/>
+                <a:ea typeface="微软雅黑" charset="0"/>
+                <a:cs typeface="微软雅黑" charset="0"/>
+              </a:rPr>
+              <a:t>，线性投影映射为向量</a:t>
+            </a:r>
+            <a:endParaRPr lang="en-US" altLang="zh-CN" sz="1400" b="1">
+              <a:latin typeface="微软雅黑" charset="0"/>
+              <a:ea typeface="微软雅黑" charset="0"/>
+              <a:cs typeface="微软雅黑" charset="0"/>
+            </a:endParaRPr>
+          </a:p>
+          <a:p>
+            <a:pPr algn="ctr"/>
+            <a:r>
+              <a:rPr lang="zh-CN" altLang="en-US" sz="1400" b="1">
+                <a:latin typeface="微软雅黑" charset="0"/>
+                <a:ea typeface="微软雅黑" charset="0"/>
+                <a:cs typeface="微软雅黑" charset="0"/>
+              </a:rPr>
+              <a:t>添加</a:t>
+            </a:r>
+            <a:r>
+              <a:rPr lang="en-US" altLang="zh-CN" sz="1400" b="1">
+                <a:latin typeface="微软雅黑" charset="0"/>
+                <a:ea typeface="微软雅黑" charset="0"/>
+                <a:cs typeface="微软雅黑" charset="0"/>
+              </a:rPr>
+              <a:t>CLS</a:t>
+            </a:r>
+            <a:r>
+              <a:rPr lang="zh-CN" altLang="en-US" sz="1400" b="1">
+                <a:latin typeface="微软雅黑" charset="0"/>
+                <a:ea typeface="微软雅黑" charset="0"/>
+                <a:cs typeface="微软雅黑" charset="0"/>
+              </a:rPr>
+              <a:t>，同时对每个向量</a:t>
+            </a:r>
+            <a:r>
+              <a:rPr lang="en-US" altLang="zh-CN" sz="1400" b="1">
+                <a:latin typeface="微软雅黑" charset="0"/>
+                <a:ea typeface="微软雅黑" charset="0"/>
+                <a:cs typeface="微软雅黑" charset="0"/>
+              </a:rPr>
+              <a:t>+1(</a:t>
+            </a:r>
+            <a:r>
+              <a:rPr lang="zh-CN" altLang="en-US" sz="1400" b="1">
+                <a:latin typeface="微软雅黑" charset="0"/>
+                <a:ea typeface="微软雅黑" charset="0"/>
+                <a:cs typeface="微软雅黑" charset="0"/>
+              </a:rPr>
+              <a:t>代表图像</a:t>
+            </a:r>
+            <a:r>
+              <a:rPr lang="en-US" altLang="zh-CN" sz="1400" b="1">
+                <a:latin typeface="微软雅黑" charset="0"/>
+                <a:ea typeface="微软雅黑" charset="0"/>
+                <a:cs typeface="微软雅黑" charset="0"/>
+              </a:rPr>
+              <a:t>)+</a:t>
+            </a:r>
+            <a:r>
+              <a:rPr lang="zh-CN" altLang="en-US" sz="1400" b="1">
+                <a:latin typeface="微软雅黑" charset="0"/>
+                <a:ea typeface="微软雅黑" charset="0"/>
+                <a:cs typeface="微软雅黑" charset="0"/>
+              </a:rPr>
+              <a:t>位置</a:t>
+            </a:r>
+            <a:r>
+              <a:rPr lang="zh-CN" altLang="en-US" sz="1400" b="1">
+                <a:latin typeface="微软雅黑" charset="0"/>
+                <a:ea typeface="微软雅黑" charset="0"/>
+                <a:cs typeface="微软雅黑" charset="0"/>
+              </a:rPr>
+              <a:t>信息</a:t>
+            </a:r>
+            <a:endParaRPr lang="zh-CN" altLang="en-US" sz="1400" b="1">
+              <a:latin typeface="微软雅黑" charset="0"/>
+              <a:ea typeface="微软雅黑" charset="0"/>
+              <a:cs typeface="微软雅黑" charset="0"/>
+            </a:endParaRPr>
+          </a:p>
+        </p:txBody>
+      </p:sp>
+      <p:sp>
+        <p:nvSpPr>
+          <p:cNvPr id="15" name="矩形: 圆角 36"/>
+          <p:cNvSpPr/>
+          <p:nvPr>
+            <p:custDataLst>
+              <p:tags r:id="rId11"/>
+            </p:custDataLst>
+          </p:nvPr>
+        </p:nvSpPr>
+        <p:spPr>
+          <a:xfrm rot="10800000" flipV="1">
+            <a:off x="1723390" y="4271010"/>
+            <a:ext cx="3347720" cy="2376805"/>
+          </a:xfrm>
+          <a:prstGeom prst="roundRect">
+            <a:avLst>
+              <a:gd name="adj" fmla="val 10039"/>
+            </a:avLst>
+          </a:prstGeom>
+          <a:noFill/>
+          <a:ln w="38100">
+            <a:solidFill>
+              <a:schemeClr val="tx1"/>
+            </a:solidFill>
+            <a:prstDash val="lgDash"/>
+          </a:ln>
+        </p:spPr>
+        <p:style>
+          <a:lnRef idx="2">
+            <a:schemeClr val="accent1">
+              <a:shade val="15000"/>
+            </a:schemeClr>
+          </a:lnRef>
+          <a:fillRef idx="1">
+            <a:schemeClr val="accent1"/>
+          </a:fillRef>
+          <a:effectRef idx="0">
+            <a:schemeClr val="accent1"/>
+          </a:effectRef>
+          <a:fontRef idx="minor">
+            <a:schemeClr val="lt1"/>
+          </a:fontRef>
+        </p:style>
+        <p:txBody>
+          <a:bodyPr rtlCol="0" anchor="ctr"/>
+          <a:p>
+            <a:pPr algn="ctr"/>
+            <a:endParaRPr lang="zh-CN" altLang="en-US"/>
+          </a:p>
+        </p:txBody>
+      </p:sp>
+      <p:sp>
+        <p:nvSpPr>
+          <p:cNvPr id="10" name="矩形: 圆角 36"/>
+          <p:cNvSpPr/>
+          <p:nvPr>
+            <p:custDataLst>
+              <p:tags r:id="rId12"/>
+            </p:custDataLst>
+          </p:nvPr>
+        </p:nvSpPr>
+        <p:spPr>
+          <a:xfrm rot="10800000" flipV="1">
+            <a:off x="5150485" y="4191635"/>
+            <a:ext cx="5320030" cy="2456180"/>
+          </a:xfrm>
+          <a:prstGeom prst="roundRect">
+            <a:avLst>
+              <a:gd name="adj" fmla="val 10039"/>
+            </a:avLst>
+          </a:prstGeom>
+          <a:noFill/>
+          <a:ln w="38100">
+            <a:solidFill>
+              <a:schemeClr val="tx1"/>
+            </a:solidFill>
+            <a:prstDash val="lgDash"/>
+          </a:ln>
+        </p:spPr>
+        <p:style>
+          <a:lnRef idx="2">
+            <a:schemeClr val="accent1">
+              <a:shade val="15000"/>
+            </a:schemeClr>
+          </a:lnRef>
+          <a:fillRef idx="1">
+            <a:schemeClr val="accent1"/>
+          </a:fillRef>
+          <a:effectRef idx="0">
+            <a:schemeClr val="accent1"/>
+          </a:effectRef>
+          <a:fontRef idx="minor">
+            <a:schemeClr val="lt1"/>
+          </a:fontRef>
+        </p:style>
+        <p:txBody>
+          <a:bodyPr rtlCol="0" anchor="ctr"/>
+          <a:p>
+            <a:pPr algn="ctr"/>
+            <a:endParaRPr lang="zh-CN" altLang="en-US"/>
+          </a:p>
+        </p:txBody>
+      </p:sp>
+    </p:spTree>
+  </p:cSld>
+  <p:clrMapOvr>
+    <a:masterClrMapping/>
+  </p:clrMapOvr>
+</p:sld>
+</file>
+
+<file path=ppt/slides/slide6.xml><?xml version="1.0" encoding="utf-8"?>
+<p:sld xmlns:a="http://schemas.openxmlformats.org/drawingml/2006/main" xmlns:r="http://schemas.openxmlformats.org/officeDocument/2006/relationships" xmlns:p="http://schemas.openxmlformats.org/presentationml/2006/main">
+  <p:cSld>
+    <p:spTree>
+      <p:nvGrpSpPr>
+        <p:cNvPr id="1" name=""/>
+        <p:cNvGrpSpPr/>
+        <p:nvPr/>
+      </p:nvGrpSpPr>
+      <p:grpSpPr/>
+      <p:pic>
+        <p:nvPicPr>
+          <p:cNvPr id="4" name="图片 3"/>
+          <p:cNvPicPr>
+            <a:picLocks noChangeAspect="1"/>
+          </p:cNvPicPr>
+          <p:nvPr>
+            <p:custDataLst>
+              <p:tags r:id="rId1"/>
+            </p:custDataLst>
+          </p:nvPr>
+        </p:nvPicPr>
+        <p:blipFill>
+          <a:blip r:embed="rId2"/>
+          <a:stretch>
+            <a:fillRect/>
+          </a:stretch>
+        </p:blipFill>
+        <p:spPr>
+          <a:xfrm>
+            <a:off x="-17145" y="71120"/>
+            <a:ext cx="6548755" cy="6325870"/>
+          </a:xfrm>
+          <a:prstGeom prst="rect">
+            <a:avLst/>
+          </a:prstGeom>
+        </p:spPr>
+      </p:pic>
+      <p:sp>
+        <p:nvSpPr>
+          <p:cNvPr id="14" name="文本框 13"/>
+          <p:cNvSpPr txBox="1"/>
+          <p:nvPr>
+            <p:custDataLst>
+              <p:tags r:id="rId3"/>
+            </p:custDataLst>
+          </p:nvPr>
+        </p:nvSpPr>
+        <p:spPr>
+          <a:xfrm>
+            <a:off x="6062345" y="893445"/>
+            <a:ext cx="5577840" cy="603250"/>
+          </a:xfrm>
+          <a:prstGeom prst="rect">
+            <a:avLst/>
+          </a:prstGeom>
+          <a:noFill/>
+        </p:spPr>
+        <p:txBody>
+          <a:bodyPr wrap="square" rtlCol="0">
+            <a:noAutofit/>
+          </a:bodyPr>
+          <a:p>
+            <a:pPr algn="ctr"/>
+            <a:r>
+              <a:rPr lang="zh-CN" altLang="en-US" sz="1400" b="1">
+                <a:latin typeface="微软雅黑" charset="0"/>
+                <a:ea typeface="微软雅黑" charset="0"/>
+                <a:cs typeface="微软雅黑" charset="0"/>
+              </a:rPr>
+              <a:t>前期工作都是对图像模态使用</a:t>
+            </a:r>
+            <a:r>
+              <a:rPr lang="en-US" altLang="zh-CN" sz="1400" b="1">
+                <a:latin typeface="微软雅黑" charset="0"/>
+                <a:ea typeface="微软雅黑" charset="0"/>
+                <a:cs typeface="微软雅黑" charset="0"/>
+              </a:rPr>
+              <a:t>CNN</a:t>
+            </a:r>
+            <a:r>
+              <a:rPr lang="zh-CN" altLang="en-US" sz="1400" b="1">
+                <a:latin typeface="微软雅黑" charset="0"/>
+                <a:ea typeface="微软雅黑" charset="0"/>
+                <a:cs typeface="微软雅黑" charset="0"/>
+              </a:rPr>
+              <a:t>提取并通过目标检测提取主体，消耗资源</a:t>
+            </a:r>
+            <a:r>
+              <a:rPr lang="zh-CN" altLang="en-US" sz="1400" b="1">
+                <a:latin typeface="微软雅黑" charset="0"/>
+                <a:ea typeface="微软雅黑" charset="0"/>
+                <a:cs typeface="微软雅黑" charset="0"/>
+              </a:rPr>
+              <a:t>多</a:t>
+            </a:r>
+            <a:endParaRPr lang="zh-CN" altLang="en-US" sz="1400" b="1">
+              <a:latin typeface="微软雅黑" charset="0"/>
+              <a:ea typeface="微软雅黑" charset="0"/>
+              <a:cs typeface="微软雅黑" charset="0"/>
+            </a:endParaRPr>
+          </a:p>
+        </p:txBody>
+      </p:sp>
+      <p:sp>
+        <p:nvSpPr>
+          <p:cNvPr id="5" name="文本框 4"/>
+          <p:cNvSpPr txBox="1"/>
+          <p:nvPr>
+            <p:custDataLst>
+              <p:tags r:id="rId4"/>
+            </p:custDataLst>
+          </p:nvPr>
+        </p:nvSpPr>
+        <p:spPr>
+          <a:xfrm>
+            <a:off x="5017770" y="1595755"/>
+            <a:ext cx="5577840" cy="603250"/>
+          </a:xfrm>
+          <a:prstGeom prst="rect">
+            <a:avLst/>
+          </a:prstGeom>
+          <a:noFill/>
+        </p:spPr>
+        <p:txBody>
+          <a:bodyPr wrap="square" rtlCol="0">
+            <a:noAutofit/>
+          </a:bodyPr>
+          <a:p>
+            <a:pPr algn="ctr"/>
+            <a:r>
+              <a:rPr lang="en-US" altLang="zh-CN" sz="1400" b="1">
+                <a:latin typeface="微软雅黑" charset="0"/>
+                <a:ea typeface="微软雅黑" charset="0"/>
+                <a:cs typeface="微软雅黑" charset="0"/>
+              </a:rPr>
+              <a:t>Pixel-BERT</a:t>
+            </a:r>
+            <a:r>
+              <a:rPr lang="zh-CN" altLang="en-US" sz="1400" b="1">
+                <a:latin typeface="微软雅黑" charset="0"/>
+                <a:ea typeface="微软雅黑" charset="0"/>
+                <a:cs typeface="微软雅黑" charset="0"/>
+              </a:rPr>
+              <a:t>仅对图像模态使用</a:t>
+            </a:r>
+            <a:r>
+              <a:rPr lang="en-US" altLang="zh-CN" sz="1400" b="1">
+                <a:latin typeface="微软雅黑" charset="0"/>
+                <a:ea typeface="微软雅黑" charset="0"/>
+                <a:cs typeface="微软雅黑" charset="0"/>
+              </a:rPr>
+              <a:t>CNN</a:t>
+            </a:r>
+            <a:r>
+              <a:rPr lang="zh-CN" altLang="en-US" sz="1400" b="1">
+                <a:latin typeface="微软雅黑" charset="0"/>
+                <a:ea typeface="微软雅黑" charset="0"/>
+                <a:cs typeface="微软雅黑" charset="0"/>
+              </a:rPr>
+              <a:t>提取</a:t>
+            </a:r>
+            <a:endParaRPr lang="zh-CN" altLang="en-US" sz="1400" b="1">
+              <a:latin typeface="微软雅黑" charset="0"/>
+              <a:ea typeface="微软雅黑" charset="0"/>
+              <a:cs typeface="微软雅黑" charset="0"/>
+            </a:endParaRPr>
+          </a:p>
+        </p:txBody>
+      </p:sp>
+      <p:sp>
+        <p:nvSpPr>
+          <p:cNvPr id="6" name="文本框 5"/>
+          <p:cNvSpPr txBox="1"/>
+          <p:nvPr>
+            <p:custDataLst>
+              <p:tags r:id="rId5"/>
+            </p:custDataLst>
+          </p:nvPr>
+        </p:nvSpPr>
+        <p:spPr>
+          <a:xfrm>
+            <a:off x="4650740" y="2298065"/>
+            <a:ext cx="5577840" cy="603250"/>
+          </a:xfrm>
+          <a:prstGeom prst="rect">
+            <a:avLst/>
+          </a:prstGeom>
+          <a:noFill/>
+        </p:spPr>
+        <p:txBody>
+          <a:bodyPr wrap="square" rtlCol="0">
+            <a:noAutofit/>
+          </a:bodyPr>
+          <a:p>
+            <a:pPr algn="ctr"/>
+            <a:r>
+              <a:rPr lang="zh-CN" altLang="en-US" sz="1400" b="1">
+                <a:latin typeface="微软雅黑" charset="0"/>
+                <a:ea typeface="微软雅黑" charset="0"/>
+                <a:cs typeface="微软雅黑" charset="0"/>
+              </a:rPr>
+              <a:t>仅对图像模态使用线性</a:t>
+            </a:r>
+            <a:r>
+              <a:rPr lang="zh-CN" altLang="en-US" sz="1400" b="1">
+                <a:latin typeface="微软雅黑" charset="0"/>
+                <a:ea typeface="微软雅黑" charset="0"/>
+                <a:cs typeface="微软雅黑" charset="0"/>
+              </a:rPr>
+              <a:t>层提取</a:t>
+            </a:r>
+            <a:endParaRPr lang="zh-CN" altLang="en-US" sz="1400" b="1">
+              <a:latin typeface="微软雅黑" charset="0"/>
+              <a:ea typeface="微软雅黑" charset="0"/>
+              <a:cs typeface="微软雅黑" charset="0"/>
+            </a:endParaRPr>
+          </a:p>
+        </p:txBody>
+      </p:sp>
+      <p:sp>
+        <p:nvSpPr>
+          <p:cNvPr id="7" name="文本框 6"/>
+          <p:cNvSpPr txBox="1"/>
+          <p:nvPr>
+            <p:custDataLst>
+              <p:tags r:id="rId6"/>
+            </p:custDataLst>
+          </p:nvPr>
+        </p:nvSpPr>
+        <p:spPr>
+          <a:xfrm>
+            <a:off x="4650740" y="3127375"/>
+            <a:ext cx="5577840" cy="603250"/>
+          </a:xfrm>
+          <a:prstGeom prst="rect">
+            <a:avLst/>
+          </a:prstGeom>
+          <a:noFill/>
+        </p:spPr>
+        <p:txBody>
+          <a:bodyPr wrap="square" rtlCol="0">
+            <a:noAutofit/>
+          </a:bodyPr>
+          <a:p>
+            <a:pPr algn="ctr"/>
+            <a:r>
+              <a:rPr lang="zh-CN" altLang="en-US" sz="1400" b="1">
+                <a:latin typeface="微软雅黑" charset="0"/>
+                <a:ea typeface="微软雅黑" charset="0"/>
+                <a:cs typeface="微软雅黑" charset="0"/>
+              </a:rPr>
+              <a:t>文本模态</a:t>
+            </a:r>
+            <a:r>
+              <a:rPr lang="zh-CN" altLang="en-US" sz="1400" b="1">
+                <a:latin typeface="微软雅黑" charset="0"/>
+                <a:ea typeface="微软雅黑" charset="0"/>
+                <a:cs typeface="微软雅黑" charset="0"/>
+              </a:rPr>
+              <a:t>都使用线性</a:t>
+            </a:r>
+            <a:r>
+              <a:rPr lang="zh-CN" altLang="en-US" sz="1400" b="1">
+                <a:latin typeface="微软雅黑" charset="0"/>
+                <a:ea typeface="微软雅黑" charset="0"/>
+                <a:cs typeface="微软雅黑" charset="0"/>
+              </a:rPr>
+              <a:t>层提取</a:t>
+            </a:r>
+            <a:endParaRPr lang="zh-CN" altLang="en-US" sz="1400" b="1">
+              <a:latin typeface="微软雅黑" charset="0"/>
+              <a:ea typeface="微软雅黑" charset="0"/>
+              <a:cs typeface="微软雅黑" charset="0"/>
+            </a:endParaRPr>
+          </a:p>
+        </p:txBody>
+      </p:sp>
+      <p:sp>
+        <p:nvSpPr>
+          <p:cNvPr id="8" name="文本框 7"/>
+          <p:cNvSpPr txBox="1"/>
+          <p:nvPr>
+            <p:custDataLst>
+              <p:tags r:id="rId7"/>
+            </p:custDataLst>
+          </p:nvPr>
+        </p:nvSpPr>
+        <p:spPr>
+          <a:xfrm>
+            <a:off x="5190490" y="4425315"/>
+            <a:ext cx="5577840" cy="603250"/>
+          </a:xfrm>
+          <a:prstGeom prst="rect">
+            <a:avLst/>
+          </a:prstGeom>
+          <a:noFill/>
+        </p:spPr>
+        <p:txBody>
+          <a:bodyPr wrap="square" rtlCol="0">
+            <a:noAutofit/>
+          </a:bodyPr>
+          <a:p>
+            <a:pPr algn="ctr"/>
+            <a:r>
+              <a:rPr lang="zh-CN" altLang="en-US" sz="1400" b="1">
+                <a:latin typeface="微软雅黑" charset="0"/>
+                <a:ea typeface="微软雅黑" charset="0"/>
+                <a:cs typeface="微软雅黑" charset="0"/>
+              </a:rPr>
+              <a:t>对于图像部分的计算资源</a:t>
+            </a:r>
+            <a:r>
+              <a:rPr lang="zh-CN" altLang="en-US" sz="1400" b="1">
+                <a:latin typeface="微软雅黑" charset="0"/>
+                <a:ea typeface="微软雅黑" charset="0"/>
+                <a:cs typeface="微软雅黑" charset="0"/>
+              </a:rPr>
+              <a:t>过多</a:t>
+            </a:r>
+            <a:endParaRPr lang="zh-CN" altLang="en-US" sz="1400" b="1">
+              <a:latin typeface="微软雅黑" charset="0"/>
+              <a:ea typeface="微软雅黑" charset="0"/>
+              <a:cs typeface="微软雅黑" charset="0"/>
+            </a:endParaRPr>
+          </a:p>
+        </p:txBody>
+      </p:sp>
     </p:spTree>
   </p:cSld>
   <p:clrMapOvr>
@@ -5123,13 +6463,145 @@
 </p:tagLst>
 </file>
 
+<file path=ppt/tags/tag24.xml><?xml version="1.0" encoding="utf-8"?>
+<p:tagLst xmlns:p="http://schemas.openxmlformats.org/presentationml/2006/main">
+  <p:tag name="KSO_WM_BEAUTIFY_FLAG" val=""/>
+</p:tagLst>
+</file>
+
+<file path=ppt/tags/tag25.xml><?xml version="1.0" encoding="utf-8"?>
+<p:tagLst xmlns:p="http://schemas.openxmlformats.org/presentationml/2006/main">
+  <p:tag name="KSO_WM_BEAUTIFY_FLAG" val=""/>
+</p:tagLst>
+</file>
+
+<file path=ppt/tags/tag26.xml><?xml version="1.0" encoding="utf-8"?>
+<p:tagLst xmlns:p="http://schemas.openxmlformats.org/presentationml/2006/main">
+  <p:tag name="KSO_WM_BEAUTIFY_FLAG" val=""/>
+</p:tagLst>
+</file>
+
+<file path=ppt/tags/tag27.xml><?xml version="1.0" encoding="utf-8"?>
+<p:tagLst xmlns:p="http://schemas.openxmlformats.org/presentationml/2006/main">
+  <p:tag name="KSO_WM_BEAUTIFY_FLAG" val=""/>
+</p:tagLst>
+</file>
+
+<file path=ppt/tags/tag28.xml><?xml version="1.0" encoding="utf-8"?>
+<p:tagLst xmlns:p="http://schemas.openxmlformats.org/presentationml/2006/main">
+  <p:tag name="KSO_WM_BEAUTIFY_FLAG" val=""/>
+</p:tagLst>
+</file>
+
+<file path=ppt/tags/tag29.xml><?xml version="1.0" encoding="utf-8"?>
+<p:tagLst xmlns:p="http://schemas.openxmlformats.org/presentationml/2006/main">
+  <p:tag name="KSO_WM_BEAUTIFY_FLAG" val=""/>
+</p:tagLst>
+</file>
+
 <file path=ppt/tags/tag3.xml><?xml version="1.0" encoding="utf-8"?>
 <p:tagLst xmlns:p="http://schemas.openxmlformats.org/presentationml/2006/main">
   <p:tag name="KSO_WM_BEAUTIFY_FLAG" val=""/>
 </p:tagLst>
 </file>
 
+<file path=ppt/tags/tag30.xml><?xml version="1.0" encoding="utf-8"?>
+<p:tagLst xmlns:p="http://schemas.openxmlformats.org/presentationml/2006/main">
+  <p:tag name="KSO_WM_BEAUTIFY_FLAG" val=""/>
+</p:tagLst>
+</file>
+
+<file path=ppt/tags/tag31.xml><?xml version="1.0" encoding="utf-8"?>
+<p:tagLst xmlns:p="http://schemas.openxmlformats.org/presentationml/2006/main">
+  <p:tag name="KSO_WM_BEAUTIFY_FLAG" val=""/>
+</p:tagLst>
+</file>
+
+<file path=ppt/tags/tag32.xml><?xml version="1.0" encoding="utf-8"?>
+<p:tagLst xmlns:p="http://schemas.openxmlformats.org/presentationml/2006/main">
+  <p:tag name="KSO_WM_BEAUTIFY_FLAG" val=""/>
+</p:tagLst>
+</file>
+
+<file path=ppt/tags/tag33.xml><?xml version="1.0" encoding="utf-8"?>
+<p:tagLst xmlns:p="http://schemas.openxmlformats.org/presentationml/2006/main">
+  <p:tag name="KSO_WM_BEAUTIFY_FLAG" val=""/>
+</p:tagLst>
+</file>
+
+<file path=ppt/tags/tag34.xml><?xml version="1.0" encoding="utf-8"?>
+<p:tagLst xmlns:p="http://schemas.openxmlformats.org/presentationml/2006/main">
+  <p:tag name="KSO_WM_BEAUTIFY_FLAG" val=""/>
+</p:tagLst>
+</file>
+
+<file path=ppt/tags/tag35.xml><?xml version="1.0" encoding="utf-8"?>
+<p:tagLst xmlns:p="http://schemas.openxmlformats.org/presentationml/2006/main">
+  <p:tag name="KSO_WM_BEAUTIFY_FLAG" val=""/>
+</p:tagLst>
+</file>
+
+<file path=ppt/tags/tag36.xml><?xml version="1.0" encoding="utf-8"?>
+<p:tagLst xmlns:p="http://schemas.openxmlformats.org/presentationml/2006/main">
+  <p:tag name="KSO_WM_BEAUTIFY_FLAG" val=""/>
+</p:tagLst>
+</file>
+
+<file path=ppt/tags/tag37.xml><?xml version="1.0" encoding="utf-8"?>
+<p:tagLst xmlns:p="http://schemas.openxmlformats.org/presentationml/2006/main">
+  <p:tag name="KSO_WM_BEAUTIFY_FLAG" val=""/>
+</p:tagLst>
+</file>
+
+<file path=ppt/tags/tag38.xml><?xml version="1.0" encoding="utf-8"?>
+<p:tagLst xmlns:p="http://schemas.openxmlformats.org/presentationml/2006/main">
+  <p:tag name="KSO_WM_BEAUTIFY_FLAG" val=""/>
+</p:tagLst>
+</file>
+
+<file path=ppt/tags/tag39.xml><?xml version="1.0" encoding="utf-8"?>
+<p:tagLst xmlns:p="http://schemas.openxmlformats.org/presentationml/2006/main">
+  <p:tag name="KSO_WM_BEAUTIFY_FLAG" val=""/>
+</p:tagLst>
+</file>
+
 <file path=ppt/tags/tag4.xml><?xml version="1.0" encoding="utf-8"?>
+<p:tagLst xmlns:p="http://schemas.openxmlformats.org/presentationml/2006/main">
+  <p:tag name="KSO_WM_BEAUTIFY_FLAG" val=""/>
+</p:tagLst>
+</file>
+
+<file path=ppt/tags/tag40.xml><?xml version="1.0" encoding="utf-8"?>
+<p:tagLst xmlns:p="http://schemas.openxmlformats.org/presentationml/2006/main">
+  <p:tag name="KSO_WM_BEAUTIFY_FLAG" val=""/>
+</p:tagLst>
+</file>
+
+<file path=ppt/tags/tag41.xml><?xml version="1.0" encoding="utf-8"?>
+<p:tagLst xmlns:p="http://schemas.openxmlformats.org/presentationml/2006/main">
+  <p:tag name="KSO_WM_BEAUTIFY_FLAG" val=""/>
+</p:tagLst>
+</file>
+
+<file path=ppt/tags/tag42.xml><?xml version="1.0" encoding="utf-8"?>
+<p:tagLst xmlns:p="http://schemas.openxmlformats.org/presentationml/2006/main">
+  <p:tag name="KSO_WM_BEAUTIFY_FLAG" val=""/>
+</p:tagLst>
+</file>
+
+<file path=ppt/tags/tag43.xml><?xml version="1.0" encoding="utf-8"?>
+<p:tagLst xmlns:p="http://schemas.openxmlformats.org/presentationml/2006/main">
+  <p:tag name="KSO_WM_BEAUTIFY_FLAG" val=""/>
+</p:tagLst>
+</file>
+
+<file path=ppt/tags/tag44.xml><?xml version="1.0" encoding="utf-8"?>
+<p:tagLst xmlns:p="http://schemas.openxmlformats.org/presentationml/2006/main">
+  <p:tag name="KSO_WM_BEAUTIFY_FLAG" val=""/>
+</p:tagLst>
+</file>
+
+<file path=ppt/tags/tag45.xml><?xml version="1.0" encoding="utf-8"?>
 <p:tagLst xmlns:p="http://schemas.openxmlformats.org/presentationml/2006/main">
   <p:tag name="KSO_WM_BEAUTIFY_FLAG" val=""/>
 </p:tagLst>

</xml_diff>

<commit_message>
update_Align before Fuse: Vision and Language Representation Learning with Momentum Distillation
</commit_message>
<xml_diff>
--- a/Base_Model/VLM+VLLM/论文插图.pptx
+++ b/Base_Model/VLM+VLLM/论文插图.pptx
@@ -8,7 +8,7 @@
     <p:notesMasterId r:id="rId4"/>
   </p:notesMasterIdLst>
   <p:handoutMasterIdLst>
-    <p:handoutMasterId r:id="rId10"/>
+    <p:handoutMasterId r:id="rId12"/>
   </p:handoutMasterIdLst>
   <p:sldIdLst>
     <p:sldId id="256" r:id="rId3"/>
@@ -17,6 +17,8 @@
     <p:sldId id="259" r:id="rId7"/>
     <p:sldId id="260" r:id="rId8"/>
     <p:sldId id="261" r:id="rId9"/>
+    <p:sldId id="262" r:id="rId10"/>
+    <p:sldId id="263" r:id="rId11"/>
   </p:sldIdLst>
   <p:sldSz cx="12192000" cy="6858000"/>
   <p:notesSz cx="7103745" cy="10234295"/>
@@ -5643,7 +5645,7 @@
         </p:nvSpPr>
         <p:spPr>
           <a:xfrm>
-            <a:off x="1349375" y="5710555"/>
+            <a:off x="1444625" y="5853430"/>
             <a:ext cx="4387850" cy="857885"/>
           </a:xfrm>
           <a:prstGeom prst="rect">
@@ -5786,7 +5788,7 @@
         </p:nvSpPr>
         <p:spPr>
           <a:xfrm>
-            <a:off x="5445125" y="5916930"/>
+            <a:off x="5651500" y="6012180"/>
             <a:ext cx="4387850" cy="857885"/>
           </a:xfrm>
           <a:prstGeom prst="rect">
@@ -5932,7 +5934,7 @@
         <p:spPr>
           <a:xfrm rot="10800000" flipV="1">
             <a:off x="1723390" y="4271010"/>
-            <a:ext cx="3347720" cy="2376805"/>
+            <a:ext cx="3721735" cy="2504440"/>
           </a:xfrm>
           <a:prstGeom prst="roundRect">
             <a:avLst>
@@ -5983,8 +5985,8 @@
         </p:nvSpPr>
         <p:spPr>
           <a:xfrm rot="10800000" flipV="1">
-            <a:off x="5150485" y="4191635"/>
-            <a:ext cx="5320030" cy="2456180"/>
+            <a:off x="5504180" y="4270375"/>
+            <a:ext cx="4966335" cy="2504440"/>
           </a:xfrm>
           <a:prstGeom prst="roundRect">
             <a:avLst>
@@ -6020,6 +6022,748 @@
           <a:p>
             <a:pPr algn="ctr"/>
             <a:endParaRPr lang="zh-CN" altLang="en-US"/>
+          </a:p>
+        </p:txBody>
+      </p:sp>
+      <p:sp>
+        <p:nvSpPr>
+          <p:cNvPr id="11" name="矩形: 圆角 36"/>
+          <p:cNvSpPr/>
+          <p:nvPr>
+            <p:custDataLst>
+              <p:tags r:id="rId13"/>
+            </p:custDataLst>
+          </p:nvPr>
+        </p:nvSpPr>
+        <p:spPr>
+          <a:xfrm rot="10800000" flipV="1">
+            <a:off x="-635" y="3428365"/>
+            <a:ext cx="8503920" cy="789940"/>
+          </a:xfrm>
+          <a:prstGeom prst="roundRect">
+            <a:avLst>
+              <a:gd name="adj" fmla="val 10039"/>
+            </a:avLst>
+          </a:prstGeom>
+          <a:noFill/>
+          <a:ln w="38100">
+            <a:solidFill>
+              <a:schemeClr val="tx1"/>
+            </a:solidFill>
+            <a:prstDash val="lgDash"/>
+          </a:ln>
+        </p:spPr>
+        <p:style>
+          <a:lnRef idx="2">
+            <a:schemeClr val="accent1">
+              <a:shade val="15000"/>
+            </a:schemeClr>
+          </a:lnRef>
+          <a:fillRef idx="1">
+            <a:schemeClr val="accent1"/>
+          </a:fillRef>
+          <a:effectRef idx="0">
+            <a:schemeClr val="accent1"/>
+          </a:effectRef>
+          <a:fontRef idx="minor">
+            <a:schemeClr val="lt1"/>
+          </a:fontRef>
+        </p:style>
+        <p:txBody>
+          <a:bodyPr rtlCol="0" anchor="ctr"/>
+          <a:p>
+            <a:pPr algn="ctr"/>
+            <a:endParaRPr lang="zh-CN" altLang="en-US"/>
+          </a:p>
+        </p:txBody>
+      </p:sp>
+      <p:sp>
+        <p:nvSpPr>
+          <p:cNvPr id="12" name="文本框 11"/>
+          <p:cNvSpPr txBox="1"/>
+          <p:nvPr>
+            <p:custDataLst>
+              <p:tags r:id="rId14"/>
+            </p:custDataLst>
+          </p:nvPr>
+        </p:nvSpPr>
+        <p:spPr>
+          <a:xfrm>
+            <a:off x="0" y="3428365"/>
+            <a:ext cx="2397760" cy="857885"/>
+          </a:xfrm>
+          <a:prstGeom prst="rect">
+            <a:avLst/>
+          </a:prstGeom>
+          <a:noFill/>
+        </p:spPr>
+        <p:txBody>
+          <a:bodyPr wrap="square" rtlCol="0">
+            <a:noAutofit/>
+          </a:bodyPr>
+          <a:p>
+            <a:pPr algn="ctr"/>
+            <a:r>
+              <a:rPr lang="en-US" altLang="zh-CN" sz="1400" b="1">
+                <a:latin typeface="微软雅黑" charset="0"/>
+                <a:ea typeface="微软雅黑" charset="0"/>
+                <a:cs typeface="微软雅黑" charset="0"/>
+              </a:rPr>
+              <a:t>ViT-Encoder</a:t>
+            </a:r>
+            <a:br>
+              <a:rPr lang="zh-CN" altLang="en-US" sz="1400" b="1">
+                <a:latin typeface="微软雅黑" charset="0"/>
+                <a:ea typeface="微软雅黑" charset="0"/>
+                <a:cs typeface="微软雅黑" charset="0"/>
+              </a:rPr>
+            </a:br>
+            <a:r>
+              <a:rPr lang="zh-CN" altLang="en-US" sz="1400" b="1">
+                <a:latin typeface="微软雅黑" charset="0"/>
+                <a:ea typeface="微软雅黑" charset="0"/>
+                <a:cs typeface="微软雅黑" charset="0"/>
+              </a:rPr>
+              <a:t>使用预训练好的ViT-B/32</a:t>
+            </a:r>
+            <a:br>
+              <a:rPr lang="zh-CN" altLang="en-US" sz="1400" b="1">
+                <a:latin typeface="微软雅黑" charset="0"/>
+                <a:ea typeface="微软雅黑" charset="0"/>
+                <a:cs typeface="微软雅黑" charset="0"/>
+              </a:rPr>
+            </a:br>
+            <a:r>
+              <a:rPr lang="zh-CN" altLang="en-US" sz="1400" b="1">
+                <a:latin typeface="微软雅黑" charset="0"/>
+                <a:ea typeface="微软雅黑" charset="0"/>
+                <a:cs typeface="微软雅黑" charset="0"/>
+              </a:rPr>
+              <a:t>初始化</a:t>
+            </a:r>
+            <a:r>
+              <a:rPr lang="en-US" altLang="zh-CN" sz="1400" b="1">
+                <a:latin typeface="微软雅黑" charset="0"/>
+                <a:ea typeface="微软雅黑" charset="0"/>
+                <a:cs typeface="微软雅黑" charset="0"/>
+              </a:rPr>
+              <a:t>ViT Encoder</a:t>
+            </a:r>
+            <a:endParaRPr lang="en-US" altLang="zh-CN" sz="1400" b="1">
+              <a:latin typeface="微软雅黑" charset="0"/>
+              <a:ea typeface="微软雅黑" charset="0"/>
+              <a:cs typeface="微软雅黑" charset="0"/>
+            </a:endParaRPr>
+          </a:p>
+        </p:txBody>
+      </p:sp>
+      <p:sp>
+        <p:nvSpPr>
+          <p:cNvPr id="13" name="文本框 12"/>
+          <p:cNvSpPr txBox="1"/>
+          <p:nvPr>
+            <p:custDataLst>
+              <p:tags r:id="rId15"/>
+            </p:custDataLst>
+          </p:nvPr>
+        </p:nvSpPr>
+        <p:spPr>
+          <a:xfrm>
+            <a:off x="2591435" y="2514600"/>
+            <a:ext cx="2397760" cy="412115"/>
+          </a:xfrm>
+          <a:prstGeom prst="rect">
+            <a:avLst/>
+          </a:prstGeom>
+          <a:noFill/>
+        </p:spPr>
+        <p:txBody>
+          <a:bodyPr wrap="square" rtlCol="0">
+            <a:noAutofit/>
+          </a:bodyPr>
+          <a:p>
+            <a:pPr algn="ctr"/>
+            <a:r>
+              <a:rPr lang="zh-CN" altLang="en-US" sz="1400" b="1">
+                <a:latin typeface="微软雅黑" charset="0"/>
+                <a:ea typeface="微软雅黑" charset="0"/>
+                <a:cs typeface="微软雅黑" charset="0"/>
+              </a:rPr>
+              <a:t>判断图文是否</a:t>
+            </a:r>
+            <a:r>
+              <a:rPr lang="zh-CN" altLang="en-US" sz="1400" b="1">
+                <a:latin typeface="微软雅黑" charset="0"/>
+                <a:ea typeface="微软雅黑" charset="0"/>
+                <a:cs typeface="微软雅黑" charset="0"/>
+              </a:rPr>
+              <a:t>匹配</a:t>
+            </a:r>
+            <a:endParaRPr lang="zh-CN" altLang="en-US" sz="1400" b="1">
+              <a:latin typeface="微软雅黑" charset="0"/>
+              <a:ea typeface="微软雅黑" charset="0"/>
+              <a:cs typeface="微软雅黑" charset="0"/>
+            </a:endParaRPr>
+          </a:p>
+        </p:txBody>
+      </p:sp>
+      <p:sp>
+        <p:nvSpPr>
+          <p:cNvPr id="16" name="文本框 15"/>
+          <p:cNvSpPr txBox="1"/>
+          <p:nvPr>
+            <p:custDataLst>
+              <p:tags r:id="rId16"/>
+            </p:custDataLst>
+          </p:nvPr>
+        </p:nvSpPr>
+        <p:spPr>
+          <a:xfrm>
+            <a:off x="4582795" y="2514600"/>
+            <a:ext cx="2397760" cy="412115"/>
+          </a:xfrm>
+          <a:prstGeom prst="rect">
+            <a:avLst/>
+          </a:prstGeom>
+          <a:noFill/>
+        </p:spPr>
+        <p:txBody>
+          <a:bodyPr wrap="square" rtlCol="0">
+            <a:noAutofit/>
+          </a:bodyPr>
+          <a:p>
+            <a:pPr algn="ctr"/>
+            <a:r>
+              <a:rPr lang="zh-CN" altLang="en-US" sz="1400" b="1">
+                <a:latin typeface="微软雅黑" charset="0"/>
+                <a:ea typeface="微软雅黑" charset="0"/>
+                <a:cs typeface="微软雅黑" charset="0"/>
+              </a:rPr>
+              <a:t>预测被遮挡</a:t>
+            </a:r>
+            <a:r>
+              <a:rPr lang="zh-CN" altLang="en-US" sz="1400" b="1">
+                <a:latin typeface="微软雅黑" charset="0"/>
+                <a:ea typeface="微软雅黑" charset="0"/>
+                <a:cs typeface="微软雅黑" charset="0"/>
+              </a:rPr>
+              <a:t>单词</a:t>
+            </a:r>
+            <a:endParaRPr lang="zh-CN" altLang="en-US" sz="1400" b="1">
+              <a:latin typeface="微软雅黑" charset="0"/>
+              <a:ea typeface="微软雅黑" charset="0"/>
+              <a:cs typeface="微软雅黑" charset="0"/>
+            </a:endParaRPr>
+          </a:p>
+        </p:txBody>
+      </p:sp>
+      <p:sp>
+        <p:nvSpPr>
+          <p:cNvPr id="17" name="文本框 16"/>
+          <p:cNvSpPr txBox="1"/>
+          <p:nvPr>
+            <p:custDataLst>
+              <p:tags r:id="rId17"/>
+            </p:custDataLst>
+          </p:nvPr>
+        </p:nvSpPr>
+        <p:spPr>
+          <a:xfrm>
+            <a:off x="6440170" y="2504440"/>
+            <a:ext cx="2397760" cy="412115"/>
+          </a:xfrm>
+          <a:prstGeom prst="rect">
+            <a:avLst/>
+          </a:prstGeom>
+          <a:noFill/>
+        </p:spPr>
+        <p:txBody>
+          <a:bodyPr wrap="square" rtlCol="0">
+            <a:noAutofit/>
+          </a:bodyPr>
+          <a:p>
+            <a:pPr algn="ctr"/>
+            <a:r>
+              <a:rPr lang="zh-CN" altLang="en-US" sz="1400" b="1">
+                <a:latin typeface="微软雅黑" charset="0"/>
+                <a:ea typeface="微软雅黑" charset="0"/>
+                <a:cs typeface="微软雅黑" charset="0"/>
+              </a:rPr>
+              <a:t>图文</a:t>
+            </a:r>
+            <a:r>
+              <a:rPr lang="en-US" altLang="zh-CN" sz="1400" b="1">
+                <a:latin typeface="微软雅黑" charset="0"/>
+                <a:ea typeface="微软雅黑" charset="0"/>
+                <a:cs typeface="微软雅黑" charset="0"/>
+              </a:rPr>
+              <a:t>patch</a:t>
+            </a:r>
+            <a:r>
+              <a:rPr lang="zh-CN" altLang="en-US" sz="1400" b="1">
+                <a:latin typeface="微软雅黑" charset="0"/>
+                <a:ea typeface="微软雅黑" charset="0"/>
+                <a:cs typeface="微软雅黑" charset="0"/>
+              </a:rPr>
+              <a:t>对齐</a:t>
+            </a:r>
+            <a:endParaRPr lang="zh-CN" altLang="en-US" sz="1400" b="1">
+              <a:latin typeface="微软雅黑" charset="0"/>
+              <a:ea typeface="微软雅黑" charset="0"/>
+              <a:cs typeface="微软雅黑" charset="0"/>
+            </a:endParaRPr>
+          </a:p>
+        </p:txBody>
+      </p:sp>
+      <p:sp>
+        <p:nvSpPr>
+          <p:cNvPr id="18" name="矩形: 圆角 36"/>
+          <p:cNvSpPr/>
+          <p:nvPr>
+            <p:custDataLst>
+              <p:tags r:id="rId18"/>
+            </p:custDataLst>
+          </p:nvPr>
+        </p:nvSpPr>
+        <p:spPr>
+          <a:xfrm rot="10800000" flipV="1">
+            <a:off x="3026410" y="2503805"/>
+            <a:ext cx="8503920" cy="469265"/>
+          </a:xfrm>
+          <a:prstGeom prst="roundRect">
+            <a:avLst>
+              <a:gd name="adj" fmla="val 10039"/>
+            </a:avLst>
+          </a:prstGeom>
+          <a:noFill/>
+          <a:ln w="38100">
+            <a:solidFill>
+              <a:schemeClr val="tx1"/>
+            </a:solidFill>
+            <a:prstDash val="lgDash"/>
+          </a:ln>
+        </p:spPr>
+        <p:style>
+          <a:lnRef idx="2">
+            <a:schemeClr val="accent1">
+              <a:shade val="15000"/>
+            </a:schemeClr>
+          </a:lnRef>
+          <a:fillRef idx="1">
+            <a:schemeClr val="accent1"/>
+          </a:fillRef>
+          <a:effectRef idx="0">
+            <a:schemeClr val="accent1"/>
+          </a:effectRef>
+          <a:fontRef idx="minor">
+            <a:schemeClr val="lt1"/>
+          </a:fontRef>
+        </p:style>
+        <p:txBody>
+          <a:bodyPr rtlCol="0" anchor="ctr"/>
+          <a:p>
+            <a:pPr algn="ctr"/>
+            <a:endParaRPr lang="zh-CN" altLang="en-US"/>
+          </a:p>
+        </p:txBody>
+      </p:sp>
+      <p:sp>
+        <p:nvSpPr>
+          <p:cNvPr id="19" name="文本框 18"/>
+          <p:cNvSpPr txBox="1"/>
+          <p:nvPr>
+            <p:custDataLst>
+              <p:tags r:id="rId19"/>
+            </p:custDataLst>
+          </p:nvPr>
+        </p:nvSpPr>
+        <p:spPr>
+          <a:xfrm>
+            <a:off x="8689340" y="2503805"/>
+            <a:ext cx="2397760" cy="857885"/>
+          </a:xfrm>
+          <a:prstGeom prst="rect">
+            <a:avLst/>
+          </a:prstGeom>
+          <a:noFill/>
+        </p:spPr>
+        <p:txBody>
+          <a:bodyPr wrap="square" rtlCol="0">
+            <a:noAutofit/>
+          </a:bodyPr>
+          <a:p>
+            <a:pPr algn="ctr"/>
+            <a:r>
+              <a:rPr lang="zh-CN" altLang="en-US" sz="1400" b="1">
+                <a:latin typeface="微软雅黑" charset="0"/>
+                <a:ea typeface="微软雅黑" charset="0"/>
+                <a:cs typeface="微软雅黑" charset="0"/>
+              </a:rPr>
+              <a:t>使用三种损失</a:t>
+            </a:r>
+            <a:r>
+              <a:rPr lang="zh-CN" altLang="en-US" sz="1400" b="1">
+                <a:latin typeface="微软雅黑" charset="0"/>
+                <a:ea typeface="微软雅黑" charset="0"/>
+                <a:cs typeface="微软雅黑" charset="0"/>
+              </a:rPr>
+              <a:t>优化</a:t>
+            </a:r>
+            <a:endParaRPr lang="zh-CN" altLang="en-US" sz="1400" b="1">
+              <a:latin typeface="微软雅黑" charset="0"/>
+              <a:ea typeface="微软雅黑" charset="0"/>
+              <a:cs typeface="微软雅黑" charset="0"/>
+            </a:endParaRPr>
+          </a:p>
+        </p:txBody>
+      </p:sp>
+      <p:sp>
+        <p:nvSpPr>
+          <p:cNvPr id="21" name="矩形: 圆角 36"/>
+          <p:cNvSpPr/>
+          <p:nvPr>
+            <p:custDataLst>
+              <p:tags r:id="rId20"/>
+            </p:custDataLst>
+          </p:nvPr>
+        </p:nvSpPr>
+        <p:spPr>
+          <a:xfrm rot="10800000" flipV="1">
+            <a:off x="635" y="5227320"/>
+            <a:ext cx="5444490" cy="680720"/>
+          </a:xfrm>
+          <a:prstGeom prst="roundRect">
+            <a:avLst>
+              <a:gd name="adj" fmla="val 10039"/>
+            </a:avLst>
+          </a:prstGeom>
+          <a:noFill/>
+          <a:ln w="38100">
+            <a:solidFill>
+              <a:srgbClr val="990000"/>
+            </a:solidFill>
+            <a:prstDash val="lgDash"/>
+          </a:ln>
+        </p:spPr>
+        <p:style>
+          <a:lnRef idx="2">
+            <a:schemeClr val="accent1">
+              <a:shade val="15000"/>
+            </a:schemeClr>
+          </a:lnRef>
+          <a:fillRef idx="1">
+            <a:schemeClr val="accent1"/>
+          </a:fillRef>
+          <a:effectRef idx="0">
+            <a:schemeClr val="accent1"/>
+          </a:effectRef>
+          <a:fontRef idx="minor">
+            <a:schemeClr val="lt1"/>
+          </a:fontRef>
+        </p:style>
+        <p:txBody>
+          <a:bodyPr rtlCol="0" anchor="ctr"/>
+          <a:p>
+            <a:pPr algn="ctr"/>
+            <a:endParaRPr lang="zh-CN" altLang="en-US"/>
+          </a:p>
+        </p:txBody>
+      </p:sp>
+      <p:sp>
+        <p:nvSpPr>
+          <p:cNvPr id="25" name="文本框 24"/>
+          <p:cNvSpPr txBox="1"/>
+          <p:nvPr>
+            <p:custDataLst>
+              <p:tags r:id="rId21"/>
+            </p:custDataLst>
+          </p:nvPr>
+        </p:nvSpPr>
+        <p:spPr>
+          <a:xfrm>
+            <a:off x="-229870" y="5221605"/>
+            <a:ext cx="2858770" cy="857885"/>
+          </a:xfrm>
+          <a:prstGeom prst="rect">
+            <a:avLst/>
+          </a:prstGeom>
+          <a:noFill/>
+        </p:spPr>
+        <p:txBody>
+          <a:bodyPr wrap="square" rtlCol="0">
+            <a:noAutofit/>
+          </a:bodyPr>
+          <a:p>
+            <a:pPr algn="ctr"/>
+            <a:r>
+              <a:rPr lang="en-US" altLang="zh-CN" sz="1400" b="1">
+                <a:solidFill>
+                  <a:srgbClr val="C00000"/>
+                </a:solidFill>
+                <a:latin typeface="微软雅黑" charset="0"/>
+                <a:ea typeface="微软雅黑" charset="0"/>
+                <a:cs typeface="微软雅黑" charset="0"/>
+              </a:rPr>
+              <a:t>BERT</a:t>
+            </a:r>
+            <a:r>
+              <a:rPr lang="zh-CN" altLang="en-US" sz="1400" b="1">
+                <a:solidFill>
+                  <a:srgbClr val="C00000"/>
+                </a:solidFill>
+                <a:latin typeface="微软雅黑" charset="0"/>
+                <a:ea typeface="微软雅黑" charset="0"/>
+                <a:cs typeface="微软雅黑" charset="0"/>
+              </a:rPr>
+              <a:t>存在</a:t>
+            </a:r>
+            <a:r>
+              <a:rPr lang="en-US" altLang="zh-CN" sz="1400" b="1">
+                <a:solidFill>
+                  <a:srgbClr val="C00000"/>
+                </a:solidFill>
+                <a:latin typeface="微软雅黑" charset="0"/>
+                <a:ea typeface="微软雅黑" charset="0"/>
+                <a:cs typeface="微软雅黑" charset="0"/>
+              </a:rPr>
+              <a:t>WordPiece</a:t>
+            </a:r>
+            <a:r>
+              <a:rPr lang="zh-CN" altLang="en-US" sz="1400" b="1">
+                <a:solidFill>
+                  <a:srgbClr val="C00000"/>
+                </a:solidFill>
+                <a:latin typeface="微软雅黑" charset="0"/>
+                <a:ea typeface="微软雅黑" charset="0"/>
+                <a:cs typeface="微软雅黑" charset="0"/>
+              </a:rPr>
+              <a:t>分词</a:t>
+            </a:r>
+            <a:br>
+              <a:rPr lang="zh-CN" altLang="en-US" sz="1400" b="1">
+                <a:solidFill>
+                  <a:srgbClr val="C00000"/>
+                </a:solidFill>
+                <a:latin typeface="微软雅黑" charset="0"/>
+                <a:ea typeface="微软雅黑" charset="0"/>
+                <a:cs typeface="微软雅黑" charset="0"/>
+              </a:rPr>
+            </a:br>
+            <a:r>
+              <a:rPr lang="zh-CN" altLang="en-US" sz="1400" b="1">
+                <a:solidFill>
+                  <a:srgbClr val="C00000"/>
+                </a:solidFill>
+                <a:latin typeface="微软雅黑" charset="0"/>
+                <a:ea typeface="微软雅黑" charset="0"/>
+                <a:cs typeface="微软雅黑" charset="0"/>
+              </a:rPr>
+              <a:t>可能把一个词分为多个子词</a:t>
+            </a:r>
+            <a:br>
+              <a:rPr lang="zh-CN" altLang="en-US" sz="1400" b="1">
+                <a:solidFill>
+                  <a:srgbClr val="C00000"/>
+                </a:solidFill>
+                <a:latin typeface="微软雅黑" charset="0"/>
+                <a:ea typeface="微软雅黑" charset="0"/>
+                <a:cs typeface="微软雅黑" charset="0"/>
+              </a:rPr>
+            </a:br>
+            <a:r>
+              <a:rPr lang="zh-CN" altLang="en-US" sz="1400" b="1">
+                <a:solidFill>
+                  <a:srgbClr val="C00000"/>
+                </a:solidFill>
+                <a:latin typeface="微软雅黑" charset="0"/>
+                <a:ea typeface="微软雅黑" charset="0"/>
+                <a:cs typeface="微软雅黑" charset="0"/>
+              </a:rPr>
+              <a:t>本模型不拆分，对整词遮挡</a:t>
+            </a:r>
+            <a:endParaRPr lang="zh-CN" altLang="en-US" sz="1400" b="1">
+              <a:solidFill>
+                <a:srgbClr val="C00000"/>
+              </a:solidFill>
+              <a:latin typeface="微软雅黑" charset="0"/>
+              <a:ea typeface="微软雅黑" charset="0"/>
+              <a:cs typeface="微软雅黑" charset="0"/>
+            </a:endParaRPr>
+          </a:p>
+        </p:txBody>
+      </p:sp>
+      <p:sp>
+        <p:nvSpPr>
+          <p:cNvPr id="26" name="矩形: 圆角 36"/>
+          <p:cNvSpPr/>
+          <p:nvPr>
+            <p:custDataLst>
+              <p:tags r:id="rId22"/>
+            </p:custDataLst>
+          </p:nvPr>
+        </p:nvSpPr>
+        <p:spPr>
+          <a:xfrm rot="10800000" flipV="1">
+            <a:off x="9046210" y="4286885"/>
+            <a:ext cx="3145790" cy="1792605"/>
+          </a:xfrm>
+          <a:prstGeom prst="roundRect">
+            <a:avLst>
+              <a:gd name="adj" fmla="val 10039"/>
+            </a:avLst>
+          </a:prstGeom>
+          <a:noFill/>
+          <a:ln w="38100">
+            <a:solidFill>
+              <a:srgbClr val="990000"/>
+            </a:solidFill>
+            <a:prstDash val="lgDash"/>
+          </a:ln>
+        </p:spPr>
+        <p:style>
+          <a:lnRef idx="2">
+            <a:schemeClr val="accent1">
+              <a:shade val="15000"/>
+            </a:schemeClr>
+          </a:lnRef>
+          <a:fillRef idx="1">
+            <a:schemeClr val="accent1"/>
+          </a:fillRef>
+          <a:effectRef idx="0">
+            <a:schemeClr val="accent1"/>
+          </a:effectRef>
+          <a:fontRef idx="minor">
+            <a:schemeClr val="lt1"/>
+          </a:fontRef>
+        </p:style>
+        <p:txBody>
+          <a:bodyPr rtlCol="0" anchor="ctr"/>
+          <a:p>
+            <a:pPr algn="ctr"/>
+            <a:endParaRPr lang="zh-CN" altLang="en-US"/>
+          </a:p>
+        </p:txBody>
+      </p:sp>
+      <p:sp>
+        <p:nvSpPr>
+          <p:cNvPr id="27" name="文本框 26"/>
+          <p:cNvSpPr txBox="1"/>
+          <p:nvPr>
+            <p:custDataLst>
+              <p:tags r:id="rId23"/>
+            </p:custDataLst>
+          </p:nvPr>
+        </p:nvSpPr>
+        <p:spPr>
+          <a:xfrm>
+            <a:off x="10010140" y="4369435"/>
+            <a:ext cx="2181860" cy="857885"/>
+          </a:xfrm>
+          <a:prstGeom prst="rect">
+            <a:avLst/>
+          </a:prstGeom>
+          <a:noFill/>
+        </p:spPr>
+        <p:txBody>
+          <a:bodyPr wrap="square" rtlCol="0">
+            <a:noAutofit/>
+          </a:bodyPr>
+          <a:p>
+            <a:pPr algn="ctr"/>
+            <a:r>
+              <a:rPr lang="zh-CN" altLang="en-US" sz="1400" b="1">
+                <a:solidFill>
+                  <a:srgbClr val="C00000"/>
+                </a:solidFill>
+                <a:latin typeface="微软雅黑" charset="0"/>
+                <a:ea typeface="微软雅黑" charset="0"/>
+                <a:cs typeface="微软雅黑" charset="0"/>
+              </a:rPr>
+              <a:t>图像增强</a:t>
+            </a:r>
+            <a:br>
+              <a:rPr lang="zh-CN" altLang="en-US" sz="1400" b="1">
+                <a:solidFill>
+                  <a:srgbClr val="C00000"/>
+                </a:solidFill>
+                <a:latin typeface="微软雅黑" charset="0"/>
+                <a:ea typeface="微软雅黑" charset="0"/>
+                <a:cs typeface="微软雅黑" charset="0"/>
+              </a:rPr>
+            </a:br>
+            <a:r>
+              <a:rPr lang="zh-CN" altLang="en-US" sz="1400" b="1">
+                <a:solidFill>
+                  <a:srgbClr val="C00000"/>
+                </a:solidFill>
+                <a:latin typeface="微软雅黑" charset="0"/>
+                <a:ea typeface="微软雅黑" charset="0"/>
+                <a:cs typeface="微软雅黑" charset="0"/>
+              </a:rPr>
+              <a:t>使用</a:t>
+            </a:r>
+            <a:r>
+              <a:rPr lang="en-US" altLang="zh-CN" sz="1400" b="1">
+                <a:solidFill>
+                  <a:srgbClr val="C00000"/>
+                </a:solidFill>
+                <a:latin typeface="微软雅黑" charset="0"/>
+                <a:ea typeface="微软雅黑" charset="0"/>
+                <a:cs typeface="微软雅黑" charset="0"/>
+              </a:rPr>
+              <a:t>RandAugment</a:t>
+            </a:r>
+            <a:r>
+              <a:rPr lang="zh-CN" altLang="en-US" sz="1400" b="1">
+                <a:solidFill>
+                  <a:srgbClr val="C00000"/>
+                </a:solidFill>
+                <a:latin typeface="微软雅黑" charset="0"/>
+                <a:ea typeface="微软雅黑" charset="0"/>
+                <a:cs typeface="微软雅黑" charset="0"/>
+              </a:rPr>
+              <a:t>默认</a:t>
+            </a:r>
+            <a:br>
+              <a:rPr lang="zh-CN" altLang="en-US" sz="1400" b="1">
+                <a:solidFill>
+                  <a:srgbClr val="C00000"/>
+                </a:solidFill>
+                <a:latin typeface="微软雅黑" charset="0"/>
+                <a:ea typeface="微软雅黑" charset="0"/>
+                <a:cs typeface="微软雅黑" charset="0"/>
+              </a:rPr>
+            </a:br>
+            <a:r>
+              <a:rPr lang="zh-CN" altLang="en-US" sz="1400" b="1">
+                <a:solidFill>
+                  <a:srgbClr val="C00000"/>
+                </a:solidFill>
+                <a:latin typeface="微软雅黑" charset="0"/>
+                <a:ea typeface="微软雅黑" charset="0"/>
+                <a:cs typeface="微软雅黑" charset="0"/>
+              </a:rPr>
+              <a:t>但删除颜色翻转和</a:t>
+            </a:r>
+            <a:r>
+              <a:rPr lang="zh-CN" altLang="en-US" sz="1400" b="1">
+                <a:solidFill>
+                  <a:srgbClr val="C00000"/>
+                </a:solidFill>
+                <a:latin typeface="微软雅黑" charset="0"/>
+                <a:ea typeface="微软雅黑" charset="0"/>
+                <a:cs typeface="微软雅黑" charset="0"/>
+              </a:rPr>
+              <a:t>遮挡</a:t>
+            </a:r>
+            <a:endParaRPr lang="zh-CN" altLang="en-US" sz="1400" b="1">
+              <a:solidFill>
+                <a:srgbClr val="C00000"/>
+              </a:solidFill>
+              <a:latin typeface="微软雅黑" charset="0"/>
+              <a:ea typeface="微软雅黑" charset="0"/>
+              <a:cs typeface="微软雅黑" charset="0"/>
+            </a:endParaRPr>
           </a:p>
         </p:txBody>
       </p:sp>
@@ -6350,6 +7094,776 @@
                 <a:cs typeface="微软雅黑" charset="0"/>
               </a:rPr>
               <a:t>过多</a:t>
+            </a:r>
+            <a:endParaRPr lang="zh-CN" altLang="en-US" sz="1400" b="1">
+              <a:latin typeface="微软雅黑" charset="0"/>
+              <a:ea typeface="微软雅黑" charset="0"/>
+              <a:cs typeface="微软雅黑" charset="0"/>
+            </a:endParaRPr>
+          </a:p>
+        </p:txBody>
+      </p:sp>
+    </p:spTree>
+  </p:cSld>
+  <p:clrMapOvr>
+    <a:masterClrMapping/>
+  </p:clrMapOvr>
+</p:sld>
+</file>
+
+<file path=ppt/slides/slide7.xml><?xml version="1.0" encoding="utf-8"?>
+<p:sld xmlns:a="http://schemas.openxmlformats.org/drawingml/2006/main" xmlns:r="http://schemas.openxmlformats.org/officeDocument/2006/relationships" xmlns:p="http://schemas.openxmlformats.org/presentationml/2006/main">
+  <p:cSld>
+    <p:spTree>
+      <p:nvGrpSpPr>
+        <p:cNvPr id="1" name=""/>
+        <p:cNvGrpSpPr/>
+        <p:nvPr/>
+      </p:nvGrpSpPr>
+      <p:grpSpPr/>
+      <p:sp>
+        <p:nvSpPr>
+          <p:cNvPr id="2" name="标题 1"/>
+          <p:cNvSpPr>
+            <a:spLocks noGrp="1"/>
+          </p:cNvSpPr>
+          <p:nvPr>
+            <p:ph type="ctrTitle"/>
+          </p:nvPr>
+        </p:nvSpPr>
+        <p:spPr/>
+        <p:txBody>
+          <a:bodyPr/>
+          <a:p>
+            <a:r>
+              <a:rPr lang="en-US" altLang="zh-CN"/>
+              <a:t>ALBEF</a:t>
+            </a:r>
+            <a:endParaRPr lang="en-US" altLang="zh-CN"/>
+          </a:p>
+        </p:txBody>
+      </p:sp>
+      <p:sp>
+        <p:nvSpPr>
+          <p:cNvPr id="3" name="副标题 2"/>
+          <p:cNvSpPr>
+            <a:spLocks noGrp="1"/>
+          </p:cNvSpPr>
+          <p:nvPr>
+            <p:ph type="subTitle" idx="1"/>
+          </p:nvPr>
+        </p:nvSpPr>
+        <p:spPr/>
+        <p:txBody>
+          <a:bodyPr/>
+          <a:p>
+            <a:endParaRPr lang="zh-CN" altLang="en-US"/>
+          </a:p>
+        </p:txBody>
+      </p:sp>
+    </p:spTree>
+  </p:cSld>
+  <p:clrMapOvr>
+    <a:masterClrMapping/>
+  </p:clrMapOvr>
+</p:sld>
+</file>
+
+<file path=ppt/slides/slide8.xml><?xml version="1.0" encoding="utf-8"?>
+<p:sld xmlns:a="http://schemas.openxmlformats.org/drawingml/2006/main" xmlns:r="http://schemas.openxmlformats.org/officeDocument/2006/relationships" xmlns:p="http://schemas.openxmlformats.org/presentationml/2006/main">
+  <p:cSld>
+    <p:spTree>
+      <p:nvGrpSpPr>
+        <p:cNvPr id="1" name=""/>
+        <p:cNvGrpSpPr/>
+        <p:nvPr/>
+      </p:nvGrpSpPr>
+      <p:grpSpPr/>
+      <p:pic>
+        <p:nvPicPr>
+          <p:cNvPr id="4" name="图片 3"/>
+          <p:cNvPicPr>
+            <a:picLocks noChangeAspect="1"/>
+          </p:cNvPicPr>
+          <p:nvPr>
+            <p:custDataLst>
+              <p:tags r:id="rId1"/>
+            </p:custDataLst>
+          </p:nvPr>
+        </p:nvPicPr>
+        <p:blipFill>
+          <a:blip r:embed="rId2"/>
+          <a:stretch>
+            <a:fillRect/>
+          </a:stretch>
+        </p:blipFill>
+        <p:spPr>
+          <a:xfrm>
+            <a:off x="399415" y="689610"/>
+            <a:ext cx="11352530" cy="5363210"/>
+          </a:xfrm>
+          <a:prstGeom prst="rect">
+            <a:avLst/>
+          </a:prstGeom>
+        </p:spPr>
+      </p:pic>
+      <p:sp>
+        <p:nvSpPr>
+          <p:cNvPr id="7" name="文本框 6"/>
+          <p:cNvSpPr txBox="1"/>
+          <p:nvPr>
+            <p:custDataLst>
+              <p:tags r:id="rId3"/>
+            </p:custDataLst>
+          </p:nvPr>
+        </p:nvSpPr>
+        <p:spPr>
+          <a:xfrm>
+            <a:off x="1248410" y="6010910"/>
+            <a:ext cx="2757805" cy="847090"/>
+          </a:xfrm>
+          <a:prstGeom prst="rect">
+            <a:avLst/>
+          </a:prstGeom>
+          <a:noFill/>
+        </p:spPr>
+        <p:txBody>
+          <a:bodyPr wrap="square" rtlCol="0">
+            <a:noAutofit/>
+          </a:bodyPr>
+          <a:p>
+            <a:pPr algn="ctr"/>
+            <a:r>
+              <a:rPr lang="zh-CN" altLang="en-US" sz="1400" b="1">
+                <a:latin typeface="微软雅黑" charset="0"/>
+                <a:ea typeface="微软雅黑" charset="0"/>
+                <a:cs typeface="微软雅黑" charset="0"/>
+              </a:rPr>
+              <a:t>图像输入</a:t>
+            </a:r>
+            <a:br>
+              <a:rPr lang="zh-CN" altLang="en-US" sz="1400" b="1">
+                <a:latin typeface="微软雅黑" charset="0"/>
+                <a:ea typeface="微软雅黑" charset="0"/>
+                <a:cs typeface="微软雅黑" charset="0"/>
+              </a:rPr>
+            </a:br>
+            <a:r>
+              <a:rPr lang="en-US" altLang="zh-CN" sz="1400" b="1">
+                <a:latin typeface="微软雅黑" charset="0"/>
+                <a:ea typeface="微软雅黑" charset="0"/>
+                <a:cs typeface="微软雅黑" charset="0"/>
+              </a:rPr>
+              <a:t>12</a:t>
+            </a:r>
+            <a:r>
+              <a:rPr lang="zh-CN" altLang="en-US" sz="1400" b="1">
+                <a:latin typeface="微软雅黑" charset="0"/>
+                <a:ea typeface="微软雅黑" charset="0"/>
+                <a:cs typeface="微软雅黑" charset="0"/>
+              </a:rPr>
+              <a:t>层</a:t>
+            </a:r>
+            <a:r>
+              <a:rPr lang="en-US" altLang="zh-CN" sz="1400" b="1">
+                <a:latin typeface="微软雅黑" charset="0"/>
+                <a:ea typeface="微软雅黑" charset="0"/>
+                <a:cs typeface="微软雅黑" charset="0"/>
+              </a:rPr>
+              <a:t>SA</a:t>
+            </a:r>
+            <a:r>
+              <a:rPr lang="zh-CN" altLang="en-US" sz="1400" b="1">
+                <a:latin typeface="微软雅黑" charset="0"/>
+                <a:ea typeface="微软雅黑" charset="0"/>
+                <a:cs typeface="微软雅黑" charset="0"/>
+              </a:rPr>
+              <a:t>提取图像特征</a:t>
+            </a:r>
+            <a:br>
+              <a:rPr lang="zh-CN" altLang="en-US" sz="1400" b="1">
+                <a:latin typeface="微软雅黑" charset="0"/>
+                <a:ea typeface="微软雅黑" charset="0"/>
+                <a:cs typeface="微软雅黑" charset="0"/>
+              </a:rPr>
+            </a:br>
+            <a:r>
+              <a:rPr lang="zh-CN" altLang="en-US" sz="1400" b="1">
+                <a:latin typeface="微软雅黑" charset="0"/>
+                <a:ea typeface="微软雅黑" charset="0"/>
+                <a:cs typeface="微软雅黑" charset="0"/>
+              </a:rPr>
+              <a:t>预训练</a:t>
+            </a:r>
+            <a:r>
+              <a:rPr lang="en-US" altLang="zh-CN" sz="1400" b="1">
+                <a:latin typeface="微软雅黑" charset="0"/>
+                <a:ea typeface="微软雅黑" charset="0"/>
+                <a:cs typeface="微软雅黑" charset="0"/>
+              </a:rPr>
+              <a:t>: ViT-B/16</a:t>
+            </a:r>
+            <a:endParaRPr lang="en-US" altLang="zh-CN" sz="1400" b="1">
+              <a:latin typeface="微软雅黑" charset="0"/>
+              <a:ea typeface="微软雅黑" charset="0"/>
+              <a:cs typeface="微软雅黑" charset="0"/>
+            </a:endParaRPr>
+          </a:p>
+        </p:txBody>
+      </p:sp>
+      <p:sp>
+        <p:nvSpPr>
+          <p:cNvPr id="5" name="文本框 4"/>
+          <p:cNvSpPr txBox="1"/>
+          <p:nvPr>
+            <p:custDataLst>
+              <p:tags r:id="rId4"/>
+            </p:custDataLst>
+          </p:nvPr>
+        </p:nvSpPr>
+        <p:spPr>
+          <a:xfrm>
+            <a:off x="5280025" y="5986145"/>
+            <a:ext cx="2757805" cy="847725"/>
+          </a:xfrm>
+          <a:prstGeom prst="rect">
+            <a:avLst/>
+          </a:prstGeom>
+          <a:noFill/>
+        </p:spPr>
+        <p:txBody>
+          <a:bodyPr wrap="square" rtlCol="0">
+            <a:noAutofit/>
+          </a:bodyPr>
+          <a:p>
+            <a:pPr algn="ctr"/>
+            <a:r>
+              <a:rPr lang="zh-CN" altLang="en-US" sz="1400" b="1">
+                <a:latin typeface="微软雅黑" charset="0"/>
+                <a:ea typeface="微软雅黑" charset="0"/>
+                <a:cs typeface="微软雅黑" charset="0"/>
+              </a:rPr>
+              <a:t>文本输入</a:t>
+            </a:r>
+            <a:br>
+              <a:rPr lang="zh-CN" altLang="en-US" sz="1400" b="1">
+                <a:latin typeface="微软雅黑" charset="0"/>
+                <a:ea typeface="微软雅黑" charset="0"/>
+                <a:cs typeface="微软雅黑" charset="0"/>
+              </a:rPr>
+            </a:br>
+            <a:r>
+              <a:rPr lang="en-US" altLang="zh-CN" sz="1400" b="1">
+                <a:latin typeface="微软雅黑" charset="0"/>
+                <a:ea typeface="微软雅黑" charset="0"/>
+                <a:cs typeface="微软雅黑" charset="0"/>
+              </a:rPr>
+              <a:t>6</a:t>
+            </a:r>
+            <a:r>
+              <a:rPr lang="zh-CN" altLang="en-US" sz="1400" b="1">
+                <a:latin typeface="微软雅黑" charset="0"/>
+                <a:ea typeface="微软雅黑" charset="0"/>
+                <a:cs typeface="微软雅黑" charset="0"/>
+              </a:rPr>
+              <a:t>层</a:t>
+            </a:r>
+            <a:r>
+              <a:rPr lang="en-US" altLang="zh-CN" sz="1400" b="1">
+                <a:latin typeface="微软雅黑" charset="0"/>
+                <a:ea typeface="微软雅黑" charset="0"/>
+                <a:cs typeface="微软雅黑" charset="0"/>
+              </a:rPr>
+              <a:t>SA</a:t>
+            </a:r>
+            <a:r>
+              <a:rPr lang="zh-CN" altLang="en-US" sz="1400" b="1">
+                <a:latin typeface="微软雅黑" charset="0"/>
+                <a:ea typeface="微软雅黑" charset="0"/>
+                <a:cs typeface="微软雅黑" charset="0"/>
+              </a:rPr>
+              <a:t>提取文本特征</a:t>
+            </a:r>
+            <a:br>
+              <a:rPr lang="zh-CN" altLang="en-US" sz="1400" b="1">
+                <a:latin typeface="微软雅黑" charset="0"/>
+                <a:ea typeface="微软雅黑" charset="0"/>
+                <a:cs typeface="微软雅黑" charset="0"/>
+              </a:rPr>
+            </a:br>
+            <a:r>
+              <a:rPr lang="zh-CN" altLang="en-US" sz="1400" b="1">
+                <a:latin typeface="微软雅黑" charset="0"/>
+                <a:ea typeface="微软雅黑" charset="0"/>
+                <a:cs typeface="微软雅黑" charset="0"/>
+              </a:rPr>
+              <a:t>预训练</a:t>
+            </a:r>
+            <a:r>
+              <a:rPr lang="en-US" altLang="zh-CN" sz="1400" b="1">
+                <a:latin typeface="微软雅黑" charset="0"/>
+                <a:ea typeface="微软雅黑" charset="0"/>
+                <a:cs typeface="微软雅黑" charset="0"/>
+              </a:rPr>
+              <a:t>: BERT-base</a:t>
+            </a:r>
+            <a:r>
+              <a:rPr lang="zh-CN" altLang="en-US" sz="1400" b="1">
+                <a:latin typeface="微软雅黑" charset="0"/>
+                <a:ea typeface="微软雅黑" charset="0"/>
+                <a:cs typeface="微软雅黑" charset="0"/>
+              </a:rPr>
+              <a:t>前六层</a:t>
+            </a:r>
+            <a:endParaRPr lang="zh-CN" altLang="en-US" sz="1400" b="1">
+              <a:latin typeface="微软雅黑" charset="0"/>
+              <a:ea typeface="微软雅黑" charset="0"/>
+              <a:cs typeface="微软雅黑" charset="0"/>
+            </a:endParaRPr>
+          </a:p>
+        </p:txBody>
+      </p:sp>
+      <p:sp>
+        <p:nvSpPr>
+          <p:cNvPr id="6" name="文本框 5"/>
+          <p:cNvSpPr txBox="1"/>
+          <p:nvPr>
+            <p:custDataLst>
+              <p:tags r:id="rId5"/>
+            </p:custDataLst>
+          </p:nvPr>
+        </p:nvSpPr>
+        <p:spPr>
+          <a:xfrm>
+            <a:off x="6346825" y="3054350"/>
+            <a:ext cx="2757805" cy="423545"/>
+          </a:xfrm>
+          <a:prstGeom prst="rect">
+            <a:avLst/>
+          </a:prstGeom>
+          <a:noFill/>
+        </p:spPr>
+        <p:txBody>
+          <a:bodyPr wrap="square" rtlCol="0">
+            <a:noAutofit/>
+          </a:bodyPr>
+          <a:p>
+            <a:pPr algn="ctr"/>
+            <a:r>
+              <a:rPr lang="zh-CN" altLang="en-US" sz="1400" b="1">
+                <a:latin typeface="微软雅黑" charset="0"/>
+                <a:ea typeface="微软雅黑" charset="0"/>
+                <a:cs typeface="微软雅黑" charset="0"/>
+              </a:rPr>
+              <a:t>特征融合</a:t>
+            </a:r>
+            <a:br>
+              <a:rPr lang="zh-CN" altLang="en-US" sz="1400" b="1">
+                <a:latin typeface="微软雅黑" charset="0"/>
+                <a:ea typeface="微软雅黑" charset="0"/>
+                <a:cs typeface="微软雅黑" charset="0"/>
+              </a:rPr>
+            </a:br>
+            <a:r>
+              <a:rPr lang="en-US" altLang="zh-CN" sz="1400" b="1">
+                <a:latin typeface="微软雅黑" charset="0"/>
+                <a:ea typeface="微软雅黑" charset="0"/>
+                <a:cs typeface="微软雅黑" charset="0"/>
+              </a:rPr>
+              <a:t>6</a:t>
+            </a:r>
+            <a:r>
+              <a:rPr lang="zh-CN" altLang="en-US" sz="1400" b="1">
+                <a:latin typeface="微软雅黑" charset="0"/>
+                <a:ea typeface="微软雅黑" charset="0"/>
+                <a:cs typeface="微软雅黑" charset="0"/>
+              </a:rPr>
+              <a:t>层</a:t>
+            </a:r>
+            <a:r>
+              <a:rPr lang="en-US" altLang="zh-CN" sz="1400" b="1">
+                <a:latin typeface="微软雅黑" charset="0"/>
+                <a:ea typeface="微软雅黑" charset="0"/>
+                <a:cs typeface="微软雅黑" charset="0"/>
+              </a:rPr>
+              <a:t>CA</a:t>
+            </a:r>
+            <a:r>
+              <a:rPr lang="zh-CN" altLang="en-US" sz="1400" b="1">
+                <a:latin typeface="微软雅黑" charset="0"/>
+                <a:ea typeface="微软雅黑" charset="0"/>
+                <a:cs typeface="微软雅黑" charset="0"/>
+              </a:rPr>
+              <a:t>跨模态融合</a:t>
+            </a:r>
+            <a:br>
+              <a:rPr lang="zh-CN" altLang="en-US" sz="1400" b="1">
+                <a:latin typeface="微软雅黑" charset="0"/>
+                <a:ea typeface="微软雅黑" charset="0"/>
+                <a:cs typeface="微软雅黑" charset="0"/>
+              </a:rPr>
+            </a:br>
+            <a:r>
+              <a:rPr lang="zh-CN" altLang="en-US" sz="1400" b="1">
+                <a:latin typeface="微软雅黑" charset="0"/>
+                <a:ea typeface="微软雅黑" charset="0"/>
+                <a:cs typeface="微软雅黑" charset="0"/>
+              </a:rPr>
+              <a:t>预训练</a:t>
+            </a:r>
+            <a:r>
+              <a:rPr lang="en-US" altLang="zh-CN" sz="1400" b="1">
+                <a:latin typeface="微软雅黑" charset="0"/>
+                <a:ea typeface="微软雅黑" charset="0"/>
+                <a:cs typeface="微软雅黑" charset="0"/>
+              </a:rPr>
+              <a:t>: BERT-base</a:t>
+            </a:r>
+            <a:r>
+              <a:rPr lang="zh-CN" altLang="en-US" sz="1400" b="1">
+                <a:latin typeface="微软雅黑" charset="0"/>
+                <a:ea typeface="微软雅黑" charset="0"/>
+                <a:cs typeface="微软雅黑" charset="0"/>
+              </a:rPr>
+              <a:t>后六层</a:t>
+            </a:r>
+            <a:endParaRPr lang="zh-CN" altLang="en-US" sz="1400" b="1">
+              <a:latin typeface="微软雅黑" charset="0"/>
+              <a:ea typeface="微软雅黑" charset="0"/>
+              <a:cs typeface="微软雅黑" charset="0"/>
+            </a:endParaRPr>
+          </a:p>
+        </p:txBody>
+      </p:sp>
+      <p:sp>
+        <p:nvSpPr>
+          <p:cNvPr id="8" name="文本框 7"/>
+          <p:cNvSpPr txBox="1"/>
+          <p:nvPr>
+            <p:custDataLst>
+              <p:tags r:id="rId6"/>
+            </p:custDataLst>
+          </p:nvPr>
+        </p:nvSpPr>
+        <p:spPr>
+          <a:xfrm>
+            <a:off x="5735320" y="689610"/>
+            <a:ext cx="2757805" cy="423545"/>
+          </a:xfrm>
+          <a:prstGeom prst="rect">
+            <a:avLst/>
+          </a:prstGeom>
+          <a:noFill/>
+        </p:spPr>
+        <p:txBody>
+          <a:bodyPr wrap="square" rtlCol="0">
+            <a:noAutofit/>
+          </a:bodyPr>
+          <a:p>
+            <a:pPr algn="ctr"/>
+            <a:r>
+              <a:rPr lang="en-US" altLang="zh-CN" sz="1400" b="1">
+                <a:latin typeface="微软雅黑" charset="0"/>
+                <a:ea typeface="微软雅黑" charset="0"/>
+                <a:cs typeface="微软雅黑" charset="0"/>
+              </a:rPr>
+              <a:t>Token MASK</a:t>
+            </a:r>
+            <a:endParaRPr lang="en-US" altLang="zh-CN" sz="1400" b="1">
+              <a:latin typeface="微软雅黑" charset="0"/>
+              <a:ea typeface="微软雅黑" charset="0"/>
+              <a:cs typeface="微软雅黑" charset="0"/>
+            </a:endParaRPr>
+          </a:p>
+        </p:txBody>
+      </p:sp>
+      <p:sp>
+        <p:nvSpPr>
+          <p:cNvPr id="9" name="文本框 8"/>
+          <p:cNvSpPr txBox="1"/>
+          <p:nvPr>
+            <p:custDataLst>
+              <p:tags r:id="rId7"/>
+            </p:custDataLst>
+          </p:nvPr>
+        </p:nvSpPr>
+        <p:spPr>
+          <a:xfrm>
+            <a:off x="285115" y="1343660"/>
+            <a:ext cx="3437255" cy="1329055"/>
+          </a:xfrm>
+          <a:prstGeom prst="rect">
+            <a:avLst/>
+          </a:prstGeom>
+          <a:noFill/>
+        </p:spPr>
+        <p:txBody>
+          <a:bodyPr wrap="square" rtlCol="0">
+            <a:noAutofit/>
+          </a:bodyPr>
+          <a:p>
+            <a:pPr algn="ctr"/>
+            <a:r>
+              <a:rPr lang="en-US" altLang="zh-CN" sz="1400" b="1">
+                <a:latin typeface="微软雅黑" charset="0"/>
+                <a:ea typeface="微软雅黑" charset="0"/>
+                <a:cs typeface="微软雅黑" charset="0"/>
+              </a:rPr>
+              <a:t>ITM</a:t>
+            </a:r>
+            <a:br>
+              <a:rPr lang="en-US" altLang="zh-CN" sz="1400" b="1">
+                <a:latin typeface="微软雅黑" charset="0"/>
+                <a:ea typeface="微软雅黑" charset="0"/>
+                <a:cs typeface="微软雅黑" charset="0"/>
+              </a:rPr>
+            </a:br>
+            <a:r>
+              <a:rPr lang="zh-CN" altLang="en-US" sz="1400" b="1">
+                <a:latin typeface="微软雅黑" charset="0"/>
+                <a:ea typeface="微软雅黑" charset="0"/>
+                <a:cs typeface="微软雅黑" charset="0"/>
+              </a:rPr>
+              <a:t>如果使用是否匹配很容易就崩</a:t>
+            </a:r>
+            <a:br>
+              <a:rPr lang="zh-CN" altLang="en-US" sz="1400" b="1">
+                <a:latin typeface="微软雅黑" charset="0"/>
+                <a:ea typeface="微软雅黑" charset="0"/>
+                <a:cs typeface="微软雅黑" charset="0"/>
+              </a:rPr>
+            </a:br>
+            <a:r>
+              <a:rPr lang="zh-CN" altLang="en-US" sz="1400" b="1">
+                <a:latin typeface="微软雅黑" charset="0"/>
+                <a:ea typeface="微软雅黑" charset="0"/>
+                <a:cs typeface="微软雅黑" charset="0"/>
+              </a:rPr>
+              <a:t>因为正样本的只有一个，其他都是负样本</a:t>
+            </a:r>
+            <a:br>
+              <a:rPr lang="zh-CN" altLang="en-US" sz="1400" b="1">
+                <a:latin typeface="微软雅黑" charset="0"/>
+                <a:ea typeface="微软雅黑" charset="0"/>
+                <a:cs typeface="微软雅黑" charset="0"/>
+              </a:rPr>
+            </a:br>
+            <a:r>
+              <a:rPr lang="zh-CN" altLang="en-US" sz="1400" b="1">
+                <a:latin typeface="微软雅黑" charset="0"/>
+                <a:ea typeface="微软雅黑" charset="0"/>
+                <a:cs typeface="微软雅黑" charset="0"/>
+              </a:rPr>
+              <a:t>所以选择不是正确标签但最像的</a:t>
+            </a:r>
+            <a:br>
+              <a:rPr lang="zh-CN" altLang="en-US" sz="1400" b="1">
+                <a:latin typeface="微软雅黑" charset="0"/>
+                <a:ea typeface="微软雅黑" charset="0"/>
+                <a:cs typeface="微软雅黑" charset="0"/>
+              </a:rPr>
+            </a:br>
+            <a:r>
+              <a:rPr lang="en-US" altLang="zh-CN" sz="1400" b="1">
+                <a:latin typeface="微软雅黑" charset="0"/>
+                <a:ea typeface="微软雅黑" charset="0"/>
+                <a:cs typeface="微软雅黑" charset="0"/>
+              </a:rPr>
+              <a:t>softmax</a:t>
+            </a:r>
+            <a:r>
+              <a:rPr lang="zh-CN" altLang="en-US" sz="1400" b="1">
+                <a:latin typeface="微软雅黑" charset="0"/>
+                <a:ea typeface="微软雅黑" charset="0"/>
+                <a:cs typeface="微软雅黑" charset="0"/>
+              </a:rPr>
+              <a:t>第二的作为</a:t>
+            </a:r>
+            <a:r>
+              <a:rPr lang="zh-CN" altLang="en-US" sz="1400" b="1">
+                <a:latin typeface="微软雅黑" charset="0"/>
+                <a:ea typeface="微软雅黑" charset="0"/>
+                <a:cs typeface="微软雅黑" charset="0"/>
+              </a:rPr>
+              <a:t>负样本</a:t>
+            </a:r>
+            <a:endParaRPr lang="zh-CN" altLang="en-US" sz="1400" b="1">
+              <a:latin typeface="微软雅黑" charset="0"/>
+              <a:ea typeface="微软雅黑" charset="0"/>
+              <a:cs typeface="微软雅黑" charset="0"/>
+            </a:endParaRPr>
+          </a:p>
+        </p:txBody>
+      </p:sp>
+      <p:sp>
+        <p:nvSpPr>
+          <p:cNvPr id="10" name="文本框 9"/>
+          <p:cNvSpPr txBox="1"/>
+          <p:nvPr>
+            <p:custDataLst>
+              <p:tags r:id="rId8"/>
+            </p:custDataLst>
+          </p:nvPr>
+        </p:nvSpPr>
+        <p:spPr>
+          <a:xfrm>
+            <a:off x="3287395" y="3177540"/>
+            <a:ext cx="2757805" cy="387350"/>
+          </a:xfrm>
+          <a:prstGeom prst="rect">
+            <a:avLst/>
+          </a:prstGeom>
+          <a:noFill/>
+        </p:spPr>
+        <p:txBody>
+          <a:bodyPr wrap="square" rtlCol="0">
+            <a:noAutofit/>
+          </a:bodyPr>
+          <a:p>
+            <a:pPr algn="ctr"/>
+            <a:r>
+              <a:rPr lang="zh-CN" altLang="en-US" sz="1400" b="1">
+                <a:latin typeface="微软雅黑" charset="0"/>
+                <a:ea typeface="微软雅黑" charset="0"/>
+                <a:cs typeface="微软雅黑" charset="0"/>
+              </a:rPr>
+              <a:t>使用</a:t>
+            </a:r>
+            <a:r>
+              <a:rPr lang="en-US" altLang="zh-CN" sz="1400" b="1">
+                <a:latin typeface="微软雅黑" charset="0"/>
+                <a:ea typeface="微软雅黑" charset="0"/>
+                <a:cs typeface="微软雅黑" charset="0"/>
+              </a:rPr>
+              <a:t>MoCo</a:t>
+            </a:r>
+            <a:r>
+              <a:rPr lang="zh-CN" altLang="en-US" sz="1400" b="1">
+                <a:latin typeface="微软雅黑" charset="0"/>
+                <a:ea typeface="微软雅黑" charset="0"/>
+                <a:cs typeface="微软雅黑" charset="0"/>
+              </a:rPr>
+              <a:t>的方法来对比</a:t>
+            </a:r>
+            <a:r>
+              <a:rPr lang="zh-CN" altLang="en-US" sz="1400" b="1">
+                <a:latin typeface="微软雅黑" charset="0"/>
+                <a:ea typeface="微软雅黑" charset="0"/>
+                <a:cs typeface="微软雅黑" charset="0"/>
+              </a:rPr>
+              <a:t>学习</a:t>
+            </a:r>
+            <a:endParaRPr lang="zh-CN" altLang="en-US" sz="1400" b="1">
+              <a:latin typeface="微软雅黑" charset="0"/>
+              <a:ea typeface="微软雅黑" charset="0"/>
+              <a:cs typeface="微软雅黑" charset="0"/>
+            </a:endParaRPr>
+          </a:p>
+        </p:txBody>
+      </p:sp>
+      <p:sp>
+        <p:nvSpPr>
+          <p:cNvPr id="11" name="文本框 10"/>
+          <p:cNvSpPr txBox="1"/>
+          <p:nvPr>
+            <p:custDataLst>
+              <p:tags r:id="rId9"/>
+            </p:custDataLst>
+          </p:nvPr>
+        </p:nvSpPr>
+        <p:spPr>
+          <a:xfrm>
+            <a:off x="8789035" y="5665470"/>
+            <a:ext cx="3168650" cy="846455"/>
+          </a:xfrm>
+          <a:prstGeom prst="rect">
+            <a:avLst/>
+          </a:prstGeom>
+          <a:noFill/>
+        </p:spPr>
+        <p:txBody>
+          <a:bodyPr wrap="square" rtlCol="0">
+            <a:noAutofit/>
+          </a:bodyPr>
+          <a:p>
+            <a:pPr algn="ctr"/>
+            <a:r>
+              <a:rPr lang="zh-CN" altLang="en-US" sz="1400" b="1">
+                <a:latin typeface="微软雅黑" charset="0"/>
+                <a:ea typeface="微软雅黑" charset="0"/>
+                <a:cs typeface="微软雅黑" charset="0"/>
+              </a:rPr>
+              <a:t>动量模型</a:t>
+            </a:r>
+            <a:br>
+              <a:rPr lang="zh-CN" altLang="en-US" sz="1400" b="1">
+                <a:latin typeface="微软雅黑" charset="0"/>
+                <a:ea typeface="微软雅黑" charset="0"/>
+                <a:cs typeface="微软雅黑" charset="0"/>
+              </a:rPr>
+            </a:br>
+            <a:r>
+              <a:rPr lang="en-US" altLang="zh-CN" sz="1400" b="1">
+                <a:latin typeface="微软雅黑" charset="0"/>
+                <a:ea typeface="微软雅黑" charset="0"/>
+                <a:cs typeface="微软雅黑" charset="0"/>
+              </a:rPr>
+              <a:t>1. </a:t>
+            </a:r>
+            <a:r>
+              <a:rPr lang="zh-CN" altLang="en-US" sz="1400" b="1">
+                <a:latin typeface="微软雅黑" charset="0"/>
+                <a:ea typeface="微软雅黑" charset="0"/>
+                <a:cs typeface="微软雅黑" charset="0"/>
+              </a:rPr>
+              <a:t>负责生成对比学习正负样本</a:t>
+            </a:r>
+            <a:br>
+              <a:rPr lang="zh-CN" altLang="en-US" sz="1400" b="1">
+                <a:latin typeface="微软雅黑" charset="0"/>
+                <a:ea typeface="微软雅黑" charset="0"/>
+                <a:cs typeface="微软雅黑" charset="0"/>
+              </a:rPr>
+            </a:br>
+            <a:r>
+              <a:rPr lang="en-US" altLang="zh-CN" sz="1400" b="1">
+                <a:latin typeface="微软雅黑" charset="0"/>
+                <a:ea typeface="微软雅黑" charset="0"/>
+                <a:cs typeface="微软雅黑" charset="0"/>
+              </a:rPr>
+              <a:t>2. </a:t>
+            </a:r>
+            <a:r>
+              <a:rPr lang="zh-CN" altLang="en-US" sz="1400" b="1">
+                <a:latin typeface="微软雅黑" charset="0"/>
+                <a:ea typeface="微软雅黑" charset="0"/>
+                <a:cs typeface="微软雅黑" charset="0"/>
+              </a:rPr>
+              <a:t>负责蒸馏让标签从</a:t>
+            </a:r>
+            <a:r>
+              <a:rPr lang="en-US" altLang="zh-CN" sz="1400" b="1">
+                <a:latin typeface="微软雅黑" charset="0"/>
+                <a:ea typeface="微软雅黑" charset="0"/>
+                <a:cs typeface="微软雅黑" charset="0"/>
+              </a:rPr>
+              <a:t>one-hot</a:t>
+            </a:r>
+            <a:r>
+              <a:rPr lang="zh-CN" altLang="en-US" sz="1400" b="1">
+                <a:latin typeface="微软雅黑" charset="0"/>
+                <a:ea typeface="微软雅黑" charset="0"/>
+                <a:cs typeface="微软雅黑" charset="0"/>
+              </a:rPr>
+              <a:t>到</a:t>
+            </a:r>
+            <a:r>
+              <a:rPr lang="zh-CN" altLang="en-US" sz="1400" b="1">
+                <a:latin typeface="微软雅黑" charset="0"/>
+                <a:ea typeface="微软雅黑" charset="0"/>
+                <a:cs typeface="微软雅黑" charset="0"/>
+              </a:rPr>
+              <a:t>平滑</a:t>
             </a:r>
             <a:endParaRPr lang="zh-CN" altLang="en-US" sz="1400" b="1">
               <a:latin typeface="微软雅黑" charset="0"/>
@@ -6607,13 +8121,127 @@
 </p:tagLst>
 </file>
 
+<file path=ppt/tags/tag46.xml><?xml version="1.0" encoding="utf-8"?>
+<p:tagLst xmlns:p="http://schemas.openxmlformats.org/presentationml/2006/main">
+  <p:tag name="KSO_WM_BEAUTIFY_FLAG" val=""/>
+</p:tagLst>
+</file>
+
+<file path=ppt/tags/tag47.xml><?xml version="1.0" encoding="utf-8"?>
+<p:tagLst xmlns:p="http://schemas.openxmlformats.org/presentationml/2006/main">
+  <p:tag name="KSO_WM_BEAUTIFY_FLAG" val=""/>
+</p:tagLst>
+</file>
+
+<file path=ppt/tags/tag48.xml><?xml version="1.0" encoding="utf-8"?>
+<p:tagLst xmlns:p="http://schemas.openxmlformats.org/presentationml/2006/main">
+  <p:tag name="KSO_WM_BEAUTIFY_FLAG" val=""/>
+</p:tagLst>
+</file>
+
+<file path=ppt/tags/tag49.xml><?xml version="1.0" encoding="utf-8"?>
+<p:tagLst xmlns:p="http://schemas.openxmlformats.org/presentationml/2006/main">
+  <p:tag name="KSO_WM_BEAUTIFY_FLAG" val=""/>
+</p:tagLst>
+</file>
+
 <file path=ppt/tags/tag5.xml><?xml version="1.0" encoding="utf-8"?>
 <p:tagLst xmlns:p="http://schemas.openxmlformats.org/presentationml/2006/main">
   <p:tag name="KSO_WM_BEAUTIFY_FLAG" val=""/>
 </p:tagLst>
 </file>
 
+<file path=ppt/tags/tag50.xml><?xml version="1.0" encoding="utf-8"?>
+<p:tagLst xmlns:p="http://schemas.openxmlformats.org/presentationml/2006/main">
+  <p:tag name="KSO_WM_BEAUTIFY_FLAG" val=""/>
+</p:tagLst>
+</file>
+
+<file path=ppt/tags/tag51.xml><?xml version="1.0" encoding="utf-8"?>
+<p:tagLst xmlns:p="http://schemas.openxmlformats.org/presentationml/2006/main">
+  <p:tag name="KSO_WM_BEAUTIFY_FLAG" val=""/>
+</p:tagLst>
+</file>
+
+<file path=ppt/tags/tag52.xml><?xml version="1.0" encoding="utf-8"?>
+<p:tagLst xmlns:p="http://schemas.openxmlformats.org/presentationml/2006/main">
+  <p:tag name="KSO_WM_BEAUTIFY_FLAG" val=""/>
+</p:tagLst>
+</file>
+
+<file path=ppt/tags/tag53.xml><?xml version="1.0" encoding="utf-8"?>
+<p:tagLst xmlns:p="http://schemas.openxmlformats.org/presentationml/2006/main">
+  <p:tag name="KSO_WM_BEAUTIFY_FLAG" val=""/>
+</p:tagLst>
+</file>
+
+<file path=ppt/tags/tag54.xml><?xml version="1.0" encoding="utf-8"?>
+<p:tagLst xmlns:p="http://schemas.openxmlformats.org/presentationml/2006/main">
+  <p:tag name="KSO_WM_BEAUTIFY_FLAG" val=""/>
+</p:tagLst>
+</file>
+
+<file path=ppt/tags/tag55.xml><?xml version="1.0" encoding="utf-8"?>
+<p:tagLst xmlns:p="http://schemas.openxmlformats.org/presentationml/2006/main">
+  <p:tag name="KSO_WM_BEAUTIFY_FLAG" val=""/>
+</p:tagLst>
+</file>
+
+<file path=ppt/tags/tag56.xml><?xml version="1.0" encoding="utf-8"?>
+<p:tagLst xmlns:p="http://schemas.openxmlformats.org/presentationml/2006/main">
+  <p:tag name="KSO_WM_BEAUTIFY_FLAG" val=""/>
+</p:tagLst>
+</file>
+
+<file path=ppt/tags/tag57.xml><?xml version="1.0" encoding="utf-8"?>
+<p:tagLst xmlns:p="http://schemas.openxmlformats.org/presentationml/2006/main">
+  <p:tag name="KSO_WM_BEAUTIFY_FLAG" val=""/>
+</p:tagLst>
+</file>
+
+<file path=ppt/tags/tag58.xml><?xml version="1.0" encoding="utf-8"?>
+<p:tagLst xmlns:p="http://schemas.openxmlformats.org/presentationml/2006/main">
+  <p:tag name="KSO_WM_BEAUTIFY_FLAG" val=""/>
+</p:tagLst>
+</file>
+
+<file path=ppt/tags/tag59.xml><?xml version="1.0" encoding="utf-8"?>
+<p:tagLst xmlns:p="http://schemas.openxmlformats.org/presentationml/2006/main">
+  <p:tag name="KSO_WM_BEAUTIFY_FLAG" val=""/>
+</p:tagLst>
+</file>
+
 <file path=ppt/tags/tag6.xml><?xml version="1.0" encoding="utf-8"?>
+<p:tagLst xmlns:p="http://schemas.openxmlformats.org/presentationml/2006/main">
+  <p:tag name="KSO_WM_BEAUTIFY_FLAG" val=""/>
+</p:tagLst>
+</file>
+
+<file path=ppt/tags/tag60.xml><?xml version="1.0" encoding="utf-8"?>
+<p:tagLst xmlns:p="http://schemas.openxmlformats.org/presentationml/2006/main">
+  <p:tag name="KSO_WM_BEAUTIFY_FLAG" val=""/>
+</p:tagLst>
+</file>
+
+<file path=ppt/tags/tag61.xml><?xml version="1.0" encoding="utf-8"?>
+<p:tagLst xmlns:p="http://schemas.openxmlformats.org/presentationml/2006/main">
+  <p:tag name="KSO_WM_BEAUTIFY_FLAG" val=""/>
+</p:tagLst>
+</file>
+
+<file path=ppt/tags/tag62.xml><?xml version="1.0" encoding="utf-8"?>
+<p:tagLst xmlns:p="http://schemas.openxmlformats.org/presentationml/2006/main">
+  <p:tag name="KSO_WM_BEAUTIFY_FLAG" val=""/>
+</p:tagLst>
+</file>
+
+<file path=ppt/tags/tag63.xml><?xml version="1.0" encoding="utf-8"?>
+<p:tagLst xmlns:p="http://schemas.openxmlformats.org/presentationml/2006/main">
+  <p:tag name="KSO_WM_BEAUTIFY_FLAG" val=""/>
+</p:tagLst>
+</file>
+
+<file path=ppt/tags/tag64.xml><?xml version="1.0" encoding="utf-8"?>
 <p:tagLst xmlns:p="http://schemas.openxmlformats.org/presentationml/2006/main">
   <p:tag name="KSO_WM_BEAUTIFY_FLAG" val=""/>
 </p:tagLst>

</xml_diff>

<commit_message>
update_VLMo: Unified vision-language pre-training with mixture-of-modality-experts
</commit_message>
<xml_diff>
--- a/Base_Model/VLM+VLLM/论文插图.pptx
+++ b/Base_Model/VLM+VLLM/论文插图.pptx
@@ -8,7 +8,7 @@
     <p:notesMasterId r:id="rId4"/>
   </p:notesMasterIdLst>
   <p:handoutMasterIdLst>
-    <p:handoutMasterId r:id="rId12"/>
+    <p:handoutMasterId r:id="rId14"/>
   </p:handoutMasterIdLst>
   <p:sldIdLst>
     <p:sldId id="256" r:id="rId3"/>
@@ -19,6 +19,8 @@
     <p:sldId id="261" r:id="rId9"/>
     <p:sldId id="262" r:id="rId10"/>
     <p:sldId id="263" r:id="rId11"/>
+    <p:sldId id="264" r:id="rId12"/>
+    <p:sldId id="265" r:id="rId13"/>
   </p:sldIdLst>
   <p:sldSz cx="12192000" cy="6858000"/>
   <p:notesSz cx="7103745" cy="10234295"/>
@@ -3579,6 +3581,481 @@
 </p:sld>
 </file>
 
+<file path=ppt/slides/slide10.xml><?xml version="1.0" encoding="utf-8"?>
+<p:sld xmlns:a="http://schemas.openxmlformats.org/drawingml/2006/main" xmlns:r="http://schemas.openxmlformats.org/officeDocument/2006/relationships" xmlns:p="http://schemas.openxmlformats.org/presentationml/2006/main">
+  <p:cSld>
+    <p:spTree>
+      <p:nvGrpSpPr>
+        <p:cNvPr id="1" name=""/>
+        <p:cNvGrpSpPr/>
+        <p:nvPr/>
+      </p:nvGrpSpPr>
+      <p:grpSpPr/>
+      <p:pic>
+        <p:nvPicPr>
+          <p:cNvPr id="5" name="图片 4"/>
+          <p:cNvPicPr>
+            <a:picLocks noChangeAspect="1"/>
+          </p:cNvPicPr>
+          <p:nvPr>
+            <p:custDataLst>
+              <p:tags r:id="rId1"/>
+            </p:custDataLst>
+          </p:nvPr>
+        </p:nvPicPr>
+        <p:blipFill>
+          <a:blip r:embed="rId2"/>
+          <a:stretch>
+            <a:fillRect/>
+          </a:stretch>
+        </p:blipFill>
+        <p:spPr>
+          <a:xfrm>
+            <a:off x="0" y="4928870"/>
+            <a:ext cx="6373495" cy="1929130"/>
+          </a:xfrm>
+          <a:prstGeom prst="rect">
+            <a:avLst/>
+          </a:prstGeom>
+        </p:spPr>
+      </p:pic>
+      <p:pic>
+        <p:nvPicPr>
+          <p:cNvPr id="6" name="图片 5"/>
+          <p:cNvPicPr>
+            <a:picLocks noChangeAspect="1"/>
+          </p:cNvPicPr>
+          <p:nvPr>
+            <p:custDataLst>
+              <p:tags r:id="rId3"/>
+            </p:custDataLst>
+          </p:nvPr>
+        </p:nvPicPr>
+        <p:blipFill>
+          <a:blip r:embed="rId4"/>
+          <a:stretch>
+            <a:fillRect/>
+          </a:stretch>
+        </p:blipFill>
+        <p:spPr>
+          <a:xfrm>
+            <a:off x="0" y="0"/>
+            <a:ext cx="6680835" cy="2202815"/>
+          </a:xfrm>
+          <a:prstGeom prst="rect">
+            <a:avLst/>
+          </a:prstGeom>
+        </p:spPr>
+      </p:pic>
+      <p:pic>
+        <p:nvPicPr>
+          <p:cNvPr id="7" name="图片 6"/>
+          <p:cNvPicPr>
+            <a:picLocks noChangeAspect="1"/>
+          </p:cNvPicPr>
+          <p:nvPr>
+            <p:custDataLst>
+              <p:tags r:id="rId5"/>
+            </p:custDataLst>
+          </p:nvPr>
+        </p:nvPicPr>
+        <p:blipFill>
+          <a:blip r:embed="rId6"/>
+          <a:stretch>
+            <a:fillRect/>
+          </a:stretch>
+        </p:blipFill>
+        <p:spPr>
+          <a:xfrm>
+            <a:off x="2479675" y="1882775"/>
+            <a:ext cx="1722120" cy="3260725"/>
+          </a:xfrm>
+          <a:prstGeom prst="rect">
+            <a:avLst/>
+          </a:prstGeom>
+        </p:spPr>
+      </p:pic>
+      <p:pic>
+        <p:nvPicPr>
+          <p:cNvPr id="8" name="图片 7"/>
+          <p:cNvPicPr>
+            <a:picLocks noChangeAspect="1"/>
+          </p:cNvPicPr>
+          <p:nvPr>
+            <p:custDataLst>
+              <p:tags r:id="rId7"/>
+            </p:custDataLst>
+          </p:nvPr>
+        </p:nvPicPr>
+        <p:blipFill>
+          <a:blip r:embed="rId8"/>
+          <a:stretch>
+            <a:fillRect/>
+          </a:stretch>
+        </p:blipFill>
+        <p:spPr>
+          <a:xfrm>
+            <a:off x="6373495" y="1775460"/>
+            <a:ext cx="1095375" cy="2896870"/>
+          </a:xfrm>
+          <a:prstGeom prst="rect">
+            <a:avLst/>
+          </a:prstGeom>
+        </p:spPr>
+      </p:pic>
+      <p:pic>
+        <p:nvPicPr>
+          <p:cNvPr id="9" name="图片 8"/>
+          <p:cNvPicPr>
+            <a:picLocks noChangeAspect="1"/>
+          </p:cNvPicPr>
+          <p:nvPr>
+            <p:custDataLst>
+              <p:tags r:id="rId9"/>
+            </p:custDataLst>
+          </p:nvPr>
+        </p:nvPicPr>
+        <p:blipFill>
+          <a:blip r:embed="rId10"/>
+          <a:stretch>
+            <a:fillRect/>
+          </a:stretch>
+        </p:blipFill>
+        <p:spPr>
+          <a:xfrm>
+            <a:off x="7896860" y="486410"/>
+            <a:ext cx="3504565" cy="5306695"/>
+          </a:xfrm>
+          <a:prstGeom prst="rect">
+            <a:avLst/>
+          </a:prstGeom>
+        </p:spPr>
+      </p:pic>
+      <p:sp>
+        <p:nvSpPr>
+          <p:cNvPr id="10" name="文本框 9"/>
+          <p:cNvSpPr txBox="1"/>
+          <p:nvPr>
+            <p:custDataLst>
+              <p:tags r:id="rId11"/>
+            </p:custDataLst>
+          </p:nvPr>
+        </p:nvSpPr>
+        <p:spPr>
+          <a:xfrm>
+            <a:off x="2099310" y="5046980"/>
+            <a:ext cx="2175510" cy="364490"/>
+          </a:xfrm>
+          <a:prstGeom prst="rect">
+            <a:avLst/>
+          </a:prstGeom>
+          <a:noFill/>
+        </p:spPr>
+        <p:txBody>
+          <a:bodyPr wrap="square" rtlCol="0">
+            <a:noAutofit/>
+          </a:bodyPr>
+          <a:p>
+            <a:pPr algn="ctr"/>
+            <a:r>
+              <a:rPr lang="zh-CN" altLang="en-US" sz="1400" b="1">
+                <a:latin typeface="微软雅黑" charset="0"/>
+                <a:ea typeface="微软雅黑" charset="0"/>
+                <a:cs typeface="微软雅黑" charset="0"/>
+              </a:rPr>
+              <a:t>训练</a:t>
+            </a:r>
+            <a:r>
+              <a:rPr lang="zh-CN" altLang="en-US" sz="1400" b="1">
+                <a:latin typeface="微软雅黑" charset="0"/>
+                <a:ea typeface="微软雅黑" charset="0"/>
+                <a:cs typeface="微软雅黑" charset="0"/>
+              </a:rPr>
+              <a:t>策略</a:t>
+            </a:r>
+            <a:endParaRPr lang="zh-CN" altLang="en-US" sz="1400" b="1">
+              <a:latin typeface="微软雅黑" charset="0"/>
+              <a:ea typeface="微软雅黑" charset="0"/>
+              <a:cs typeface="微软雅黑" charset="0"/>
+            </a:endParaRPr>
+          </a:p>
+        </p:txBody>
+      </p:sp>
+      <p:sp>
+        <p:nvSpPr>
+          <p:cNvPr id="11" name="文本框 10"/>
+          <p:cNvSpPr txBox="1"/>
+          <p:nvPr>
+            <p:custDataLst>
+              <p:tags r:id="rId12"/>
+            </p:custDataLst>
+          </p:nvPr>
+        </p:nvSpPr>
+        <p:spPr>
+          <a:xfrm>
+            <a:off x="4117340" y="2668270"/>
+            <a:ext cx="2175510" cy="364490"/>
+          </a:xfrm>
+          <a:prstGeom prst="rect">
+            <a:avLst/>
+          </a:prstGeom>
+          <a:noFill/>
+        </p:spPr>
+        <p:txBody>
+          <a:bodyPr wrap="square" rtlCol="0">
+            <a:noAutofit/>
+          </a:bodyPr>
+          <a:p>
+            <a:pPr algn="ctr"/>
+            <a:r>
+              <a:rPr lang="zh-CN" altLang="en-US" sz="1400" b="1">
+                <a:latin typeface="微软雅黑" charset="0"/>
+                <a:ea typeface="微软雅黑" charset="0"/>
+                <a:cs typeface="微软雅黑" charset="0"/>
+              </a:rPr>
+              <a:t>模型</a:t>
+            </a:r>
+            <a:r>
+              <a:rPr lang="zh-CN" altLang="en-US" sz="1400" b="1">
+                <a:latin typeface="微软雅黑" charset="0"/>
+                <a:ea typeface="微软雅黑" charset="0"/>
+                <a:cs typeface="微软雅黑" charset="0"/>
+              </a:rPr>
+              <a:t>架构</a:t>
+            </a:r>
+            <a:endParaRPr lang="zh-CN" altLang="en-US" sz="1400" b="1">
+              <a:latin typeface="微软雅黑" charset="0"/>
+              <a:ea typeface="微软雅黑" charset="0"/>
+              <a:cs typeface="微软雅黑" charset="0"/>
+            </a:endParaRPr>
+          </a:p>
+        </p:txBody>
+      </p:sp>
+      <p:sp>
+        <p:nvSpPr>
+          <p:cNvPr id="12" name="文本框 11"/>
+          <p:cNvSpPr txBox="1"/>
+          <p:nvPr>
+            <p:custDataLst>
+              <p:tags r:id="rId13"/>
+            </p:custDataLst>
+          </p:nvPr>
+        </p:nvSpPr>
+        <p:spPr>
+          <a:xfrm>
+            <a:off x="4101465" y="3655060"/>
+            <a:ext cx="2175510" cy="364490"/>
+          </a:xfrm>
+          <a:prstGeom prst="rect">
+            <a:avLst/>
+          </a:prstGeom>
+          <a:noFill/>
+        </p:spPr>
+        <p:txBody>
+          <a:bodyPr wrap="square" rtlCol="0">
+            <a:noAutofit/>
+          </a:bodyPr>
+          <a:p>
+            <a:pPr algn="ctr"/>
+            <a:r>
+              <a:rPr lang="zh-CN" altLang="en-US" sz="1400" b="1">
+                <a:latin typeface="微软雅黑" charset="0"/>
+                <a:ea typeface="微软雅黑" charset="0"/>
+                <a:cs typeface="微软雅黑" charset="0"/>
+              </a:rPr>
+              <a:t>计算三个损失</a:t>
+            </a:r>
+            <a:r>
+              <a:rPr lang="en-US" altLang="zh-CN" sz="1400" b="1">
+                <a:latin typeface="微软雅黑" charset="0"/>
+                <a:ea typeface="微软雅黑" charset="0"/>
+                <a:cs typeface="微软雅黑" charset="0"/>
+              </a:rPr>
+              <a:t>LTC+LTM+MLM</a:t>
+            </a:r>
+            <a:endParaRPr lang="en-US" altLang="zh-CN" sz="1400" b="1">
+              <a:latin typeface="微软雅黑" charset="0"/>
+              <a:ea typeface="微软雅黑" charset="0"/>
+              <a:cs typeface="微软雅黑" charset="0"/>
+            </a:endParaRPr>
+          </a:p>
+        </p:txBody>
+      </p:sp>
+      <p:sp>
+        <p:nvSpPr>
+          <p:cNvPr id="13" name="右箭头 12"/>
+          <p:cNvSpPr/>
+          <p:nvPr/>
+        </p:nvSpPr>
+        <p:spPr>
+          <a:xfrm>
+            <a:off x="4248785" y="3095625"/>
+            <a:ext cx="1961515" cy="363220"/>
+          </a:xfrm>
+          <a:prstGeom prst="rightArrow">
+            <a:avLst/>
+          </a:prstGeom>
+        </p:spPr>
+        <p:style>
+          <a:lnRef idx="2">
+            <a:schemeClr val="accent1">
+              <a:lumMod val="75000"/>
+            </a:schemeClr>
+          </a:lnRef>
+          <a:fillRef idx="1">
+            <a:schemeClr val="accent1"/>
+          </a:fillRef>
+          <a:effectRef idx="0">
+            <a:srgbClr val="FFFFFF"/>
+          </a:effectRef>
+          <a:fontRef idx="minor">
+            <a:schemeClr val="lt1"/>
+          </a:fontRef>
+        </p:style>
+        <p:txBody>
+          <a:bodyPr rtlCol="0" anchor="ctr"/>
+          <a:p>
+            <a:pPr algn="ctr"/>
+            <a:endParaRPr lang="zh-CN" altLang="en-US"/>
+          </a:p>
+        </p:txBody>
+      </p:sp>
+      <p:sp>
+        <p:nvSpPr>
+          <p:cNvPr id="14" name="文本框 13"/>
+          <p:cNvSpPr txBox="1"/>
+          <p:nvPr>
+            <p:custDataLst>
+              <p:tags r:id="rId14"/>
+            </p:custDataLst>
+          </p:nvPr>
+        </p:nvSpPr>
+        <p:spPr>
+          <a:xfrm>
+            <a:off x="8284845" y="49530"/>
+            <a:ext cx="2950210" cy="654685"/>
+          </a:xfrm>
+          <a:prstGeom prst="rect">
+            <a:avLst/>
+          </a:prstGeom>
+          <a:noFill/>
+        </p:spPr>
+        <p:txBody>
+          <a:bodyPr wrap="square" rtlCol="0">
+            <a:noAutofit/>
+          </a:bodyPr>
+          <a:p>
+            <a:pPr algn="ctr"/>
+            <a:r>
+              <a:rPr lang="zh-CN" altLang="en-US" sz="1400" b="1">
+                <a:latin typeface="微软雅黑" charset="0"/>
+                <a:ea typeface="微软雅黑" charset="0"/>
+                <a:cs typeface="微软雅黑" charset="0"/>
+              </a:rPr>
+              <a:t>对比学习</a:t>
+            </a:r>
+            <a:br>
+              <a:rPr lang="en-US" altLang="zh-CN" sz="1400" b="1">
+                <a:latin typeface="微软雅黑" charset="0"/>
+                <a:ea typeface="微软雅黑" charset="0"/>
+                <a:cs typeface="微软雅黑" charset="0"/>
+              </a:rPr>
+            </a:br>
+            <a:r>
+              <a:rPr lang="en-US" altLang="zh-CN" sz="1400" b="1">
+                <a:latin typeface="微软雅黑" charset="0"/>
+                <a:ea typeface="微软雅黑" charset="0"/>
+                <a:cs typeface="微软雅黑" charset="0"/>
+              </a:rPr>
+              <a:t>ALBEF</a:t>
+            </a:r>
+            <a:r>
+              <a:rPr lang="zh-CN" altLang="en-US" sz="1400" b="1">
+                <a:latin typeface="微软雅黑" charset="0"/>
+                <a:ea typeface="微软雅黑" charset="0"/>
+                <a:cs typeface="微软雅黑" charset="0"/>
+              </a:rPr>
+              <a:t>的策略，</a:t>
+            </a:r>
+            <a:r>
+              <a:rPr lang="en-US" altLang="zh-CN" sz="1400" b="1">
+                <a:latin typeface="微软雅黑" charset="0"/>
+                <a:ea typeface="微软雅黑" charset="0"/>
+                <a:cs typeface="微软雅黑" charset="0"/>
+              </a:rPr>
+              <a:t>CLIP</a:t>
+            </a:r>
+            <a:r>
+              <a:rPr lang="zh-CN" altLang="en-US" sz="1400" b="1">
+                <a:latin typeface="微软雅黑" charset="0"/>
+                <a:ea typeface="微软雅黑" charset="0"/>
+                <a:cs typeface="微软雅黑" charset="0"/>
+              </a:rPr>
+              <a:t>的双流</a:t>
+            </a:r>
+            <a:r>
+              <a:rPr lang="zh-CN" altLang="en-US" sz="1400" b="1">
+                <a:latin typeface="微软雅黑" charset="0"/>
+                <a:ea typeface="微软雅黑" charset="0"/>
+                <a:cs typeface="微软雅黑" charset="0"/>
+              </a:rPr>
+              <a:t>架构</a:t>
+            </a:r>
+            <a:br>
+              <a:rPr lang="zh-CN" altLang="en-US" sz="1400" b="1">
+                <a:latin typeface="微软雅黑" charset="0"/>
+                <a:ea typeface="微软雅黑" charset="0"/>
+                <a:cs typeface="微软雅黑" charset="0"/>
+              </a:rPr>
+            </a:br>
+            <a:r>
+              <a:rPr lang="zh-CN" altLang="en-US" sz="1400" b="1">
+                <a:latin typeface="微软雅黑" charset="0"/>
+                <a:ea typeface="微软雅黑" charset="0"/>
+                <a:cs typeface="微软雅黑" charset="0"/>
+              </a:rPr>
+              <a:t>取</a:t>
+            </a:r>
+            <a:r>
+              <a:rPr lang="en-US" altLang="zh-CN" sz="1400" b="1">
+                <a:latin typeface="微软雅黑" charset="0"/>
+                <a:ea typeface="微软雅黑" charset="0"/>
+                <a:cs typeface="微软雅黑" charset="0"/>
+              </a:rPr>
+              <a:t>softmax</a:t>
+            </a:r>
+            <a:r>
+              <a:rPr lang="zh-CN" altLang="en-US" sz="1400" b="1">
+                <a:latin typeface="微软雅黑" charset="0"/>
+                <a:ea typeface="微软雅黑" charset="0"/>
+                <a:cs typeface="微软雅黑" charset="0"/>
+              </a:rPr>
+              <a:t>第二作为</a:t>
+            </a:r>
+            <a:r>
+              <a:rPr lang="zh-CN" altLang="en-US" sz="1400" b="1">
+                <a:latin typeface="微软雅黑" charset="0"/>
+                <a:ea typeface="微软雅黑" charset="0"/>
+                <a:cs typeface="微软雅黑" charset="0"/>
+              </a:rPr>
+              <a:t>负样本</a:t>
+            </a:r>
+            <a:endParaRPr lang="zh-CN" altLang="en-US" sz="1400" b="1">
+              <a:latin typeface="微软雅黑" charset="0"/>
+              <a:ea typeface="微软雅黑" charset="0"/>
+              <a:cs typeface="微软雅黑" charset="0"/>
+            </a:endParaRPr>
+          </a:p>
+        </p:txBody>
+      </p:sp>
+    </p:spTree>
+  </p:cSld>
+  <p:clrMapOvr>
+    <a:masterClrMapping/>
+  </p:clrMapOvr>
+</p:sld>
+</file>
+
 <file path=ppt/slides/slide2.xml><?xml version="1.0" encoding="utf-8"?>
 <p:sld xmlns:a="http://schemas.openxmlformats.org/drawingml/2006/main" xmlns:r="http://schemas.openxmlformats.org/officeDocument/2006/relationships" xmlns:p="http://schemas.openxmlformats.org/presentationml/2006/main">
   <p:cSld>
@@ -7435,7 +7912,7 @@
         </p:nvSpPr>
         <p:spPr>
           <a:xfrm>
-            <a:off x="6346825" y="3054350"/>
+            <a:off x="6310630" y="3054350"/>
             <a:ext cx="2757805" cy="423545"/>
           </a:xfrm>
           <a:prstGeom prst="rect">
@@ -7870,6 +8347,515 @@
               <a:ea typeface="微软雅黑" charset="0"/>
               <a:cs typeface="微软雅黑" charset="0"/>
             </a:endParaRPr>
+          </a:p>
+        </p:txBody>
+      </p:sp>
+      <p:pic>
+        <p:nvPicPr>
+          <p:cNvPr id="13" name="图片 12"/>
+          <p:cNvPicPr>
+            <a:picLocks noChangeAspect="1"/>
+          </p:cNvPicPr>
+          <p:nvPr>
+            <p:custDataLst>
+              <p:tags r:id="rId10"/>
+            </p:custDataLst>
+          </p:nvPr>
+        </p:nvPicPr>
+        <p:blipFill>
+          <a:blip r:embed="rId11"/>
+          <a:stretch>
+            <a:fillRect/>
+          </a:stretch>
+        </p:blipFill>
+        <p:spPr>
+          <a:xfrm>
+            <a:off x="851535" y="299085"/>
+            <a:ext cx="4883785" cy="814070"/>
+          </a:xfrm>
+          <a:prstGeom prst="rect">
+            <a:avLst/>
+          </a:prstGeom>
+        </p:spPr>
+      </p:pic>
+      <p:sp>
+        <p:nvSpPr>
+          <p:cNvPr id="18" name="矩形: 圆角 36"/>
+          <p:cNvSpPr/>
+          <p:nvPr>
+            <p:custDataLst>
+              <p:tags r:id="rId12"/>
+            </p:custDataLst>
+          </p:nvPr>
+        </p:nvSpPr>
+        <p:spPr>
+          <a:xfrm rot="10800000" flipV="1">
+            <a:off x="1682750" y="4162425"/>
+            <a:ext cx="1954530" cy="2671445"/>
+          </a:xfrm>
+          <a:prstGeom prst="roundRect">
+            <a:avLst>
+              <a:gd name="adj" fmla="val 10039"/>
+            </a:avLst>
+          </a:prstGeom>
+          <a:noFill/>
+          <a:ln w="38100">
+            <a:solidFill>
+              <a:schemeClr val="tx1"/>
+            </a:solidFill>
+            <a:prstDash val="lgDash"/>
+          </a:ln>
+        </p:spPr>
+        <p:style>
+          <a:lnRef idx="2">
+            <a:schemeClr val="accent1">
+              <a:shade val="15000"/>
+            </a:schemeClr>
+          </a:lnRef>
+          <a:fillRef idx="1">
+            <a:schemeClr val="accent1"/>
+          </a:fillRef>
+          <a:effectRef idx="0">
+            <a:schemeClr val="accent1"/>
+          </a:effectRef>
+          <a:fontRef idx="minor">
+            <a:schemeClr val="lt1"/>
+          </a:fontRef>
+        </p:style>
+        <p:txBody>
+          <a:bodyPr rtlCol="0" anchor="ctr"/>
+          <a:p>
+            <a:pPr algn="ctr"/>
+            <a:endParaRPr lang="zh-CN" altLang="en-US"/>
+          </a:p>
+        </p:txBody>
+      </p:sp>
+      <p:sp>
+        <p:nvSpPr>
+          <p:cNvPr id="14" name="矩形: 圆角 36"/>
+          <p:cNvSpPr/>
+          <p:nvPr>
+            <p:custDataLst>
+              <p:tags r:id="rId13"/>
+            </p:custDataLst>
+          </p:nvPr>
+        </p:nvSpPr>
+        <p:spPr>
+          <a:xfrm rot="10800000" flipV="1">
+            <a:off x="5541645" y="4186555"/>
+            <a:ext cx="2269490" cy="2671445"/>
+          </a:xfrm>
+          <a:prstGeom prst="roundRect">
+            <a:avLst>
+              <a:gd name="adj" fmla="val 10039"/>
+            </a:avLst>
+          </a:prstGeom>
+          <a:noFill/>
+          <a:ln w="38100">
+            <a:solidFill>
+              <a:schemeClr val="tx1"/>
+            </a:solidFill>
+            <a:prstDash val="lgDash"/>
+          </a:ln>
+        </p:spPr>
+        <p:style>
+          <a:lnRef idx="2">
+            <a:schemeClr val="accent1">
+              <a:shade val="15000"/>
+            </a:schemeClr>
+          </a:lnRef>
+          <a:fillRef idx="1">
+            <a:schemeClr val="accent1"/>
+          </a:fillRef>
+          <a:effectRef idx="0">
+            <a:schemeClr val="accent1"/>
+          </a:effectRef>
+          <a:fontRef idx="minor">
+            <a:schemeClr val="lt1"/>
+          </a:fontRef>
+        </p:style>
+        <p:txBody>
+          <a:bodyPr rtlCol="0" anchor="ctr"/>
+          <a:p>
+            <a:pPr algn="ctr"/>
+            <a:endParaRPr lang="zh-CN" altLang="en-US"/>
+          </a:p>
+        </p:txBody>
+      </p:sp>
+      <p:sp>
+        <p:nvSpPr>
+          <p:cNvPr id="15" name="矩形: 圆角 36"/>
+          <p:cNvSpPr/>
+          <p:nvPr>
+            <p:custDataLst>
+              <p:tags r:id="rId14"/>
+            </p:custDataLst>
+          </p:nvPr>
+        </p:nvSpPr>
+        <p:spPr>
+          <a:xfrm rot="10800000" flipV="1">
+            <a:off x="3482975" y="3054985"/>
+            <a:ext cx="2367280" cy="1896110"/>
+          </a:xfrm>
+          <a:prstGeom prst="roundRect">
+            <a:avLst>
+              <a:gd name="adj" fmla="val 10039"/>
+            </a:avLst>
+          </a:prstGeom>
+          <a:noFill/>
+          <a:ln w="38100">
+            <a:solidFill>
+              <a:schemeClr val="tx1"/>
+            </a:solidFill>
+            <a:prstDash val="lgDash"/>
+          </a:ln>
+        </p:spPr>
+        <p:style>
+          <a:lnRef idx="2">
+            <a:schemeClr val="accent1">
+              <a:shade val="15000"/>
+            </a:schemeClr>
+          </a:lnRef>
+          <a:fillRef idx="1">
+            <a:schemeClr val="accent1"/>
+          </a:fillRef>
+          <a:effectRef idx="0">
+            <a:schemeClr val="accent1"/>
+          </a:effectRef>
+          <a:fontRef idx="minor">
+            <a:schemeClr val="lt1"/>
+          </a:fontRef>
+        </p:style>
+        <p:txBody>
+          <a:bodyPr rtlCol="0" anchor="ctr"/>
+          <a:p>
+            <a:pPr algn="ctr"/>
+            <a:endParaRPr lang="zh-CN" altLang="en-US"/>
+          </a:p>
+        </p:txBody>
+      </p:sp>
+      <p:sp>
+        <p:nvSpPr>
+          <p:cNvPr id="16" name="矩形: 圆角 36"/>
+          <p:cNvSpPr/>
+          <p:nvPr>
+            <p:custDataLst>
+              <p:tags r:id="rId15"/>
+            </p:custDataLst>
+          </p:nvPr>
+        </p:nvSpPr>
+        <p:spPr>
+          <a:xfrm rot="10800000" flipV="1">
+            <a:off x="285115" y="1279525"/>
+            <a:ext cx="4340860" cy="1276985"/>
+          </a:xfrm>
+          <a:prstGeom prst="roundRect">
+            <a:avLst>
+              <a:gd name="adj" fmla="val 10039"/>
+            </a:avLst>
+          </a:prstGeom>
+          <a:noFill/>
+          <a:ln w="38100">
+            <a:solidFill>
+              <a:schemeClr val="tx1"/>
+            </a:solidFill>
+            <a:prstDash val="lgDash"/>
+          </a:ln>
+        </p:spPr>
+        <p:style>
+          <a:lnRef idx="2">
+            <a:schemeClr val="accent1">
+              <a:shade val="15000"/>
+            </a:schemeClr>
+          </a:lnRef>
+          <a:fillRef idx="1">
+            <a:schemeClr val="accent1"/>
+          </a:fillRef>
+          <a:effectRef idx="0">
+            <a:schemeClr val="accent1"/>
+          </a:effectRef>
+          <a:fontRef idx="minor">
+            <a:schemeClr val="lt1"/>
+          </a:fontRef>
+        </p:style>
+        <p:txBody>
+          <a:bodyPr rtlCol="0" anchor="ctr"/>
+          <a:p>
+            <a:pPr algn="ctr"/>
+            <a:endParaRPr lang="zh-CN" altLang="en-US"/>
+          </a:p>
+        </p:txBody>
+      </p:sp>
+      <p:sp>
+        <p:nvSpPr>
+          <p:cNvPr id="17" name="矩形: 圆角 36"/>
+          <p:cNvSpPr/>
+          <p:nvPr>
+            <p:custDataLst>
+              <p:tags r:id="rId16"/>
+            </p:custDataLst>
+          </p:nvPr>
+        </p:nvSpPr>
+        <p:spPr>
+          <a:xfrm rot="10800000" flipV="1">
+            <a:off x="6465570" y="462280"/>
+            <a:ext cx="1345565" cy="1276985"/>
+          </a:xfrm>
+          <a:prstGeom prst="roundRect">
+            <a:avLst>
+              <a:gd name="adj" fmla="val 10039"/>
+            </a:avLst>
+          </a:prstGeom>
+          <a:noFill/>
+          <a:ln w="38100">
+            <a:solidFill>
+              <a:schemeClr val="tx1"/>
+            </a:solidFill>
+            <a:prstDash val="lgDash"/>
+          </a:ln>
+        </p:spPr>
+        <p:style>
+          <a:lnRef idx="2">
+            <a:schemeClr val="accent1">
+              <a:shade val="15000"/>
+            </a:schemeClr>
+          </a:lnRef>
+          <a:fillRef idx="1">
+            <a:schemeClr val="accent1"/>
+          </a:fillRef>
+          <a:effectRef idx="0">
+            <a:schemeClr val="accent1"/>
+          </a:effectRef>
+          <a:fontRef idx="minor">
+            <a:schemeClr val="lt1"/>
+          </a:fontRef>
+        </p:style>
+        <p:txBody>
+          <a:bodyPr rtlCol="0" anchor="ctr"/>
+          <a:p>
+            <a:pPr algn="ctr"/>
+            <a:endParaRPr lang="zh-CN" altLang="en-US"/>
+          </a:p>
+        </p:txBody>
+      </p:sp>
+      <p:sp>
+        <p:nvSpPr>
+          <p:cNvPr id="19" name="矩形: 圆角 36"/>
+          <p:cNvSpPr/>
+          <p:nvPr>
+            <p:custDataLst>
+              <p:tags r:id="rId17"/>
+            </p:custDataLst>
+          </p:nvPr>
+        </p:nvSpPr>
+        <p:spPr>
+          <a:xfrm rot="10800000" flipV="1">
+            <a:off x="8789035" y="2922270"/>
+            <a:ext cx="3169285" cy="3589655"/>
+          </a:xfrm>
+          <a:prstGeom prst="roundRect">
+            <a:avLst>
+              <a:gd name="adj" fmla="val 10039"/>
+            </a:avLst>
+          </a:prstGeom>
+          <a:noFill/>
+          <a:ln w="38100">
+            <a:solidFill>
+              <a:schemeClr val="tx1"/>
+            </a:solidFill>
+            <a:prstDash val="lgDash"/>
+          </a:ln>
+        </p:spPr>
+        <p:style>
+          <a:lnRef idx="2">
+            <a:schemeClr val="accent1">
+              <a:shade val="15000"/>
+            </a:schemeClr>
+          </a:lnRef>
+          <a:fillRef idx="1">
+            <a:schemeClr val="accent1"/>
+          </a:fillRef>
+          <a:effectRef idx="0">
+            <a:schemeClr val="accent1"/>
+          </a:effectRef>
+          <a:fontRef idx="minor">
+            <a:schemeClr val="lt1"/>
+          </a:fontRef>
+        </p:style>
+        <p:txBody>
+          <a:bodyPr rtlCol="0" anchor="ctr"/>
+          <a:p>
+            <a:pPr algn="ctr"/>
+            <a:endParaRPr lang="zh-CN" altLang="en-US"/>
+          </a:p>
+        </p:txBody>
+      </p:sp>
+      <p:sp>
+        <p:nvSpPr>
+          <p:cNvPr id="20" name="矩形: 圆角 36"/>
+          <p:cNvSpPr/>
+          <p:nvPr>
+            <p:custDataLst>
+              <p:tags r:id="rId18"/>
+            </p:custDataLst>
+          </p:nvPr>
+        </p:nvSpPr>
+        <p:spPr>
+          <a:xfrm rot="10800000" flipV="1">
+            <a:off x="5619750" y="1741805"/>
+            <a:ext cx="3169285" cy="2137410"/>
+          </a:xfrm>
+          <a:prstGeom prst="roundRect">
+            <a:avLst>
+              <a:gd name="adj" fmla="val 10039"/>
+            </a:avLst>
+          </a:prstGeom>
+          <a:noFill/>
+          <a:ln w="38100">
+            <a:solidFill>
+              <a:schemeClr val="tx1"/>
+            </a:solidFill>
+            <a:prstDash val="lgDash"/>
+          </a:ln>
+        </p:spPr>
+        <p:style>
+          <a:lnRef idx="2">
+            <a:schemeClr val="accent1">
+              <a:shade val="15000"/>
+            </a:schemeClr>
+          </a:lnRef>
+          <a:fillRef idx="1">
+            <a:schemeClr val="accent1"/>
+          </a:fillRef>
+          <a:effectRef idx="0">
+            <a:schemeClr val="accent1"/>
+          </a:effectRef>
+          <a:fontRef idx="minor">
+            <a:schemeClr val="lt1"/>
+          </a:fontRef>
+        </p:style>
+        <p:txBody>
+          <a:bodyPr rtlCol="0" anchor="ctr"/>
+          <a:p>
+            <a:pPr algn="ctr"/>
+            <a:endParaRPr lang="zh-CN" altLang="en-US"/>
+          </a:p>
+        </p:txBody>
+      </p:sp>
+      <p:sp>
+        <p:nvSpPr>
+          <p:cNvPr id="21" name="文本框 20"/>
+          <p:cNvSpPr txBox="1"/>
+          <p:nvPr>
+            <p:custDataLst>
+              <p:tags r:id="rId19"/>
+            </p:custDataLst>
+          </p:nvPr>
+        </p:nvSpPr>
+        <p:spPr>
+          <a:xfrm>
+            <a:off x="1455420" y="0"/>
+            <a:ext cx="2757805" cy="423545"/>
+          </a:xfrm>
+          <a:prstGeom prst="rect">
+            <a:avLst/>
+          </a:prstGeom>
+          <a:noFill/>
+        </p:spPr>
+        <p:txBody>
+          <a:bodyPr wrap="square" rtlCol="0">
+            <a:noAutofit/>
+          </a:bodyPr>
+          <a:p>
+            <a:pPr algn="ctr"/>
+            <a:r>
+              <a:rPr lang="zh-CN" altLang="en-US" sz="1400" b="1">
+                <a:latin typeface="微软雅黑" charset="0"/>
+                <a:ea typeface="微软雅黑" charset="0"/>
+                <a:cs typeface="微软雅黑" charset="0"/>
+              </a:rPr>
+              <a:t>最终优化损失</a:t>
+            </a:r>
+            <a:br>
+              <a:rPr lang="zh-CN" altLang="en-US" sz="1400" b="1">
+                <a:latin typeface="微软雅黑" charset="0"/>
+                <a:ea typeface="微软雅黑" charset="0"/>
+                <a:cs typeface="微软雅黑" charset="0"/>
+              </a:rPr>
+            </a:br>
+            <a:r>
+              <a:rPr lang="zh-CN" altLang="en-US" sz="1400" b="1">
+                <a:latin typeface="微软雅黑" charset="0"/>
+                <a:ea typeface="微软雅黑" charset="0"/>
+                <a:cs typeface="微软雅黑" charset="0"/>
+              </a:rPr>
+              <a:t>需要两轮</a:t>
+            </a:r>
+            <a:r>
+              <a:rPr lang="en-US" altLang="zh-CN" sz="1400" b="1">
+                <a:latin typeface="微软雅黑" charset="0"/>
+                <a:ea typeface="微软雅黑" charset="0"/>
+                <a:cs typeface="微软雅黑" charset="0"/>
+              </a:rPr>
+              <a:t>Forward(MASK T,T)</a:t>
+            </a:r>
+            <a:endParaRPr lang="en-US" altLang="zh-CN" sz="1400" b="1">
+              <a:latin typeface="微软雅黑" charset="0"/>
+              <a:ea typeface="微软雅黑" charset="0"/>
+              <a:cs typeface="微软雅黑" charset="0"/>
+            </a:endParaRPr>
+          </a:p>
+        </p:txBody>
+      </p:sp>
+      <p:sp>
+        <p:nvSpPr>
+          <p:cNvPr id="22" name="矩形: 圆角 36"/>
+          <p:cNvSpPr/>
+          <p:nvPr>
+            <p:custDataLst>
+              <p:tags r:id="rId20"/>
+            </p:custDataLst>
+          </p:nvPr>
+        </p:nvSpPr>
+        <p:spPr>
+          <a:xfrm rot="10800000" flipV="1">
+            <a:off x="768985" y="0"/>
+            <a:ext cx="4698365" cy="1113155"/>
+          </a:xfrm>
+          <a:prstGeom prst="roundRect">
+            <a:avLst>
+              <a:gd name="adj" fmla="val 10039"/>
+            </a:avLst>
+          </a:prstGeom>
+          <a:noFill/>
+          <a:ln w="38100">
+            <a:solidFill>
+              <a:schemeClr val="tx1"/>
+            </a:solidFill>
+            <a:prstDash val="lgDash"/>
+          </a:ln>
+        </p:spPr>
+        <p:style>
+          <a:lnRef idx="2">
+            <a:schemeClr val="accent1">
+              <a:shade val="15000"/>
+            </a:schemeClr>
+          </a:lnRef>
+          <a:fillRef idx="1">
+            <a:schemeClr val="accent1"/>
+          </a:fillRef>
+          <a:effectRef idx="0">
+            <a:schemeClr val="accent1"/>
+          </a:effectRef>
+          <a:fontRef idx="minor">
+            <a:schemeClr val="lt1"/>
+          </a:fontRef>
+        </p:style>
+        <p:txBody>
+          <a:bodyPr rtlCol="0" anchor="ctr"/>
+          <a:p>
+            <a:pPr algn="ctr"/>
+            <a:endParaRPr lang="zh-CN" altLang="en-US"/>
           </a:p>
         </p:txBody>
       </p:sp>
@@ -7881,6 +8867,64 @@
 </p:sld>
 </file>
 
+<file path=ppt/slides/slide9.xml><?xml version="1.0" encoding="utf-8"?>
+<p:sld xmlns:a="http://schemas.openxmlformats.org/drawingml/2006/main" xmlns:r="http://schemas.openxmlformats.org/officeDocument/2006/relationships" xmlns:p="http://schemas.openxmlformats.org/presentationml/2006/main">
+  <p:cSld>
+    <p:spTree>
+      <p:nvGrpSpPr>
+        <p:cNvPr id="1" name=""/>
+        <p:cNvGrpSpPr/>
+        <p:nvPr/>
+      </p:nvGrpSpPr>
+      <p:grpSpPr/>
+      <p:sp>
+        <p:nvSpPr>
+          <p:cNvPr id="2" name="标题 1"/>
+          <p:cNvSpPr>
+            <a:spLocks noGrp="1"/>
+          </p:cNvSpPr>
+          <p:nvPr>
+            <p:ph type="ctrTitle"/>
+          </p:nvPr>
+        </p:nvSpPr>
+        <p:spPr/>
+        <p:txBody>
+          <a:bodyPr/>
+          <a:p>
+            <a:r>
+              <a:rPr lang="en-US" altLang="zh-CN"/>
+              <a:t>VLMo</a:t>
+            </a:r>
+            <a:endParaRPr lang="en-US" altLang="zh-CN"/>
+          </a:p>
+        </p:txBody>
+      </p:sp>
+      <p:sp>
+        <p:nvSpPr>
+          <p:cNvPr id="3" name="副标题 2"/>
+          <p:cNvSpPr>
+            <a:spLocks noGrp="1"/>
+          </p:cNvSpPr>
+          <p:nvPr>
+            <p:ph type="subTitle" idx="1"/>
+          </p:nvPr>
+        </p:nvSpPr>
+        <p:spPr/>
+        <p:txBody>
+          <a:bodyPr/>
+          <a:p>
+            <a:endParaRPr lang="zh-CN" altLang="en-US"/>
+          </a:p>
+        </p:txBody>
+      </p:sp>
+    </p:spTree>
+  </p:cSld>
+  <p:clrMapOvr>
+    <a:masterClrMapping/>
+  </p:clrMapOvr>
+</p:sld>
+</file>
+
 <file path=ppt/tags/tag1.xml><?xml version="1.0" encoding="utf-8"?>
 <p:tagLst xmlns:p="http://schemas.openxmlformats.org/presentationml/2006/main">
   <p:tag name="KSO_WM_BEAUTIFY_FLAG" val=""/>
@@ -8247,13 +9291,127 @@
 </p:tagLst>
 </file>
 
+<file path=ppt/tags/tag65.xml><?xml version="1.0" encoding="utf-8"?>
+<p:tagLst xmlns:p="http://schemas.openxmlformats.org/presentationml/2006/main">
+  <p:tag name="KSO_WM_BEAUTIFY_FLAG" val=""/>
+</p:tagLst>
+</file>
+
+<file path=ppt/tags/tag66.xml><?xml version="1.0" encoding="utf-8"?>
+<p:tagLst xmlns:p="http://schemas.openxmlformats.org/presentationml/2006/main">
+  <p:tag name="KSO_WM_BEAUTIFY_FLAG" val=""/>
+</p:tagLst>
+</file>
+
+<file path=ppt/tags/tag67.xml><?xml version="1.0" encoding="utf-8"?>
+<p:tagLst xmlns:p="http://schemas.openxmlformats.org/presentationml/2006/main">
+  <p:tag name="KSO_WM_BEAUTIFY_FLAG" val=""/>
+</p:tagLst>
+</file>
+
+<file path=ppt/tags/tag68.xml><?xml version="1.0" encoding="utf-8"?>
+<p:tagLst xmlns:p="http://schemas.openxmlformats.org/presentationml/2006/main">
+  <p:tag name="KSO_WM_BEAUTIFY_FLAG" val=""/>
+</p:tagLst>
+</file>
+
+<file path=ppt/tags/tag69.xml><?xml version="1.0" encoding="utf-8"?>
+<p:tagLst xmlns:p="http://schemas.openxmlformats.org/presentationml/2006/main">
+  <p:tag name="KSO_WM_BEAUTIFY_FLAG" val=""/>
+</p:tagLst>
+</file>
+
 <file path=ppt/tags/tag7.xml><?xml version="1.0" encoding="utf-8"?>
 <p:tagLst xmlns:p="http://schemas.openxmlformats.org/presentationml/2006/main">
   <p:tag name="KSO_WM_BEAUTIFY_FLAG" val=""/>
 </p:tagLst>
 </file>
 
+<file path=ppt/tags/tag70.xml><?xml version="1.0" encoding="utf-8"?>
+<p:tagLst xmlns:p="http://schemas.openxmlformats.org/presentationml/2006/main">
+  <p:tag name="KSO_WM_BEAUTIFY_FLAG" val=""/>
+</p:tagLst>
+</file>
+
+<file path=ppt/tags/tag71.xml><?xml version="1.0" encoding="utf-8"?>
+<p:tagLst xmlns:p="http://schemas.openxmlformats.org/presentationml/2006/main">
+  <p:tag name="KSO_WM_BEAUTIFY_FLAG" val=""/>
+</p:tagLst>
+</file>
+
+<file path=ppt/tags/tag72.xml><?xml version="1.0" encoding="utf-8"?>
+<p:tagLst xmlns:p="http://schemas.openxmlformats.org/presentationml/2006/main">
+  <p:tag name="KSO_WM_BEAUTIFY_FLAG" val=""/>
+</p:tagLst>
+</file>
+
+<file path=ppt/tags/tag73.xml><?xml version="1.0" encoding="utf-8"?>
+<p:tagLst xmlns:p="http://schemas.openxmlformats.org/presentationml/2006/main">
+  <p:tag name="KSO_WM_BEAUTIFY_FLAG" val=""/>
+</p:tagLst>
+</file>
+
+<file path=ppt/tags/tag74.xml><?xml version="1.0" encoding="utf-8"?>
+<p:tagLst xmlns:p="http://schemas.openxmlformats.org/presentationml/2006/main">
+  <p:tag name="KSO_WM_BEAUTIFY_FLAG" val=""/>
+</p:tagLst>
+</file>
+
+<file path=ppt/tags/tag75.xml><?xml version="1.0" encoding="utf-8"?>
+<p:tagLst xmlns:p="http://schemas.openxmlformats.org/presentationml/2006/main">
+  <p:tag name="KSO_WM_BEAUTIFY_FLAG" val=""/>
+</p:tagLst>
+</file>
+
+<file path=ppt/tags/tag76.xml><?xml version="1.0" encoding="utf-8"?>
+<p:tagLst xmlns:p="http://schemas.openxmlformats.org/presentationml/2006/main">
+  <p:tag name="KSO_WM_BEAUTIFY_FLAG" val=""/>
+</p:tagLst>
+</file>
+
+<file path=ppt/tags/tag77.xml><?xml version="1.0" encoding="utf-8"?>
+<p:tagLst xmlns:p="http://schemas.openxmlformats.org/presentationml/2006/main">
+  <p:tag name="KSO_WM_BEAUTIFY_FLAG" val=""/>
+</p:tagLst>
+</file>
+
+<file path=ppt/tags/tag78.xml><?xml version="1.0" encoding="utf-8"?>
+<p:tagLst xmlns:p="http://schemas.openxmlformats.org/presentationml/2006/main">
+  <p:tag name="KSO_WM_BEAUTIFY_FLAG" val=""/>
+</p:tagLst>
+</file>
+
+<file path=ppt/tags/tag79.xml><?xml version="1.0" encoding="utf-8"?>
+<p:tagLst xmlns:p="http://schemas.openxmlformats.org/presentationml/2006/main">
+  <p:tag name="KSO_WM_BEAUTIFY_FLAG" val=""/>
+</p:tagLst>
+</file>
+
 <file path=ppt/tags/tag8.xml><?xml version="1.0" encoding="utf-8"?>
+<p:tagLst xmlns:p="http://schemas.openxmlformats.org/presentationml/2006/main">
+  <p:tag name="KSO_WM_BEAUTIFY_FLAG" val=""/>
+</p:tagLst>
+</file>
+
+<file path=ppt/tags/tag80.xml><?xml version="1.0" encoding="utf-8"?>
+<p:tagLst xmlns:p="http://schemas.openxmlformats.org/presentationml/2006/main">
+  <p:tag name="KSO_WM_BEAUTIFY_FLAG" val=""/>
+</p:tagLst>
+</file>
+
+<file path=ppt/tags/tag81.xml><?xml version="1.0" encoding="utf-8"?>
+<p:tagLst xmlns:p="http://schemas.openxmlformats.org/presentationml/2006/main">
+  <p:tag name="KSO_WM_BEAUTIFY_FLAG" val=""/>
+</p:tagLst>
+</file>
+
+<file path=ppt/tags/tag82.xml><?xml version="1.0" encoding="utf-8"?>
+<p:tagLst xmlns:p="http://schemas.openxmlformats.org/presentationml/2006/main">
+  <p:tag name="KSO_WM_BEAUTIFY_FLAG" val=""/>
+</p:tagLst>
+</file>
+
+<file path=ppt/tags/tag83.xml><?xml version="1.0" encoding="utf-8"?>
 <p:tagLst xmlns:p="http://schemas.openxmlformats.org/presentationml/2006/main">
   <p:tag name="KSO_WM_BEAUTIFY_FLAG" val=""/>
 </p:tagLst>

</xml_diff>

<commit_message>
update_BLIP: Bootstrapping Language-Image Pre-training for  Unified Vision-Language Understanding and Generation
</commit_message>
<xml_diff>
--- a/Base_Model/VLM+VLLM/论文插图.pptx
+++ b/Base_Model/VLM+VLLM/论文插图.pptx
@@ -8,7 +8,7 @@
     <p:notesMasterId r:id="rId4"/>
   </p:notesMasterIdLst>
   <p:handoutMasterIdLst>
-    <p:handoutMasterId r:id="rId14"/>
+    <p:handoutMasterId r:id="rId16"/>
   </p:handoutMasterIdLst>
   <p:sldIdLst>
     <p:sldId id="256" r:id="rId3"/>
@@ -21,6 +21,8 @@
     <p:sldId id="263" r:id="rId11"/>
     <p:sldId id="264" r:id="rId12"/>
     <p:sldId id="265" r:id="rId13"/>
+    <p:sldId id="266" r:id="rId14"/>
+    <p:sldId id="267" r:id="rId15"/>
   </p:sldIdLst>
   <p:sldSz cx="12192000" cy="6858000"/>
   <p:notesSz cx="7103745" cy="10234295"/>
@@ -127,7 +129,7 @@
             <a:srgbClr val="A4A3A4"/>
           </p15:clr>
         </p15:guide>
-        <p15:guide id="2" pos="3840" userDrawn="1">
+        <p15:guide id="2" pos="3872" userDrawn="1">
           <p15:clr>
             <a:srgbClr val="A4A3A4"/>
           </p15:clr>
@@ -3593,7 +3595,7 @@
       <p:grpSpPr/>
       <p:pic>
         <p:nvPicPr>
-          <p:cNvPr id="5" name="图片 4"/>
+          <p:cNvPr id="18" name="图片 17"/>
           <p:cNvPicPr>
             <a:picLocks noChangeAspect="1"/>
           </p:cNvPicPr>
@@ -3611,6 +3613,62 @@
         </p:blipFill>
         <p:spPr>
           <a:xfrm>
+            <a:off x="7929880" y="2947670"/>
+            <a:ext cx="3515360" cy="1881505"/>
+          </a:xfrm>
+          <a:prstGeom prst="rect">
+            <a:avLst/>
+          </a:prstGeom>
+        </p:spPr>
+      </p:pic>
+      <p:pic>
+        <p:nvPicPr>
+          <p:cNvPr id="17" name="图片 16"/>
+          <p:cNvPicPr>
+            <a:picLocks noChangeAspect="1"/>
+          </p:cNvPicPr>
+          <p:nvPr>
+            <p:custDataLst>
+              <p:tags r:id="rId3"/>
+            </p:custDataLst>
+          </p:nvPr>
+        </p:nvPicPr>
+        <p:blipFill>
+          <a:blip r:embed="rId4"/>
+          <a:stretch>
+            <a:fillRect/>
+          </a:stretch>
+        </p:blipFill>
+        <p:spPr>
+          <a:xfrm>
+            <a:off x="7757160" y="607695"/>
+            <a:ext cx="4123690" cy="1807210"/>
+          </a:xfrm>
+          <a:prstGeom prst="rect">
+            <a:avLst/>
+          </a:prstGeom>
+        </p:spPr>
+      </p:pic>
+      <p:pic>
+        <p:nvPicPr>
+          <p:cNvPr id="5" name="图片 4"/>
+          <p:cNvPicPr>
+            <a:picLocks noChangeAspect="1"/>
+          </p:cNvPicPr>
+          <p:nvPr>
+            <p:custDataLst>
+              <p:tags r:id="rId5"/>
+            </p:custDataLst>
+          </p:nvPr>
+        </p:nvPicPr>
+        <p:blipFill>
+          <a:blip r:embed="rId6"/>
+          <a:stretch>
+            <a:fillRect/>
+          </a:stretch>
+        </p:blipFill>
+        <p:spPr>
+          <a:xfrm>
             <a:off x="0" y="4928870"/>
             <a:ext cx="6373495" cy="1929130"/>
           </a:xfrm>
@@ -3627,12 +3685,12 @@
           </p:cNvPicPr>
           <p:nvPr>
             <p:custDataLst>
-              <p:tags r:id="rId3"/>
+              <p:tags r:id="rId7"/>
             </p:custDataLst>
           </p:nvPr>
         </p:nvPicPr>
         <p:blipFill>
-          <a:blip r:embed="rId4"/>
+          <a:blip r:embed="rId8"/>
           <a:stretch>
             <a:fillRect/>
           </a:stretch>
@@ -3655,12 +3713,12 @@
           </p:cNvPicPr>
           <p:nvPr>
             <p:custDataLst>
-              <p:tags r:id="rId5"/>
+              <p:tags r:id="rId9"/>
             </p:custDataLst>
           </p:nvPr>
         </p:nvPicPr>
         <p:blipFill>
-          <a:blip r:embed="rId6"/>
+          <a:blip r:embed="rId10"/>
           <a:stretch>
             <a:fillRect/>
           </a:stretch>
@@ -3683,12 +3741,12 @@
           </p:cNvPicPr>
           <p:nvPr>
             <p:custDataLst>
-              <p:tags r:id="rId7"/>
+              <p:tags r:id="rId11"/>
             </p:custDataLst>
           </p:nvPr>
         </p:nvPicPr>
         <p:blipFill>
-          <a:blip r:embed="rId8"/>
+          <a:blip r:embed="rId12"/>
           <a:stretch>
             <a:fillRect/>
           </a:stretch>
@@ -3703,47 +3761,19 @@
           </a:prstGeom>
         </p:spPr>
       </p:pic>
-      <p:pic>
-        <p:nvPicPr>
-          <p:cNvPr id="9" name="图片 8"/>
-          <p:cNvPicPr>
-            <a:picLocks noChangeAspect="1"/>
-          </p:cNvPicPr>
-          <p:nvPr>
-            <p:custDataLst>
-              <p:tags r:id="rId9"/>
-            </p:custDataLst>
-          </p:nvPr>
-        </p:nvPicPr>
-        <p:blipFill>
-          <a:blip r:embed="rId10"/>
-          <a:stretch>
-            <a:fillRect/>
-          </a:stretch>
-        </p:blipFill>
-        <p:spPr>
-          <a:xfrm>
-            <a:off x="7896860" y="486410"/>
-            <a:ext cx="3504565" cy="5306695"/>
-          </a:xfrm>
-          <a:prstGeom prst="rect">
-            <a:avLst/>
-          </a:prstGeom>
-        </p:spPr>
-      </p:pic>
       <p:sp>
         <p:nvSpPr>
           <p:cNvPr id="10" name="文本框 9"/>
           <p:cNvSpPr txBox="1"/>
           <p:nvPr>
             <p:custDataLst>
-              <p:tags r:id="rId11"/>
+              <p:tags r:id="rId13"/>
             </p:custDataLst>
           </p:nvPr>
         </p:nvSpPr>
         <p:spPr>
           <a:xfrm>
-            <a:off x="2099310" y="5046980"/>
+            <a:off x="2232025" y="4817745"/>
             <a:ext cx="2175510" cy="364490"/>
           </a:xfrm>
           <a:prstGeom prst="rect">
@@ -3787,7 +3817,7 @@
           <p:cNvSpPr txBox="1"/>
           <p:nvPr>
             <p:custDataLst>
-              <p:tags r:id="rId12"/>
+              <p:tags r:id="rId14"/>
             </p:custDataLst>
           </p:nvPr>
         </p:nvSpPr>
@@ -3837,7 +3867,7 @@
           <p:cNvSpPr txBox="1"/>
           <p:nvPr>
             <p:custDataLst>
-              <p:tags r:id="rId13"/>
+              <p:tags r:id="rId15"/>
             </p:custDataLst>
           </p:nvPr>
         </p:nvSpPr>
@@ -3926,7 +3956,7 @@
           <p:cNvSpPr txBox="1"/>
           <p:nvPr>
             <p:custDataLst>
-              <p:tags r:id="rId14"/>
+              <p:tags r:id="rId16"/>
             </p:custDataLst>
           </p:nvPr>
         </p:nvSpPr>
@@ -3947,12 +3977,35 @@
           <a:p>
             <a:pPr algn="ctr"/>
             <a:r>
+              <a:rPr lang="en-US" altLang="zh-CN" sz="1400" b="1">
+                <a:latin typeface="微软雅黑" charset="0"/>
+                <a:ea typeface="微软雅黑" charset="0"/>
+                <a:cs typeface="微软雅黑" charset="0"/>
+              </a:rPr>
+              <a:t>ITC</a:t>
+            </a:r>
+            <a:r>
               <a:rPr lang="zh-CN" altLang="en-US" sz="1400" b="1">
                 <a:latin typeface="微软雅黑" charset="0"/>
                 <a:ea typeface="微软雅黑" charset="0"/>
                 <a:cs typeface="微软雅黑" charset="0"/>
               </a:rPr>
               <a:t>对比学习</a:t>
+            </a:r>
+            <a:br>
+              <a:rPr lang="zh-CN" altLang="en-US" sz="1400" b="1">
+                <a:latin typeface="微软雅黑" charset="0"/>
+                <a:ea typeface="微软雅黑" charset="0"/>
+                <a:cs typeface="微软雅黑" charset="0"/>
+              </a:rPr>
+            </a:br>
+            <a:r>
+              <a:rPr lang="zh-CN" altLang="en-US" sz="1400" b="1">
+                <a:latin typeface="微软雅黑" charset="0"/>
+                <a:ea typeface="微软雅黑" charset="0"/>
+                <a:cs typeface="微软雅黑" charset="0"/>
+              </a:rPr>
+              <a:t>双流架构</a:t>
             </a:r>
             <a:br>
               <a:rPr lang="en-US" altLang="zh-CN" sz="1400" b="1">
@@ -3967,6 +4020,160 @@
                 <a:ea typeface="微软雅黑" charset="0"/>
                 <a:cs typeface="微软雅黑" charset="0"/>
               </a:rPr>
+              <a:t>CLIP</a:t>
+            </a:r>
+            <a:r>
+              <a:rPr lang="zh-CN" altLang="en-US" sz="1400" b="1">
+                <a:latin typeface="微软雅黑" charset="0"/>
+                <a:ea typeface="微软雅黑" charset="0"/>
+                <a:cs typeface="微软雅黑" charset="0"/>
+              </a:rPr>
+              <a:t>的思想进行对比</a:t>
+            </a:r>
+            <a:r>
+              <a:rPr lang="zh-CN" altLang="en-US" sz="1400" b="1">
+                <a:latin typeface="微软雅黑" charset="0"/>
+                <a:ea typeface="微软雅黑" charset="0"/>
+                <a:cs typeface="微软雅黑" charset="0"/>
+              </a:rPr>
+              <a:t>学习</a:t>
+            </a:r>
+            <a:endParaRPr lang="zh-CN" altLang="en-US" sz="1400" b="1">
+              <a:latin typeface="微软雅黑" charset="0"/>
+              <a:ea typeface="微软雅黑" charset="0"/>
+              <a:cs typeface="微软雅黑" charset="0"/>
+            </a:endParaRPr>
+          </a:p>
+        </p:txBody>
+      </p:sp>
+      <p:sp>
+        <p:nvSpPr>
+          <p:cNvPr id="15" name="文本框 14"/>
+          <p:cNvSpPr txBox="1"/>
+          <p:nvPr>
+            <p:custDataLst>
+              <p:tags r:id="rId17"/>
+            </p:custDataLst>
+          </p:nvPr>
+        </p:nvSpPr>
+        <p:spPr>
+          <a:xfrm>
+            <a:off x="6590665" y="1120775"/>
+            <a:ext cx="1505585" cy="654685"/>
+          </a:xfrm>
+          <a:prstGeom prst="rect">
+            <a:avLst/>
+          </a:prstGeom>
+          <a:noFill/>
+        </p:spPr>
+        <p:txBody>
+          <a:bodyPr wrap="square" rtlCol="0">
+            <a:noAutofit/>
+          </a:bodyPr>
+          <a:p>
+            <a:pPr algn="ctr"/>
+            <a:r>
+              <a:rPr lang="en-US" altLang="zh-CN" sz="1400" b="1">
+                <a:latin typeface="微软雅黑" charset="0"/>
+                <a:ea typeface="微软雅黑" charset="0"/>
+                <a:cs typeface="微软雅黑" charset="0"/>
+              </a:rPr>
+              <a:t>L=12</a:t>
+            </a:r>
+            <a:br>
+              <a:rPr lang="en-US" altLang="zh-CN" sz="1400" b="1">
+                <a:latin typeface="微软雅黑" charset="0"/>
+                <a:ea typeface="微软雅黑" charset="0"/>
+                <a:cs typeface="微软雅黑" charset="0"/>
+              </a:rPr>
+            </a:br>
+            <a:r>
+              <a:rPr lang="zh-CN" altLang="en-US" sz="1400" b="1">
+                <a:latin typeface="微软雅黑" charset="0"/>
+                <a:ea typeface="微软雅黑" charset="0"/>
+                <a:cs typeface="微软雅黑" charset="0"/>
+              </a:rPr>
+              <a:t>层数</a:t>
+            </a:r>
+            <a:br>
+              <a:rPr lang="en-US" altLang="zh-CN" sz="1400" b="1">
+                <a:latin typeface="微软雅黑" charset="0"/>
+                <a:ea typeface="微软雅黑" charset="0"/>
+                <a:cs typeface="微软雅黑" charset="0"/>
+              </a:rPr>
+            </a:br>
+            <a:r>
+              <a:rPr lang="en-US" altLang="zh-CN" sz="1400" b="1">
+                <a:latin typeface="微软雅黑" charset="0"/>
+                <a:ea typeface="微软雅黑" charset="0"/>
+                <a:cs typeface="微软雅黑" charset="0"/>
+              </a:rPr>
+              <a:t>Image=Text</a:t>
+            </a:r>
+            <a:endParaRPr lang="en-US" altLang="zh-CN" sz="1400" b="1">
+              <a:latin typeface="微软雅黑" charset="0"/>
+              <a:ea typeface="微软雅黑" charset="0"/>
+              <a:cs typeface="微软雅黑" charset="0"/>
+            </a:endParaRPr>
+          </a:p>
+        </p:txBody>
+      </p:sp>
+      <p:sp>
+        <p:nvSpPr>
+          <p:cNvPr id="16" name="文本框 15"/>
+          <p:cNvSpPr txBox="1"/>
+          <p:nvPr>
+            <p:custDataLst>
+              <p:tags r:id="rId18"/>
+            </p:custDataLst>
+          </p:nvPr>
+        </p:nvSpPr>
+        <p:spPr>
+          <a:xfrm>
+            <a:off x="8362315" y="2378075"/>
+            <a:ext cx="2950210" cy="654685"/>
+          </a:xfrm>
+          <a:prstGeom prst="rect">
+            <a:avLst/>
+          </a:prstGeom>
+          <a:noFill/>
+        </p:spPr>
+        <p:txBody>
+          <a:bodyPr wrap="square" rtlCol="0">
+            <a:noAutofit/>
+          </a:bodyPr>
+          <a:p>
+            <a:pPr algn="ctr"/>
+            <a:r>
+              <a:rPr lang="en-US" altLang="zh-CN" sz="1400" b="1">
+                <a:latin typeface="微软雅黑" charset="0"/>
+                <a:ea typeface="微软雅黑" charset="0"/>
+                <a:cs typeface="微软雅黑" charset="0"/>
+                <a:sym typeface="+mn-ea"/>
+              </a:rPr>
+              <a:t>ITM</a:t>
+            </a:r>
+            <a:r>
+              <a:rPr lang="zh-CN" altLang="en-US" sz="1400" b="1">
+                <a:latin typeface="微软雅黑" charset="0"/>
+                <a:ea typeface="微软雅黑" charset="0"/>
+                <a:cs typeface="微软雅黑" charset="0"/>
+              </a:rPr>
+              <a:t>匹配</a:t>
+            </a:r>
+            <a:br>
+              <a:rPr lang="en-US" altLang="zh-CN" sz="1400" b="1">
+                <a:latin typeface="微软雅黑" charset="0"/>
+                <a:ea typeface="微软雅黑" charset="0"/>
+                <a:cs typeface="微软雅黑" charset="0"/>
+              </a:rPr>
+            </a:br>
+            <a:r>
+              <a:rPr lang="en-US" altLang="zh-CN" sz="1400" b="1">
+                <a:latin typeface="微软雅黑" charset="0"/>
+                <a:ea typeface="微软雅黑" charset="0"/>
+                <a:cs typeface="微软雅黑" charset="0"/>
+              </a:rPr>
               <a:t>ALBEF</a:t>
             </a:r>
             <a:r>
@@ -4041,6 +4248,1444 @@
               <a:t>负样本</a:t>
             </a:r>
             <a:endParaRPr lang="zh-CN" altLang="en-US" sz="1400" b="1">
+              <a:latin typeface="微软雅黑" charset="0"/>
+              <a:ea typeface="微软雅黑" charset="0"/>
+              <a:cs typeface="微软雅黑" charset="0"/>
+            </a:endParaRPr>
+          </a:p>
+        </p:txBody>
+      </p:sp>
+      <p:sp>
+        <p:nvSpPr>
+          <p:cNvPr id="19" name="文本框 18"/>
+          <p:cNvSpPr txBox="1"/>
+          <p:nvPr>
+            <p:custDataLst>
+              <p:tags r:id="rId19"/>
+            </p:custDataLst>
+          </p:nvPr>
+        </p:nvSpPr>
+        <p:spPr>
+          <a:xfrm>
+            <a:off x="6424295" y="3655060"/>
+            <a:ext cx="1505585" cy="654685"/>
+          </a:xfrm>
+          <a:prstGeom prst="rect">
+            <a:avLst/>
+          </a:prstGeom>
+          <a:noFill/>
+        </p:spPr>
+        <p:txBody>
+          <a:bodyPr wrap="square" rtlCol="0">
+            <a:noAutofit/>
+          </a:bodyPr>
+          <a:p>
+            <a:pPr algn="ctr"/>
+            <a:r>
+              <a:rPr lang="en-US" altLang="zh-CN" sz="1400" b="1">
+                <a:latin typeface="微软雅黑" charset="0"/>
+                <a:ea typeface="微软雅黑" charset="0"/>
+                <a:cs typeface="微软雅黑" charset="0"/>
+              </a:rPr>
+              <a:t>L=12 F=2</a:t>
+            </a:r>
+            <a:br>
+              <a:rPr lang="en-US" altLang="zh-CN" sz="1400" b="1">
+                <a:latin typeface="微软雅黑" charset="0"/>
+                <a:ea typeface="微软雅黑" charset="0"/>
+                <a:cs typeface="微软雅黑" charset="0"/>
+              </a:rPr>
+            </a:br>
+            <a:r>
+              <a:rPr lang="zh-CN" altLang="en-US" sz="1400" b="1">
+                <a:latin typeface="微软雅黑" charset="0"/>
+                <a:ea typeface="微软雅黑" charset="0"/>
+                <a:cs typeface="微软雅黑" charset="0"/>
+              </a:rPr>
+              <a:t>单流架构</a:t>
+            </a:r>
+            <a:endParaRPr lang="en-US" altLang="zh-CN" sz="1400" b="1">
+              <a:latin typeface="微软雅黑" charset="0"/>
+              <a:ea typeface="微软雅黑" charset="0"/>
+              <a:cs typeface="微软雅黑" charset="0"/>
+            </a:endParaRPr>
+          </a:p>
+        </p:txBody>
+      </p:sp>
+      <p:pic>
+        <p:nvPicPr>
+          <p:cNvPr id="20" name="图片 19"/>
+          <p:cNvPicPr>
+            <a:picLocks noChangeAspect="1"/>
+          </p:cNvPicPr>
+          <p:nvPr>
+            <p:custDataLst>
+              <p:tags r:id="rId20"/>
+            </p:custDataLst>
+          </p:nvPr>
+        </p:nvPicPr>
+        <p:blipFill>
+          <a:blip r:embed="rId21"/>
+          <a:stretch>
+            <a:fillRect/>
+          </a:stretch>
+        </p:blipFill>
+        <p:spPr>
+          <a:xfrm>
+            <a:off x="7830820" y="4928870"/>
+            <a:ext cx="3713480" cy="1795145"/>
+          </a:xfrm>
+          <a:prstGeom prst="rect">
+            <a:avLst/>
+          </a:prstGeom>
+        </p:spPr>
+      </p:pic>
+      <p:sp>
+        <p:nvSpPr>
+          <p:cNvPr id="21" name="文本框 20"/>
+          <p:cNvSpPr txBox="1"/>
+          <p:nvPr>
+            <p:custDataLst>
+              <p:tags r:id="rId22"/>
+            </p:custDataLst>
+          </p:nvPr>
+        </p:nvSpPr>
+        <p:spPr>
+          <a:xfrm>
+            <a:off x="6292850" y="5574030"/>
+            <a:ext cx="1505585" cy="654685"/>
+          </a:xfrm>
+          <a:prstGeom prst="rect">
+            <a:avLst/>
+          </a:prstGeom>
+          <a:noFill/>
+        </p:spPr>
+        <p:txBody>
+          <a:bodyPr wrap="square" rtlCol="0">
+            <a:noAutofit/>
+          </a:bodyPr>
+          <a:p>
+            <a:pPr algn="ctr"/>
+            <a:r>
+              <a:rPr lang="en-US" altLang="zh-CN" sz="1400" b="1">
+                <a:latin typeface="微软雅黑" charset="0"/>
+                <a:ea typeface="微软雅黑" charset="0"/>
+                <a:cs typeface="微软雅黑" charset="0"/>
+              </a:rPr>
+              <a:t>L=12 F=2</a:t>
+            </a:r>
+            <a:br>
+              <a:rPr lang="en-US" altLang="zh-CN" sz="1400" b="1">
+                <a:latin typeface="微软雅黑" charset="0"/>
+                <a:ea typeface="微软雅黑" charset="0"/>
+                <a:cs typeface="微软雅黑" charset="0"/>
+              </a:rPr>
+            </a:br>
+            <a:r>
+              <a:rPr lang="zh-CN" altLang="en-US" sz="1400" b="1">
+                <a:latin typeface="微软雅黑" charset="0"/>
+                <a:ea typeface="微软雅黑" charset="0"/>
+                <a:cs typeface="微软雅黑" charset="0"/>
+              </a:rPr>
+              <a:t>单流架构</a:t>
+            </a:r>
+            <a:endParaRPr lang="en-US" altLang="zh-CN" sz="1400" b="1">
+              <a:latin typeface="微软雅黑" charset="0"/>
+              <a:ea typeface="微软雅黑" charset="0"/>
+              <a:cs typeface="微软雅黑" charset="0"/>
+            </a:endParaRPr>
+          </a:p>
+        </p:txBody>
+      </p:sp>
+      <p:sp>
+        <p:nvSpPr>
+          <p:cNvPr id="22" name="文本框 21"/>
+          <p:cNvSpPr txBox="1"/>
+          <p:nvPr>
+            <p:custDataLst>
+              <p:tags r:id="rId23"/>
+            </p:custDataLst>
+          </p:nvPr>
+        </p:nvSpPr>
+        <p:spPr>
+          <a:xfrm>
+            <a:off x="8722995" y="4683760"/>
+            <a:ext cx="2230120" cy="654685"/>
+          </a:xfrm>
+          <a:prstGeom prst="rect">
+            <a:avLst/>
+          </a:prstGeom>
+          <a:noFill/>
+        </p:spPr>
+        <p:txBody>
+          <a:bodyPr wrap="square" rtlCol="0">
+            <a:noAutofit/>
+          </a:bodyPr>
+          <a:p>
+            <a:pPr algn="ctr"/>
+            <a:r>
+              <a:rPr lang="en-US" altLang="zh-CN" sz="1400" b="1">
+                <a:latin typeface="微软雅黑" charset="0"/>
+                <a:ea typeface="微软雅黑" charset="0"/>
+                <a:cs typeface="微软雅黑" charset="0"/>
+              </a:rPr>
+              <a:t>MLM</a:t>
+            </a:r>
+            <a:br>
+              <a:rPr lang="en-US" altLang="zh-CN" sz="1400" b="1">
+                <a:latin typeface="微软雅黑" charset="0"/>
+                <a:ea typeface="微软雅黑" charset="0"/>
+                <a:cs typeface="微软雅黑" charset="0"/>
+              </a:rPr>
+            </a:br>
+            <a:r>
+              <a:rPr lang="en-US" altLang="zh-CN" sz="1400" b="1">
+                <a:latin typeface="微软雅黑" charset="0"/>
+                <a:ea typeface="微软雅黑" charset="0"/>
+                <a:cs typeface="微软雅黑" charset="0"/>
+              </a:rPr>
+              <a:t>BERT</a:t>
+            </a:r>
+            <a:r>
+              <a:rPr lang="zh-CN" altLang="en-US" sz="1400" b="1">
+                <a:latin typeface="微软雅黑" charset="0"/>
+                <a:ea typeface="微软雅黑" charset="0"/>
+                <a:cs typeface="微软雅黑" charset="0"/>
+              </a:rPr>
+              <a:t>的</a:t>
+            </a:r>
+            <a:r>
+              <a:rPr lang="en-US" altLang="zh-CN" sz="1400" b="1">
+                <a:latin typeface="微软雅黑" charset="0"/>
+                <a:ea typeface="微软雅黑" charset="0"/>
+                <a:cs typeface="微软雅黑" charset="0"/>
+              </a:rPr>
+              <a:t>token </a:t>
+            </a:r>
+            <a:r>
+              <a:rPr lang="en-US" altLang="zh-CN" sz="1400" b="1">
+                <a:latin typeface="微软雅黑" charset="0"/>
+                <a:ea typeface="微软雅黑" charset="0"/>
+                <a:cs typeface="微软雅黑" charset="0"/>
+              </a:rPr>
+              <a:t>MASK</a:t>
+            </a:r>
+            <a:endParaRPr lang="en-US" altLang="zh-CN" sz="1400" b="1">
+              <a:latin typeface="微软雅黑" charset="0"/>
+              <a:ea typeface="微软雅黑" charset="0"/>
+              <a:cs typeface="微软雅黑" charset="0"/>
+            </a:endParaRPr>
+          </a:p>
+        </p:txBody>
+      </p:sp>
+      <p:sp>
+        <p:nvSpPr>
+          <p:cNvPr id="23" name="文本框 22"/>
+          <p:cNvSpPr txBox="1"/>
+          <p:nvPr>
+            <p:custDataLst>
+              <p:tags r:id="rId24"/>
+            </p:custDataLst>
+          </p:nvPr>
+        </p:nvSpPr>
+        <p:spPr>
+          <a:xfrm>
+            <a:off x="50800" y="5143500"/>
+            <a:ext cx="2175510" cy="364490"/>
+          </a:xfrm>
+          <a:prstGeom prst="rect">
+            <a:avLst/>
+          </a:prstGeom>
+          <a:noFill/>
+        </p:spPr>
+        <p:txBody>
+          <a:bodyPr wrap="square" rtlCol="0">
+            <a:noAutofit/>
+          </a:bodyPr>
+          <a:p>
+            <a:pPr algn="ctr"/>
+            <a:r>
+              <a:rPr lang="zh-CN" altLang="en-US" sz="1400" b="1">
+                <a:latin typeface="微软雅黑" charset="0"/>
+                <a:ea typeface="微软雅黑" charset="0"/>
+                <a:cs typeface="微软雅黑" charset="0"/>
+              </a:rPr>
+              <a:t>首先使用图像单模态</a:t>
+            </a:r>
+            <a:r>
+              <a:rPr lang="zh-CN" altLang="en-US" sz="1400" b="1">
+                <a:latin typeface="微软雅黑" charset="0"/>
+                <a:ea typeface="微软雅黑" charset="0"/>
+                <a:cs typeface="微软雅黑" charset="0"/>
+              </a:rPr>
+              <a:t>训练</a:t>
+            </a:r>
+            <a:endParaRPr lang="zh-CN" altLang="en-US" sz="1400" b="1">
+              <a:latin typeface="微软雅黑" charset="0"/>
+              <a:ea typeface="微软雅黑" charset="0"/>
+              <a:cs typeface="微软雅黑" charset="0"/>
+            </a:endParaRPr>
+          </a:p>
+        </p:txBody>
+      </p:sp>
+      <p:sp>
+        <p:nvSpPr>
+          <p:cNvPr id="24" name="文本框 23"/>
+          <p:cNvSpPr txBox="1"/>
+          <p:nvPr>
+            <p:custDataLst>
+              <p:tags r:id="rId25"/>
+            </p:custDataLst>
+          </p:nvPr>
+        </p:nvSpPr>
+        <p:spPr>
+          <a:xfrm>
+            <a:off x="2226310" y="5143500"/>
+            <a:ext cx="2175510" cy="364490"/>
+          </a:xfrm>
+          <a:prstGeom prst="rect">
+            <a:avLst/>
+          </a:prstGeom>
+          <a:noFill/>
+        </p:spPr>
+        <p:txBody>
+          <a:bodyPr wrap="square" rtlCol="0">
+            <a:noAutofit/>
+          </a:bodyPr>
+          <a:p>
+            <a:pPr algn="ctr"/>
+            <a:r>
+              <a:rPr lang="zh-CN" altLang="en-US" sz="1400" b="1">
+                <a:latin typeface="微软雅黑" charset="0"/>
+                <a:ea typeface="微软雅黑" charset="0"/>
+                <a:cs typeface="微软雅黑" charset="0"/>
+              </a:rPr>
+              <a:t>使用文本模态训练时</a:t>
+            </a:r>
+            <a:br>
+              <a:rPr lang="zh-CN" altLang="en-US" sz="1400" b="1">
+                <a:latin typeface="微软雅黑" charset="0"/>
+                <a:ea typeface="微软雅黑" charset="0"/>
+                <a:cs typeface="微软雅黑" charset="0"/>
+              </a:rPr>
+            </a:br>
+            <a:r>
+              <a:rPr lang="zh-CN" altLang="en-US" sz="1400" b="1">
+                <a:latin typeface="微软雅黑" charset="0"/>
+                <a:ea typeface="微软雅黑" charset="0"/>
+                <a:cs typeface="微软雅黑" charset="0"/>
+              </a:rPr>
+              <a:t>冻住</a:t>
+            </a:r>
+            <a:r>
+              <a:rPr lang="en-US" altLang="zh-CN" sz="1400" b="1">
+                <a:latin typeface="微软雅黑" charset="0"/>
+                <a:ea typeface="微软雅黑" charset="0"/>
+                <a:cs typeface="微软雅黑" charset="0"/>
+              </a:rPr>
+              <a:t>Att</a:t>
+            </a:r>
+            <a:r>
+              <a:rPr lang="zh-CN" altLang="en-US" sz="1400" b="1">
+                <a:latin typeface="微软雅黑" charset="0"/>
+                <a:ea typeface="微软雅黑" charset="0"/>
+                <a:cs typeface="微软雅黑" charset="0"/>
+              </a:rPr>
+              <a:t>和图像</a:t>
+            </a:r>
+            <a:r>
+              <a:rPr lang="en-US" altLang="zh-CN" sz="1400" b="1">
+                <a:latin typeface="微软雅黑" charset="0"/>
+                <a:ea typeface="微软雅黑" charset="0"/>
+                <a:cs typeface="微软雅黑" charset="0"/>
+              </a:rPr>
+              <a:t>FFN</a:t>
+            </a:r>
+            <a:endParaRPr lang="en-US" altLang="zh-CN" sz="1400" b="1">
+              <a:latin typeface="微软雅黑" charset="0"/>
+              <a:ea typeface="微软雅黑" charset="0"/>
+              <a:cs typeface="微软雅黑" charset="0"/>
+            </a:endParaRPr>
+          </a:p>
+        </p:txBody>
+      </p:sp>
+      <p:sp>
+        <p:nvSpPr>
+          <p:cNvPr id="25" name="文本框 24"/>
+          <p:cNvSpPr txBox="1"/>
+          <p:nvPr>
+            <p:custDataLst>
+              <p:tags r:id="rId26"/>
+            </p:custDataLst>
+          </p:nvPr>
+        </p:nvSpPr>
+        <p:spPr>
+          <a:xfrm>
+            <a:off x="4528820" y="5143500"/>
+            <a:ext cx="2175510" cy="364490"/>
+          </a:xfrm>
+          <a:prstGeom prst="rect">
+            <a:avLst/>
+          </a:prstGeom>
+          <a:noFill/>
+        </p:spPr>
+        <p:txBody>
+          <a:bodyPr wrap="square" rtlCol="0">
+            <a:noAutofit/>
+          </a:bodyPr>
+          <a:p>
+            <a:pPr algn="ctr"/>
+            <a:r>
+              <a:rPr lang="zh-CN" altLang="en-US" sz="1400" b="1">
+                <a:latin typeface="微软雅黑" charset="0"/>
+                <a:ea typeface="微软雅黑" charset="0"/>
+                <a:cs typeface="微软雅黑" charset="0"/>
+              </a:rPr>
+              <a:t>使用多模态训练时</a:t>
+            </a:r>
+            <a:br>
+              <a:rPr lang="zh-CN" altLang="en-US" sz="1400" b="1">
+                <a:latin typeface="微软雅黑" charset="0"/>
+                <a:ea typeface="微软雅黑" charset="0"/>
+                <a:cs typeface="微软雅黑" charset="0"/>
+              </a:rPr>
+            </a:br>
+            <a:r>
+              <a:rPr lang="zh-CN" altLang="en-US" sz="1400" b="1">
+                <a:latin typeface="微软雅黑" charset="0"/>
+                <a:ea typeface="微软雅黑" charset="0"/>
+                <a:cs typeface="微软雅黑" charset="0"/>
+              </a:rPr>
+              <a:t>全部</a:t>
+            </a:r>
+            <a:r>
+              <a:rPr lang="zh-CN" altLang="en-US" sz="1400" b="1">
+                <a:latin typeface="微软雅黑" charset="0"/>
+                <a:ea typeface="微软雅黑" charset="0"/>
+                <a:cs typeface="微软雅黑" charset="0"/>
+              </a:rPr>
+              <a:t>放开</a:t>
+            </a:r>
+            <a:endParaRPr lang="zh-CN" altLang="en-US" sz="1400" b="1">
+              <a:latin typeface="微软雅黑" charset="0"/>
+              <a:ea typeface="微软雅黑" charset="0"/>
+              <a:cs typeface="微软雅黑" charset="0"/>
+            </a:endParaRPr>
+          </a:p>
+        </p:txBody>
+      </p:sp>
+      <p:sp>
+        <p:nvSpPr>
+          <p:cNvPr id="26" name="文本框 25"/>
+          <p:cNvSpPr txBox="1"/>
+          <p:nvPr>
+            <p:custDataLst>
+              <p:tags r:id="rId27"/>
+            </p:custDataLst>
+          </p:nvPr>
+        </p:nvSpPr>
+        <p:spPr>
+          <a:xfrm>
+            <a:off x="2226310" y="49530"/>
+            <a:ext cx="2175510" cy="364490"/>
+          </a:xfrm>
+          <a:prstGeom prst="rect">
+            <a:avLst/>
+          </a:prstGeom>
+          <a:noFill/>
+        </p:spPr>
+        <p:txBody>
+          <a:bodyPr wrap="square" rtlCol="0">
+            <a:noAutofit/>
+          </a:bodyPr>
+          <a:p>
+            <a:pPr algn="ctr"/>
+            <a:r>
+              <a:rPr lang="zh-CN" altLang="en-US" sz="1400" b="1">
+                <a:latin typeface="微软雅黑" charset="0"/>
+                <a:ea typeface="微软雅黑" charset="0"/>
+                <a:cs typeface="微软雅黑" charset="0"/>
+              </a:rPr>
+              <a:t>微调策略</a:t>
+            </a:r>
+            <a:endParaRPr lang="zh-CN" altLang="en-US" sz="1400" b="1">
+              <a:latin typeface="微软雅黑" charset="0"/>
+              <a:ea typeface="微软雅黑" charset="0"/>
+              <a:cs typeface="微软雅黑" charset="0"/>
+            </a:endParaRPr>
+          </a:p>
+        </p:txBody>
+      </p:sp>
+      <p:sp>
+        <p:nvSpPr>
+          <p:cNvPr id="27" name="文本框 26"/>
+          <p:cNvSpPr txBox="1"/>
+          <p:nvPr>
+            <p:custDataLst>
+              <p:tags r:id="rId28"/>
+            </p:custDataLst>
+          </p:nvPr>
+        </p:nvSpPr>
+        <p:spPr>
+          <a:xfrm>
+            <a:off x="452755" y="1641475"/>
+            <a:ext cx="2175510" cy="364490"/>
+          </a:xfrm>
+          <a:prstGeom prst="rect">
+            <a:avLst/>
+          </a:prstGeom>
+          <a:noFill/>
+        </p:spPr>
+        <p:txBody>
+          <a:bodyPr wrap="square" rtlCol="0">
+            <a:noAutofit/>
+          </a:bodyPr>
+          <a:p>
+            <a:pPr algn="ctr"/>
+            <a:r>
+              <a:rPr lang="zh-CN" altLang="en-US" sz="1400" b="1">
+                <a:latin typeface="微软雅黑" charset="0"/>
+                <a:ea typeface="微软雅黑" charset="0"/>
+                <a:cs typeface="微软雅黑" charset="0"/>
+              </a:rPr>
+              <a:t>图文检索使用双流</a:t>
+            </a:r>
+            <a:r>
+              <a:rPr lang="zh-CN" altLang="en-US" sz="1400" b="1">
+                <a:latin typeface="微软雅黑" charset="0"/>
+                <a:ea typeface="微软雅黑" charset="0"/>
+                <a:cs typeface="微软雅黑" charset="0"/>
+              </a:rPr>
+              <a:t>微调</a:t>
+            </a:r>
+            <a:endParaRPr lang="zh-CN" altLang="en-US" sz="1400" b="1">
+              <a:latin typeface="微软雅黑" charset="0"/>
+              <a:ea typeface="微软雅黑" charset="0"/>
+              <a:cs typeface="微软雅黑" charset="0"/>
+            </a:endParaRPr>
+          </a:p>
+        </p:txBody>
+      </p:sp>
+      <p:sp>
+        <p:nvSpPr>
+          <p:cNvPr id="28" name="文本框 27"/>
+          <p:cNvSpPr txBox="1"/>
+          <p:nvPr>
+            <p:custDataLst>
+              <p:tags r:id="rId29"/>
+            </p:custDataLst>
+          </p:nvPr>
+        </p:nvSpPr>
+        <p:spPr>
+          <a:xfrm>
+            <a:off x="3933825" y="1623060"/>
+            <a:ext cx="2489200" cy="364490"/>
+          </a:xfrm>
+          <a:prstGeom prst="rect">
+            <a:avLst/>
+          </a:prstGeom>
+          <a:noFill/>
+        </p:spPr>
+        <p:txBody>
+          <a:bodyPr wrap="square" rtlCol="0">
+            <a:noAutofit/>
+          </a:bodyPr>
+          <a:p>
+            <a:pPr algn="ctr"/>
+            <a:r>
+              <a:rPr lang="zh-CN" altLang="en-US" sz="1400" b="1">
+                <a:latin typeface="微软雅黑" charset="0"/>
+                <a:ea typeface="微软雅黑" charset="0"/>
+                <a:cs typeface="微软雅黑" charset="0"/>
+              </a:rPr>
+              <a:t>分类问答推理使用</a:t>
+            </a:r>
+            <a:r>
+              <a:rPr lang="zh-CN" altLang="en-US" sz="1400" b="1">
+                <a:latin typeface="微软雅黑" charset="0"/>
+                <a:ea typeface="微软雅黑" charset="0"/>
+                <a:cs typeface="微软雅黑" charset="0"/>
+              </a:rPr>
+              <a:t>单流</a:t>
+            </a:r>
+            <a:r>
+              <a:rPr lang="zh-CN" altLang="en-US" sz="1400" b="1">
+                <a:latin typeface="微软雅黑" charset="0"/>
+                <a:ea typeface="微软雅黑" charset="0"/>
+                <a:cs typeface="微软雅黑" charset="0"/>
+              </a:rPr>
+              <a:t>微调</a:t>
+            </a:r>
+            <a:endParaRPr lang="zh-CN" altLang="en-US" sz="1400" b="1">
+              <a:latin typeface="微软雅黑" charset="0"/>
+              <a:ea typeface="微软雅黑" charset="0"/>
+              <a:cs typeface="微软雅黑" charset="0"/>
+            </a:endParaRPr>
+          </a:p>
+        </p:txBody>
+      </p:sp>
+      <p:sp>
+        <p:nvSpPr>
+          <p:cNvPr id="29" name="矩形: 圆角 36"/>
+          <p:cNvSpPr/>
+          <p:nvPr>
+            <p:custDataLst>
+              <p:tags r:id="rId30"/>
+            </p:custDataLst>
+          </p:nvPr>
+        </p:nvSpPr>
+        <p:spPr>
+          <a:xfrm rot="10800000" flipV="1">
+            <a:off x="6704330" y="13970"/>
+            <a:ext cx="5176520" cy="2329815"/>
+          </a:xfrm>
+          <a:prstGeom prst="roundRect">
+            <a:avLst>
+              <a:gd name="adj" fmla="val 10039"/>
+            </a:avLst>
+          </a:prstGeom>
+          <a:noFill/>
+          <a:ln w="38100">
+            <a:solidFill>
+              <a:schemeClr val="tx1"/>
+            </a:solidFill>
+            <a:prstDash val="lgDash"/>
+          </a:ln>
+        </p:spPr>
+        <p:style>
+          <a:lnRef idx="2">
+            <a:schemeClr val="accent1">
+              <a:shade val="15000"/>
+            </a:schemeClr>
+          </a:lnRef>
+          <a:fillRef idx="1">
+            <a:schemeClr val="accent1"/>
+          </a:fillRef>
+          <a:effectRef idx="0">
+            <a:schemeClr val="accent1"/>
+          </a:effectRef>
+          <a:fontRef idx="minor">
+            <a:schemeClr val="lt1"/>
+          </a:fontRef>
+        </p:style>
+        <p:txBody>
+          <a:bodyPr rtlCol="0" anchor="ctr"/>
+          <a:p>
+            <a:pPr algn="ctr"/>
+            <a:endParaRPr lang="zh-CN" altLang="en-US"/>
+          </a:p>
+        </p:txBody>
+      </p:sp>
+      <p:sp>
+        <p:nvSpPr>
+          <p:cNvPr id="30" name="矩形: 圆角 36"/>
+          <p:cNvSpPr/>
+          <p:nvPr>
+            <p:custDataLst>
+              <p:tags r:id="rId31"/>
+            </p:custDataLst>
+          </p:nvPr>
+        </p:nvSpPr>
+        <p:spPr>
+          <a:xfrm rot="10800000" flipV="1">
+            <a:off x="6704330" y="2415540"/>
+            <a:ext cx="5176520" cy="2267585"/>
+          </a:xfrm>
+          <a:prstGeom prst="roundRect">
+            <a:avLst>
+              <a:gd name="adj" fmla="val 10039"/>
+            </a:avLst>
+          </a:prstGeom>
+          <a:noFill/>
+          <a:ln w="38100">
+            <a:solidFill>
+              <a:schemeClr val="tx1"/>
+            </a:solidFill>
+            <a:prstDash val="lgDash"/>
+          </a:ln>
+        </p:spPr>
+        <p:style>
+          <a:lnRef idx="2">
+            <a:schemeClr val="accent1">
+              <a:shade val="15000"/>
+            </a:schemeClr>
+          </a:lnRef>
+          <a:fillRef idx="1">
+            <a:schemeClr val="accent1"/>
+          </a:fillRef>
+          <a:effectRef idx="0">
+            <a:schemeClr val="accent1"/>
+          </a:effectRef>
+          <a:fontRef idx="minor">
+            <a:schemeClr val="lt1"/>
+          </a:fontRef>
+        </p:style>
+        <p:txBody>
+          <a:bodyPr rtlCol="0" anchor="ctr"/>
+          <a:p>
+            <a:pPr algn="ctr"/>
+            <a:endParaRPr lang="zh-CN" altLang="en-US"/>
+          </a:p>
+        </p:txBody>
+      </p:sp>
+      <p:sp>
+        <p:nvSpPr>
+          <p:cNvPr id="31" name="矩形: 圆角 36"/>
+          <p:cNvSpPr/>
+          <p:nvPr>
+            <p:custDataLst>
+              <p:tags r:id="rId32"/>
+            </p:custDataLst>
+          </p:nvPr>
+        </p:nvSpPr>
+        <p:spPr>
+          <a:xfrm rot="10800000" flipV="1">
+            <a:off x="6680835" y="4707255"/>
+            <a:ext cx="5176520" cy="2132330"/>
+          </a:xfrm>
+          <a:prstGeom prst="roundRect">
+            <a:avLst>
+              <a:gd name="adj" fmla="val 10039"/>
+            </a:avLst>
+          </a:prstGeom>
+          <a:noFill/>
+          <a:ln w="38100">
+            <a:solidFill>
+              <a:schemeClr val="tx1"/>
+            </a:solidFill>
+            <a:prstDash val="lgDash"/>
+          </a:ln>
+        </p:spPr>
+        <p:style>
+          <a:lnRef idx="2">
+            <a:schemeClr val="accent1">
+              <a:shade val="15000"/>
+            </a:schemeClr>
+          </a:lnRef>
+          <a:fillRef idx="1">
+            <a:schemeClr val="accent1"/>
+          </a:fillRef>
+          <a:effectRef idx="0">
+            <a:schemeClr val="accent1"/>
+          </a:effectRef>
+          <a:fontRef idx="minor">
+            <a:schemeClr val="lt1"/>
+          </a:fontRef>
+        </p:style>
+        <p:txBody>
+          <a:bodyPr rtlCol="0" anchor="ctr"/>
+          <a:p>
+            <a:pPr algn="ctr"/>
+            <a:endParaRPr lang="zh-CN" altLang="en-US"/>
+          </a:p>
+        </p:txBody>
+      </p:sp>
+      <p:sp>
+        <p:nvSpPr>
+          <p:cNvPr id="32" name="矩形: 圆角 36"/>
+          <p:cNvSpPr/>
+          <p:nvPr>
+            <p:custDataLst>
+              <p:tags r:id="rId33"/>
+            </p:custDataLst>
+          </p:nvPr>
+        </p:nvSpPr>
+        <p:spPr>
+          <a:xfrm rot="10800000" flipV="1">
+            <a:off x="50800" y="4712970"/>
+            <a:ext cx="6322695" cy="2132330"/>
+          </a:xfrm>
+          <a:prstGeom prst="roundRect">
+            <a:avLst>
+              <a:gd name="adj" fmla="val 10039"/>
+            </a:avLst>
+          </a:prstGeom>
+          <a:noFill/>
+          <a:ln w="38100">
+            <a:solidFill>
+              <a:schemeClr val="tx1"/>
+            </a:solidFill>
+            <a:prstDash val="lgDash"/>
+          </a:ln>
+        </p:spPr>
+        <p:style>
+          <a:lnRef idx="2">
+            <a:schemeClr val="accent1">
+              <a:shade val="15000"/>
+            </a:schemeClr>
+          </a:lnRef>
+          <a:fillRef idx="1">
+            <a:schemeClr val="accent1"/>
+          </a:fillRef>
+          <a:effectRef idx="0">
+            <a:schemeClr val="accent1"/>
+          </a:effectRef>
+          <a:fontRef idx="minor">
+            <a:schemeClr val="lt1"/>
+          </a:fontRef>
+        </p:style>
+        <p:txBody>
+          <a:bodyPr rtlCol="0" anchor="ctr"/>
+          <a:p>
+            <a:pPr algn="ctr"/>
+            <a:endParaRPr lang="zh-CN" altLang="en-US"/>
+          </a:p>
+        </p:txBody>
+      </p:sp>
+      <p:sp>
+        <p:nvSpPr>
+          <p:cNvPr id="33" name="矩形: 圆角 36"/>
+          <p:cNvSpPr/>
+          <p:nvPr>
+            <p:custDataLst>
+              <p:tags r:id="rId34"/>
+            </p:custDataLst>
+          </p:nvPr>
+        </p:nvSpPr>
+        <p:spPr>
+          <a:xfrm rot="10800000" flipV="1">
+            <a:off x="50800" y="49530"/>
+            <a:ext cx="6539230" cy="2132330"/>
+          </a:xfrm>
+          <a:prstGeom prst="roundRect">
+            <a:avLst>
+              <a:gd name="adj" fmla="val 10039"/>
+            </a:avLst>
+          </a:prstGeom>
+          <a:noFill/>
+          <a:ln w="38100">
+            <a:solidFill>
+              <a:schemeClr val="tx1"/>
+            </a:solidFill>
+            <a:prstDash val="lgDash"/>
+          </a:ln>
+        </p:spPr>
+        <p:style>
+          <a:lnRef idx="2">
+            <a:schemeClr val="accent1">
+              <a:shade val="15000"/>
+            </a:schemeClr>
+          </a:lnRef>
+          <a:fillRef idx="1">
+            <a:schemeClr val="accent1"/>
+          </a:fillRef>
+          <a:effectRef idx="0">
+            <a:schemeClr val="accent1"/>
+          </a:effectRef>
+          <a:fontRef idx="minor">
+            <a:schemeClr val="lt1"/>
+          </a:fontRef>
+        </p:style>
+        <p:txBody>
+          <a:bodyPr rtlCol="0" anchor="ctr"/>
+          <a:p>
+            <a:pPr algn="ctr"/>
+            <a:endParaRPr lang="zh-CN" altLang="en-US"/>
+          </a:p>
+        </p:txBody>
+      </p:sp>
+    </p:spTree>
+  </p:cSld>
+  <p:clrMapOvr>
+    <a:masterClrMapping/>
+  </p:clrMapOvr>
+</p:sld>
+</file>
+
+<file path=ppt/slides/slide11.xml><?xml version="1.0" encoding="utf-8"?>
+<p:sld xmlns:a="http://schemas.openxmlformats.org/drawingml/2006/main" xmlns:r="http://schemas.openxmlformats.org/officeDocument/2006/relationships" xmlns:p="http://schemas.openxmlformats.org/presentationml/2006/main">
+  <p:cSld>
+    <p:spTree>
+      <p:nvGrpSpPr>
+        <p:cNvPr id="1" name=""/>
+        <p:cNvGrpSpPr/>
+        <p:nvPr/>
+      </p:nvGrpSpPr>
+      <p:grpSpPr/>
+      <p:sp>
+        <p:nvSpPr>
+          <p:cNvPr id="2" name="标题 1"/>
+          <p:cNvSpPr>
+            <a:spLocks noGrp="1"/>
+          </p:cNvSpPr>
+          <p:nvPr>
+            <p:ph type="ctrTitle"/>
+          </p:nvPr>
+        </p:nvSpPr>
+        <p:spPr/>
+        <p:txBody>
+          <a:bodyPr/>
+          <a:p>
+            <a:r>
+              <a:rPr lang="en-US" altLang="zh-CN"/>
+              <a:t>BLIP</a:t>
+            </a:r>
+            <a:endParaRPr lang="en-US" altLang="zh-CN"/>
+          </a:p>
+        </p:txBody>
+      </p:sp>
+      <p:sp>
+        <p:nvSpPr>
+          <p:cNvPr id="3" name="副标题 2"/>
+          <p:cNvSpPr>
+            <a:spLocks noGrp="1"/>
+          </p:cNvSpPr>
+          <p:nvPr>
+            <p:ph type="subTitle" idx="1"/>
+          </p:nvPr>
+        </p:nvSpPr>
+        <p:spPr/>
+        <p:txBody>
+          <a:bodyPr/>
+          <a:p>
+            <a:endParaRPr lang="zh-CN" altLang="en-US"/>
+          </a:p>
+        </p:txBody>
+      </p:sp>
+    </p:spTree>
+  </p:cSld>
+  <p:clrMapOvr>
+    <a:masterClrMapping/>
+  </p:clrMapOvr>
+</p:sld>
+</file>
+
+<file path=ppt/slides/slide12.xml><?xml version="1.0" encoding="utf-8"?>
+<p:sld xmlns:a="http://schemas.openxmlformats.org/drawingml/2006/main" xmlns:r="http://schemas.openxmlformats.org/officeDocument/2006/relationships" xmlns:p="http://schemas.openxmlformats.org/presentationml/2006/main">
+  <p:cSld>
+    <p:spTree>
+      <p:nvGrpSpPr>
+        <p:cNvPr id="1" name=""/>
+        <p:cNvGrpSpPr/>
+        <p:nvPr/>
+      </p:nvGrpSpPr>
+      <p:grpSpPr/>
+      <p:pic>
+        <p:nvPicPr>
+          <p:cNvPr id="4" name="图片 3"/>
+          <p:cNvPicPr>
+            <a:picLocks noChangeAspect="1"/>
+          </p:cNvPicPr>
+          <p:nvPr>
+            <p:custDataLst>
+              <p:tags r:id="rId1"/>
+            </p:custDataLst>
+          </p:nvPr>
+        </p:nvPicPr>
+        <p:blipFill>
+          <a:blip r:embed="rId2"/>
+          <a:stretch>
+            <a:fillRect/>
+          </a:stretch>
+        </p:blipFill>
+        <p:spPr>
+          <a:xfrm>
+            <a:off x="2028190" y="207645"/>
+            <a:ext cx="7892415" cy="3221355"/>
+          </a:xfrm>
+          <a:prstGeom prst="rect">
+            <a:avLst/>
+          </a:prstGeom>
+        </p:spPr>
+      </p:pic>
+      <p:pic>
+        <p:nvPicPr>
+          <p:cNvPr id="5" name="图片 4"/>
+          <p:cNvPicPr>
+            <a:picLocks noChangeAspect="1"/>
+          </p:cNvPicPr>
+          <p:nvPr>
+            <p:custDataLst>
+              <p:tags r:id="rId3"/>
+            </p:custDataLst>
+          </p:nvPr>
+        </p:nvPicPr>
+        <p:blipFill>
+          <a:blip r:embed="rId4"/>
+          <a:stretch>
+            <a:fillRect/>
+          </a:stretch>
+        </p:blipFill>
+        <p:spPr>
+          <a:xfrm>
+            <a:off x="2239010" y="4077335"/>
+            <a:ext cx="7471410" cy="2541270"/>
+          </a:xfrm>
+          <a:prstGeom prst="rect">
+            <a:avLst/>
+          </a:prstGeom>
+        </p:spPr>
+      </p:pic>
+      <p:sp>
+        <p:nvSpPr>
+          <p:cNvPr id="11" name="文本框 10"/>
+          <p:cNvSpPr txBox="1"/>
+          <p:nvPr>
+            <p:custDataLst>
+              <p:tags r:id="rId5"/>
+            </p:custDataLst>
+          </p:nvPr>
+        </p:nvSpPr>
+        <p:spPr>
+          <a:xfrm>
+            <a:off x="2028190" y="3429000"/>
+            <a:ext cx="2175510" cy="648335"/>
+          </a:xfrm>
+          <a:prstGeom prst="rect">
+            <a:avLst/>
+          </a:prstGeom>
+          <a:noFill/>
+        </p:spPr>
+        <p:txBody>
+          <a:bodyPr wrap="square" rtlCol="0">
+            <a:noAutofit/>
+          </a:bodyPr>
+          <a:p>
+            <a:pPr algn="ctr"/>
+            <a:r>
+              <a:rPr lang="zh-CN" altLang="en-US" sz="1400" b="1">
+                <a:latin typeface="微软雅黑" charset="0"/>
+                <a:ea typeface="微软雅黑" charset="0"/>
+                <a:cs typeface="微软雅黑" charset="0"/>
+              </a:rPr>
+              <a:t>图像</a:t>
+            </a:r>
+            <a:r>
+              <a:rPr lang="en-US" altLang="zh-CN" sz="1400" b="1">
+                <a:latin typeface="微软雅黑" charset="0"/>
+                <a:ea typeface="微软雅黑" charset="0"/>
+                <a:cs typeface="微软雅黑" charset="0"/>
+              </a:rPr>
+              <a:t>Encoder</a:t>
+            </a:r>
+            <a:endParaRPr lang="en-US" altLang="zh-CN" sz="1400" b="1">
+              <a:latin typeface="微软雅黑" charset="0"/>
+              <a:ea typeface="微软雅黑" charset="0"/>
+              <a:cs typeface="微软雅黑" charset="0"/>
+            </a:endParaRPr>
+          </a:p>
+          <a:p>
+            <a:pPr algn="ctr"/>
+            <a:r>
+              <a:rPr lang="en-US" altLang="zh-CN" sz="1400" b="1">
+                <a:latin typeface="微软雅黑" charset="0"/>
+                <a:ea typeface="微软雅黑" charset="0"/>
+                <a:cs typeface="微软雅黑" charset="0"/>
+              </a:rPr>
+              <a:t>ViT</a:t>
+            </a:r>
+            <a:endParaRPr lang="en-US" altLang="zh-CN" sz="1400" b="1">
+              <a:latin typeface="微软雅黑" charset="0"/>
+              <a:ea typeface="微软雅黑" charset="0"/>
+              <a:cs typeface="微软雅黑" charset="0"/>
+            </a:endParaRPr>
+          </a:p>
+        </p:txBody>
+      </p:sp>
+      <p:sp>
+        <p:nvSpPr>
+          <p:cNvPr id="6" name="文本框 5"/>
+          <p:cNvSpPr txBox="1"/>
+          <p:nvPr>
+            <p:custDataLst>
+              <p:tags r:id="rId6"/>
+            </p:custDataLst>
+          </p:nvPr>
+        </p:nvSpPr>
+        <p:spPr>
+          <a:xfrm>
+            <a:off x="3850005" y="3429000"/>
+            <a:ext cx="2418080" cy="648335"/>
+          </a:xfrm>
+          <a:prstGeom prst="rect">
+            <a:avLst/>
+          </a:prstGeom>
+          <a:noFill/>
+        </p:spPr>
+        <p:txBody>
+          <a:bodyPr wrap="square" rtlCol="0">
+            <a:noAutofit/>
+          </a:bodyPr>
+          <a:p>
+            <a:pPr algn="ctr"/>
+            <a:r>
+              <a:rPr lang="zh-CN" altLang="en-US" sz="1400" b="1">
+                <a:latin typeface="微软雅黑" charset="0"/>
+                <a:ea typeface="微软雅黑" charset="0"/>
+                <a:cs typeface="微软雅黑" charset="0"/>
+              </a:rPr>
+              <a:t>文本</a:t>
+            </a:r>
+            <a:r>
+              <a:rPr lang="en-US" altLang="zh-CN" sz="1400" b="1">
+                <a:latin typeface="微软雅黑" charset="0"/>
+                <a:ea typeface="微软雅黑" charset="0"/>
+                <a:cs typeface="微软雅黑" charset="0"/>
+              </a:rPr>
+              <a:t>E</a:t>
+            </a:r>
+            <a:r>
+              <a:rPr lang="en-US" altLang="zh-CN" sz="1400" b="1">
+                <a:latin typeface="微软雅黑" charset="0"/>
+                <a:ea typeface="微软雅黑" charset="0"/>
+                <a:cs typeface="微软雅黑" charset="0"/>
+              </a:rPr>
+              <a:t>ncoder</a:t>
+            </a:r>
+            <a:endParaRPr lang="zh-CN" altLang="en-US" sz="1400" b="1">
+              <a:latin typeface="微软雅黑" charset="0"/>
+              <a:ea typeface="微软雅黑" charset="0"/>
+              <a:cs typeface="微软雅黑" charset="0"/>
+            </a:endParaRPr>
+          </a:p>
+          <a:p>
+            <a:pPr algn="ctr"/>
+            <a:r>
+              <a:rPr lang="zh-CN" altLang="en-US" sz="1400" b="1">
+                <a:latin typeface="微软雅黑" charset="0"/>
+                <a:ea typeface="微软雅黑" charset="0"/>
+                <a:cs typeface="微软雅黑" charset="0"/>
+              </a:rPr>
+              <a:t>文本模态</a:t>
+            </a:r>
+            <a:r>
+              <a:rPr lang="en-US" altLang="zh-CN" sz="1400" b="1">
+                <a:latin typeface="微软雅黑" charset="0"/>
+                <a:ea typeface="微软雅黑" charset="0"/>
+                <a:cs typeface="微软雅黑" charset="0"/>
+              </a:rPr>
+              <a:t> </a:t>
+            </a:r>
+            <a:r>
+              <a:rPr lang="zh-CN" altLang="en-US" sz="1400" b="1">
+                <a:latin typeface="微软雅黑" charset="0"/>
+                <a:ea typeface="微软雅黑" charset="0"/>
+                <a:cs typeface="微软雅黑" charset="0"/>
+              </a:rPr>
+              <a:t>获得纯文本特征</a:t>
+            </a:r>
+            <a:br>
+              <a:rPr lang="zh-CN" altLang="en-US" sz="1400" b="1">
+                <a:latin typeface="微软雅黑" charset="0"/>
+                <a:ea typeface="微软雅黑" charset="0"/>
+                <a:cs typeface="微软雅黑" charset="0"/>
+              </a:rPr>
+            </a:br>
+            <a:r>
+              <a:rPr lang="zh-CN" altLang="en-US" sz="1400" b="1">
+                <a:latin typeface="微软雅黑" charset="0"/>
+                <a:ea typeface="微软雅黑" charset="0"/>
+                <a:cs typeface="微软雅黑" charset="0"/>
+              </a:rPr>
+              <a:t>用于</a:t>
+            </a:r>
+            <a:r>
+              <a:rPr lang="en-US" altLang="zh-CN" sz="1400" b="1">
+                <a:latin typeface="微软雅黑" charset="0"/>
+                <a:ea typeface="微软雅黑" charset="0"/>
+                <a:cs typeface="微软雅黑" charset="0"/>
+              </a:rPr>
+              <a:t>ITC</a:t>
+            </a:r>
+            <a:r>
+              <a:rPr lang="zh-CN" altLang="en-US" sz="1400" b="1">
+                <a:latin typeface="微软雅黑" charset="0"/>
+                <a:ea typeface="微软雅黑" charset="0"/>
+                <a:cs typeface="微软雅黑" charset="0"/>
+              </a:rPr>
+              <a:t>（</a:t>
+            </a:r>
+            <a:r>
+              <a:rPr lang="en-US" altLang="zh-CN" sz="1400" b="1">
+                <a:latin typeface="微软雅黑" charset="0"/>
+                <a:ea typeface="微软雅黑" charset="0"/>
+                <a:cs typeface="微软雅黑" charset="0"/>
+              </a:rPr>
+              <a:t>ALBEF ITC</a:t>
+            </a:r>
+            <a:r>
+              <a:rPr lang="zh-CN" altLang="en-US" sz="1400" b="1">
+                <a:latin typeface="微软雅黑" charset="0"/>
+                <a:ea typeface="微软雅黑" charset="0"/>
+                <a:cs typeface="微软雅黑" charset="0"/>
+              </a:rPr>
+              <a:t>）</a:t>
+            </a:r>
+            <a:endParaRPr lang="zh-CN" altLang="en-US" sz="1400" b="1">
+              <a:latin typeface="微软雅黑" charset="0"/>
+              <a:ea typeface="微软雅黑" charset="0"/>
+              <a:cs typeface="微软雅黑" charset="0"/>
+            </a:endParaRPr>
+          </a:p>
+        </p:txBody>
+      </p:sp>
+      <p:sp>
+        <p:nvSpPr>
+          <p:cNvPr id="7" name="文本框 6"/>
+          <p:cNvSpPr txBox="1"/>
+          <p:nvPr>
+            <p:custDataLst>
+              <p:tags r:id="rId7"/>
+            </p:custDataLst>
+          </p:nvPr>
+        </p:nvSpPr>
+        <p:spPr>
+          <a:xfrm>
+            <a:off x="6146800" y="3429000"/>
+            <a:ext cx="2175510" cy="648335"/>
+          </a:xfrm>
+          <a:prstGeom prst="rect">
+            <a:avLst/>
+          </a:prstGeom>
+          <a:noFill/>
+        </p:spPr>
+        <p:txBody>
+          <a:bodyPr wrap="square" rtlCol="0">
+            <a:noAutofit/>
+          </a:bodyPr>
+          <a:p>
+            <a:pPr algn="ctr"/>
+            <a:r>
+              <a:rPr lang="zh-CN" altLang="en-US" sz="1400" b="1">
+                <a:latin typeface="微软雅黑" charset="0"/>
+                <a:ea typeface="微软雅黑" charset="0"/>
+                <a:cs typeface="微软雅黑" charset="0"/>
+              </a:rPr>
+              <a:t>文本</a:t>
+            </a:r>
+            <a:r>
+              <a:rPr lang="en-US" altLang="zh-CN" sz="1400" b="1">
+                <a:latin typeface="微软雅黑" charset="0"/>
+                <a:ea typeface="微软雅黑" charset="0"/>
+                <a:cs typeface="微软雅黑" charset="0"/>
+              </a:rPr>
+              <a:t>Encoder</a:t>
+            </a:r>
+            <a:endParaRPr lang="zh-CN" altLang="en-US" sz="1400" b="1">
+              <a:latin typeface="微软雅黑" charset="0"/>
+              <a:ea typeface="微软雅黑" charset="0"/>
+              <a:cs typeface="微软雅黑" charset="0"/>
+            </a:endParaRPr>
+          </a:p>
+          <a:p>
+            <a:pPr algn="ctr"/>
+            <a:r>
+              <a:rPr lang="zh-CN" altLang="en-US" sz="1400" b="1">
+                <a:latin typeface="微软雅黑" charset="0"/>
+                <a:ea typeface="微软雅黑" charset="0"/>
+                <a:cs typeface="微软雅黑" charset="0"/>
+              </a:rPr>
+              <a:t>生成融合模态特征</a:t>
+            </a:r>
+            <a:br>
+              <a:rPr lang="zh-CN" altLang="en-US" sz="1400" b="1">
+                <a:latin typeface="微软雅黑" charset="0"/>
+                <a:ea typeface="微软雅黑" charset="0"/>
+                <a:cs typeface="微软雅黑" charset="0"/>
+              </a:rPr>
+            </a:br>
+            <a:r>
+              <a:rPr lang="zh-CN" altLang="en-US" sz="1400" b="1">
+                <a:latin typeface="微软雅黑" charset="0"/>
+                <a:ea typeface="微软雅黑" charset="0"/>
+                <a:cs typeface="微软雅黑" charset="0"/>
+              </a:rPr>
+              <a:t>用于</a:t>
+            </a:r>
+            <a:r>
+              <a:rPr lang="en-US" altLang="zh-CN" sz="1400" b="1">
+                <a:latin typeface="微软雅黑" charset="0"/>
+                <a:ea typeface="微软雅黑" charset="0"/>
+                <a:cs typeface="微软雅黑" charset="0"/>
+              </a:rPr>
+              <a:t>ITM</a:t>
+            </a:r>
+            <a:r>
+              <a:rPr lang="zh-CN" altLang="en-US" sz="1400" b="1">
+                <a:latin typeface="微软雅黑" charset="0"/>
+                <a:ea typeface="微软雅黑" charset="0"/>
+                <a:cs typeface="微软雅黑" charset="0"/>
+              </a:rPr>
+              <a:t>（</a:t>
+            </a:r>
+            <a:r>
+              <a:rPr lang="en-US" altLang="zh-CN" sz="1400" b="1">
+                <a:latin typeface="微软雅黑" charset="0"/>
+                <a:ea typeface="微软雅黑" charset="0"/>
+                <a:cs typeface="微软雅黑" charset="0"/>
+              </a:rPr>
+              <a:t>ALBEF ITM</a:t>
+            </a:r>
+            <a:r>
+              <a:rPr lang="zh-CN" altLang="en-US" sz="1400" b="1">
+                <a:latin typeface="微软雅黑" charset="0"/>
+                <a:ea typeface="微软雅黑" charset="0"/>
+                <a:cs typeface="微软雅黑" charset="0"/>
+              </a:rPr>
+              <a:t>）</a:t>
+            </a:r>
+            <a:endParaRPr lang="zh-CN" altLang="en-US" sz="1400" b="1">
+              <a:latin typeface="微软雅黑" charset="0"/>
+              <a:ea typeface="微软雅黑" charset="0"/>
+              <a:cs typeface="微软雅黑" charset="0"/>
+            </a:endParaRPr>
+          </a:p>
+        </p:txBody>
+      </p:sp>
+      <p:sp>
+        <p:nvSpPr>
+          <p:cNvPr id="8" name="文本框 7"/>
+          <p:cNvSpPr txBox="1"/>
+          <p:nvPr>
+            <p:custDataLst>
+              <p:tags r:id="rId8"/>
+            </p:custDataLst>
+          </p:nvPr>
+        </p:nvSpPr>
+        <p:spPr>
+          <a:xfrm>
+            <a:off x="8005445" y="3429000"/>
+            <a:ext cx="2175510" cy="648335"/>
+          </a:xfrm>
+          <a:prstGeom prst="rect">
+            <a:avLst/>
+          </a:prstGeom>
+          <a:noFill/>
+        </p:spPr>
+        <p:txBody>
+          <a:bodyPr wrap="square" rtlCol="0">
+            <a:noAutofit/>
+          </a:bodyPr>
+          <a:p>
+            <a:pPr algn="ctr"/>
+            <a:r>
+              <a:rPr lang="zh-CN" altLang="en-US" sz="1400" b="1">
+                <a:latin typeface="微软雅黑" charset="0"/>
+                <a:ea typeface="微软雅黑" charset="0"/>
+                <a:cs typeface="微软雅黑" charset="0"/>
+              </a:rPr>
+              <a:t>文本</a:t>
+            </a:r>
+            <a:r>
+              <a:rPr lang="en-US" altLang="zh-CN" sz="1400" b="1">
+                <a:latin typeface="微软雅黑" charset="0"/>
+                <a:ea typeface="微软雅黑" charset="0"/>
+                <a:cs typeface="微软雅黑" charset="0"/>
+              </a:rPr>
+              <a:t>Decoder</a:t>
+            </a:r>
+            <a:endParaRPr lang="zh-CN" altLang="en-US" sz="1400" b="1">
+              <a:latin typeface="微软雅黑" charset="0"/>
+              <a:ea typeface="微软雅黑" charset="0"/>
+              <a:cs typeface="微软雅黑" charset="0"/>
+            </a:endParaRPr>
+          </a:p>
+          <a:p>
+            <a:pPr algn="ctr"/>
+            <a:r>
+              <a:rPr lang="zh-CN" altLang="en-US" sz="1400" b="1">
+                <a:latin typeface="微软雅黑" charset="0"/>
+                <a:ea typeface="微软雅黑" charset="0"/>
+                <a:cs typeface="微软雅黑" charset="0"/>
+              </a:rPr>
+              <a:t>生成融合模态</a:t>
+            </a:r>
+            <a:br>
+              <a:rPr lang="zh-CN" altLang="en-US" sz="1400" b="1">
+                <a:latin typeface="微软雅黑" charset="0"/>
+                <a:ea typeface="微软雅黑" charset="0"/>
+                <a:cs typeface="微软雅黑" charset="0"/>
+              </a:rPr>
+            </a:br>
+            <a:r>
+              <a:rPr lang="zh-CN" altLang="en-US" sz="1400" b="1">
+                <a:latin typeface="微软雅黑" charset="0"/>
+                <a:ea typeface="微软雅黑" charset="0"/>
+                <a:cs typeface="微软雅黑" charset="0"/>
+              </a:rPr>
+              <a:t>用于</a:t>
+            </a:r>
+            <a:r>
+              <a:rPr lang="en-US" altLang="zh-CN" sz="1400" b="1">
+                <a:latin typeface="微软雅黑" charset="0"/>
+                <a:ea typeface="微软雅黑" charset="0"/>
+                <a:cs typeface="微软雅黑" charset="0"/>
+              </a:rPr>
+              <a:t>LM</a:t>
+            </a:r>
+            <a:endParaRPr lang="en-US" altLang="zh-CN" sz="1400" b="1">
+              <a:latin typeface="微软雅黑" charset="0"/>
+              <a:ea typeface="微软雅黑" charset="0"/>
+              <a:cs typeface="微软雅黑" charset="0"/>
+            </a:endParaRPr>
+          </a:p>
+        </p:txBody>
+      </p:sp>
+      <p:sp>
+        <p:nvSpPr>
+          <p:cNvPr id="9" name="文本框 8"/>
+          <p:cNvSpPr txBox="1"/>
+          <p:nvPr>
+            <p:custDataLst>
+              <p:tags r:id="rId9"/>
+            </p:custDataLst>
+          </p:nvPr>
+        </p:nvSpPr>
+        <p:spPr>
+          <a:xfrm>
+            <a:off x="9710420" y="1982470"/>
+            <a:ext cx="2434590" cy="648335"/>
+          </a:xfrm>
+          <a:prstGeom prst="rect">
+            <a:avLst/>
+          </a:prstGeom>
+          <a:noFill/>
+        </p:spPr>
+        <p:txBody>
+          <a:bodyPr wrap="square" rtlCol="0">
+            <a:noAutofit/>
+          </a:bodyPr>
+          <a:p>
+            <a:pPr algn="ctr"/>
+            <a:r>
+              <a:rPr lang="en-US" altLang="zh-CN" sz="1400" b="1">
+                <a:latin typeface="微软雅黑" charset="0"/>
+                <a:ea typeface="微软雅黑" charset="0"/>
+                <a:cs typeface="微软雅黑" charset="0"/>
+              </a:rPr>
+              <a:t>Decoder</a:t>
+            </a:r>
+            <a:br>
+              <a:rPr lang="en-US" altLang="zh-CN" sz="1400" b="1">
+                <a:latin typeface="微软雅黑" charset="0"/>
+                <a:ea typeface="微软雅黑" charset="0"/>
+                <a:cs typeface="微软雅黑" charset="0"/>
+              </a:rPr>
+            </a:br>
+            <a:r>
+              <a:rPr lang="zh-CN" altLang="en-US" sz="1400" b="1">
+                <a:latin typeface="微软雅黑" charset="0"/>
+                <a:ea typeface="微软雅黑" charset="0"/>
+                <a:cs typeface="微软雅黑" charset="0"/>
+              </a:rPr>
+              <a:t>单向注意力，提高生成能力</a:t>
+            </a:r>
+            <a:br>
+              <a:rPr lang="zh-CN" altLang="en-US" sz="1400" b="1">
+                <a:latin typeface="微软雅黑" charset="0"/>
+                <a:ea typeface="微软雅黑" charset="0"/>
+                <a:cs typeface="微软雅黑" charset="0"/>
+              </a:rPr>
+            </a:br>
+            <a:r>
+              <a:rPr lang="en-US" altLang="zh-CN" sz="1400" b="1">
+                <a:latin typeface="微软雅黑" charset="0"/>
+                <a:ea typeface="微软雅黑" charset="0"/>
+                <a:cs typeface="微软雅黑" charset="0"/>
+              </a:rPr>
+              <a:t>GPT</a:t>
+            </a:r>
+            <a:endParaRPr lang="en-US" altLang="zh-CN" sz="1400" b="1">
               <a:latin typeface="微软雅黑" charset="0"/>
               <a:ea typeface="微软雅黑" charset="0"/>
               <a:cs typeface="微软雅黑" charset="0"/>
@@ -8937,6 +10582,60 @@
 </p:tagLst>
 </file>
 
+<file path=ppt/tags/tag100.xml><?xml version="1.0" encoding="utf-8"?>
+<p:tagLst xmlns:p="http://schemas.openxmlformats.org/presentationml/2006/main">
+  <p:tag name="KSO_WM_BEAUTIFY_FLAG" val=""/>
+</p:tagLst>
+</file>
+
+<file path=ppt/tags/tag101.xml><?xml version="1.0" encoding="utf-8"?>
+<p:tagLst xmlns:p="http://schemas.openxmlformats.org/presentationml/2006/main">
+  <p:tag name="KSO_WM_BEAUTIFY_FLAG" val=""/>
+</p:tagLst>
+</file>
+
+<file path=ppt/tags/tag102.xml><?xml version="1.0" encoding="utf-8"?>
+<p:tagLst xmlns:p="http://schemas.openxmlformats.org/presentationml/2006/main">
+  <p:tag name="KSO_WM_BEAUTIFY_FLAG" val=""/>
+</p:tagLst>
+</file>
+
+<file path=ppt/tags/tag103.xml><?xml version="1.0" encoding="utf-8"?>
+<p:tagLst xmlns:p="http://schemas.openxmlformats.org/presentationml/2006/main">
+  <p:tag name="KSO_WM_BEAUTIFY_FLAG" val=""/>
+</p:tagLst>
+</file>
+
+<file path=ppt/tags/tag104.xml><?xml version="1.0" encoding="utf-8"?>
+<p:tagLst xmlns:p="http://schemas.openxmlformats.org/presentationml/2006/main">
+  <p:tag name="KSO_WM_BEAUTIFY_FLAG" val=""/>
+</p:tagLst>
+</file>
+
+<file path=ppt/tags/tag105.xml><?xml version="1.0" encoding="utf-8"?>
+<p:tagLst xmlns:p="http://schemas.openxmlformats.org/presentationml/2006/main">
+  <p:tag name="KSO_WM_BEAUTIFY_FLAG" val=""/>
+</p:tagLst>
+</file>
+
+<file path=ppt/tags/tag106.xml><?xml version="1.0" encoding="utf-8"?>
+<p:tagLst xmlns:p="http://schemas.openxmlformats.org/presentationml/2006/main">
+  <p:tag name="KSO_WM_BEAUTIFY_FLAG" val=""/>
+</p:tagLst>
+</file>
+
+<file path=ppt/tags/tag107.xml><?xml version="1.0" encoding="utf-8"?>
+<p:tagLst xmlns:p="http://schemas.openxmlformats.org/presentationml/2006/main">
+  <p:tag name="KSO_WM_BEAUTIFY_FLAG" val=""/>
+</p:tagLst>
+</file>
+
+<file path=ppt/tags/tag108.xml><?xml version="1.0" encoding="utf-8"?>
+<p:tagLst xmlns:p="http://schemas.openxmlformats.org/presentationml/2006/main">
+  <p:tag name="KSO_WM_BEAUTIFY_FLAG" val=""/>
+</p:tagLst>
+</file>
+
 <file path=ppt/tags/tag11.xml><?xml version="1.0" encoding="utf-8"?>
 <p:tagLst xmlns:p="http://schemas.openxmlformats.org/presentationml/2006/main">
   <p:tag name="KSO_WM_BEAUTIFY_FLAG" val=""/>
@@ -9417,7 +11116,103 @@
 </p:tagLst>
 </file>
 
+<file path=ppt/tags/tag84.xml><?xml version="1.0" encoding="utf-8"?>
+<p:tagLst xmlns:p="http://schemas.openxmlformats.org/presentationml/2006/main">
+  <p:tag name="KSO_WM_BEAUTIFY_FLAG" val=""/>
+</p:tagLst>
+</file>
+
+<file path=ppt/tags/tag85.xml><?xml version="1.0" encoding="utf-8"?>
+<p:tagLst xmlns:p="http://schemas.openxmlformats.org/presentationml/2006/main">
+  <p:tag name="KSO_WM_BEAUTIFY_FLAG" val=""/>
+</p:tagLst>
+</file>
+
+<file path=ppt/tags/tag86.xml><?xml version="1.0" encoding="utf-8"?>
+<p:tagLst xmlns:p="http://schemas.openxmlformats.org/presentationml/2006/main">
+  <p:tag name="KSO_WM_BEAUTIFY_FLAG" val=""/>
+</p:tagLst>
+</file>
+
+<file path=ppt/tags/tag87.xml><?xml version="1.0" encoding="utf-8"?>
+<p:tagLst xmlns:p="http://schemas.openxmlformats.org/presentationml/2006/main">
+  <p:tag name="KSO_WM_BEAUTIFY_FLAG" val=""/>
+</p:tagLst>
+</file>
+
+<file path=ppt/tags/tag88.xml><?xml version="1.0" encoding="utf-8"?>
+<p:tagLst xmlns:p="http://schemas.openxmlformats.org/presentationml/2006/main">
+  <p:tag name="KSO_WM_BEAUTIFY_FLAG" val=""/>
+</p:tagLst>
+</file>
+
+<file path=ppt/tags/tag89.xml><?xml version="1.0" encoding="utf-8"?>
+<p:tagLst xmlns:p="http://schemas.openxmlformats.org/presentationml/2006/main">
+  <p:tag name="KSO_WM_BEAUTIFY_FLAG" val=""/>
+</p:tagLst>
+</file>
+
 <file path=ppt/tags/tag9.xml><?xml version="1.0" encoding="utf-8"?>
+<p:tagLst xmlns:p="http://schemas.openxmlformats.org/presentationml/2006/main">
+  <p:tag name="KSO_WM_BEAUTIFY_FLAG" val=""/>
+</p:tagLst>
+</file>
+
+<file path=ppt/tags/tag90.xml><?xml version="1.0" encoding="utf-8"?>
+<p:tagLst xmlns:p="http://schemas.openxmlformats.org/presentationml/2006/main">
+  <p:tag name="KSO_WM_BEAUTIFY_FLAG" val=""/>
+</p:tagLst>
+</file>
+
+<file path=ppt/tags/tag91.xml><?xml version="1.0" encoding="utf-8"?>
+<p:tagLst xmlns:p="http://schemas.openxmlformats.org/presentationml/2006/main">
+  <p:tag name="KSO_WM_BEAUTIFY_FLAG" val=""/>
+</p:tagLst>
+</file>
+
+<file path=ppt/tags/tag92.xml><?xml version="1.0" encoding="utf-8"?>
+<p:tagLst xmlns:p="http://schemas.openxmlformats.org/presentationml/2006/main">
+  <p:tag name="KSO_WM_BEAUTIFY_FLAG" val=""/>
+</p:tagLst>
+</file>
+
+<file path=ppt/tags/tag93.xml><?xml version="1.0" encoding="utf-8"?>
+<p:tagLst xmlns:p="http://schemas.openxmlformats.org/presentationml/2006/main">
+  <p:tag name="KSO_WM_BEAUTIFY_FLAG" val=""/>
+</p:tagLst>
+</file>
+
+<file path=ppt/tags/tag94.xml><?xml version="1.0" encoding="utf-8"?>
+<p:tagLst xmlns:p="http://schemas.openxmlformats.org/presentationml/2006/main">
+  <p:tag name="KSO_WM_BEAUTIFY_FLAG" val=""/>
+</p:tagLst>
+</file>
+
+<file path=ppt/tags/tag95.xml><?xml version="1.0" encoding="utf-8"?>
+<p:tagLst xmlns:p="http://schemas.openxmlformats.org/presentationml/2006/main">
+  <p:tag name="KSO_WM_BEAUTIFY_FLAG" val=""/>
+</p:tagLst>
+</file>
+
+<file path=ppt/tags/tag96.xml><?xml version="1.0" encoding="utf-8"?>
+<p:tagLst xmlns:p="http://schemas.openxmlformats.org/presentationml/2006/main">
+  <p:tag name="KSO_WM_BEAUTIFY_FLAG" val=""/>
+</p:tagLst>
+</file>
+
+<file path=ppt/tags/tag97.xml><?xml version="1.0" encoding="utf-8"?>
+<p:tagLst xmlns:p="http://schemas.openxmlformats.org/presentationml/2006/main">
+  <p:tag name="KSO_WM_BEAUTIFY_FLAG" val=""/>
+</p:tagLst>
+</file>
+
+<file path=ppt/tags/tag98.xml><?xml version="1.0" encoding="utf-8"?>
+<p:tagLst xmlns:p="http://schemas.openxmlformats.org/presentationml/2006/main">
+  <p:tag name="KSO_WM_BEAUTIFY_FLAG" val=""/>
+</p:tagLst>
+</file>
+
+<file path=ppt/tags/tag99.xml><?xml version="1.0" encoding="utf-8"?>
 <p:tagLst xmlns:p="http://schemas.openxmlformats.org/presentationml/2006/main">
   <p:tag name="KSO_WM_BEAUTIFY_FLAG" val=""/>
 </p:tagLst>

</xml_diff>